<commit_message>
subida de documento manual
</commit_message>
<xml_diff>
--- a/Scheduler Module.pptx
+++ b/Scheduler Module.pptx
@@ -14,14 +14,21 @@
     <p:sldId id="262" r:id="rId8"/>
     <p:sldId id="263" r:id="rId9"/>
     <p:sldId id="264" r:id="rId10"/>
-    <p:sldId id="265" r:id="rId11"/>
-    <p:sldId id="266" r:id="rId12"/>
-    <p:sldId id="267" r:id="rId13"/>
-    <p:sldId id="268" r:id="rId14"/>
-    <p:sldId id="269" r:id="rId15"/>
-    <p:sldId id="270" r:id="rId16"/>
-    <p:sldId id="271" r:id="rId17"/>
-    <p:sldId id="272" r:id="rId18"/>
+    <p:sldId id="277" r:id="rId11"/>
+    <p:sldId id="265" r:id="rId12"/>
+    <p:sldId id="266" r:id="rId13"/>
+    <p:sldId id="267" r:id="rId14"/>
+    <p:sldId id="268" r:id="rId15"/>
+    <p:sldId id="269" r:id="rId16"/>
+    <p:sldId id="270" r:id="rId17"/>
+    <p:sldId id="271" r:id="rId18"/>
+    <p:sldId id="272" r:id="rId19"/>
+    <p:sldId id="274" r:id="rId20"/>
+    <p:sldId id="278" r:id="rId21"/>
+    <p:sldId id="273" r:id="rId22"/>
+    <p:sldId id="279" r:id="rId23"/>
+    <p:sldId id="275" r:id="rId24"/>
+    <p:sldId id="276" r:id="rId25"/>
   </p:sldIdLst>
   <p:sldSz cx="12192000" cy="6858000"/>
   <p:notesSz cx="6858000" cy="9144000"/>
@@ -122,7 +129,7 @@
   </p:defaultTextStyle>
   <p:extLst>
     <p:ext uri="{EFAFB233-063F-42B5-8137-9DF3F51BA10A}">
-      <p15:sldGuideLst xmlns:p15="http://schemas.microsoft.com/office/powerpoint/2012/main"/>
+      <p15:sldGuideLst xmlns:p15="http://schemas.microsoft.com/office/powerpoint/2012/main" xmlns=""/>
     </p:ext>
   </p:extLst>
 </p:presentation>
@@ -133,7 +140,7 @@
   <p:cmAuthor id="1" name="HP 240" initials="H2" lastIdx="1" clrIdx="0">
     <p:extLst>
       <p:ext uri="{19B8F6BF-5375-455C-9EA6-DF929625EA0E}">
-        <p15:presenceInfo xmlns:p15="http://schemas.microsoft.com/office/powerpoint/2012/main" userId="HP 240" providerId="None"/>
+        <p15:presenceInfo xmlns:p15="http://schemas.microsoft.com/office/powerpoint/2012/main" xmlns="" userId="HP 240" providerId="None"/>
       </p:ext>
     </p:extLst>
   </p:cmAuthor>
@@ -863,7 +870,7 @@
             <a:fld id="{B61BEF0D-F0BB-DE4B-95CE-6DB70DBA9567}" type="datetimeFigureOut">
               <a:rPr lang="en-US" dirty="0"/>
               <a:pPr/>
-              <a:t>11/16/2015</a:t>
+              <a:t>11/17/2015</a:t>
             </a:fld>
             <a:endParaRPr lang="en-US" dirty="0"/>
           </a:p>
@@ -1111,7 +1118,7 @@
             <a:fld id="{B61BEF0D-F0BB-DE4B-95CE-6DB70DBA9567}" type="datetimeFigureOut">
               <a:rPr lang="en-US" dirty="0"/>
               <a:pPr/>
-              <a:t>11/16/2015</a:t>
+              <a:t>11/17/2015</a:t>
             </a:fld>
             <a:endParaRPr lang="en-US" dirty="0"/>
           </a:p>
@@ -1422,7 +1429,7 @@
             <a:fld id="{B61BEF0D-F0BB-DE4B-95CE-6DB70DBA9567}" type="datetimeFigureOut">
               <a:rPr lang="en-US" dirty="0"/>
               <a:pPr/>
-              <a:t>11/16/2015</a:t>
+              <a:t>11/17/2015</a:t>
             </a:fld>
             <a:endParaRPr lang="en-US" dirty="0"/>
           </a:p>
@@ -1760,7 +1767,7 @@
             <a:fld id="{B61BEF0D-F0BB-DE4B-95CE-6DB70DBA9567}" type="datetimeFigureOut">
               <a:rPr lang="en-US" dirty="0"/>
               <a:pPr/>
-              <a:t>11/16/2015</a:t>
+              <a:t>11/17/2015</a:t>
             </a:fld>
             <a:endParaRPr lang="en-US" dirty="0"/>
           </a:p>
@@ -2071,7 +2078,7 @@
             <a:fld id="{B61BEF0D-F0BB-DE4B-95CE-6DB70DBA9567}" type="datetimeFigureOut">
               <a:rPr lang="en-US" dirty="0"/>
               <a:pPr/>
-              <a:t>11/16/2015</a:t>
+              <a:t>11/17/2015</a:t>
             </a:fld>
             <a:endParaRPr lang="en-US" dirty="0"/>
           </a:p>
@@ -2461,7 +2468,7 @@
             <a:fld id="{B61BEF0D-F0BB-DE4B-95CE-6DB70DBA9567}" type="datetimeFigureOut">
               <a:rPr lang="en-US" dirty="0"/>
               <a:pPr/>
-              <a:t>11/16/2015</a:t>
+              <a:t>11/17/2015</a:t>
             </a:fld>
             <a:endParaRPr lang="en-US" dirty="0"/>
           </a:p>
@@ -2627,7 +2634,7 @@
           <a:p>
             <a:fld id="{55C6B4A9-1611-4792-9094-5F34BCA07E0B}" type="datetimeFigureOut">
               <a:rPr lang="en-US" dirty="0"/>
-              <a:t>11/16/2015</a:t>
+              <a:t>11/17/2015</a:t>
             </a:fld>
             <a:endParaRPr lang="en-US" dirty="0"/>
           </a:p>
@@ -2803,7 +2810,7 @@
             <a:fld id="{B61BEF0D-F0BB-DE4B-95CE-6DB70DBA9567}" type="datetimeFigureOut">
               <a:rPr lang="en-US" dirty="0"/>
               <a:pPr/>
-              <a:t>11/16/2015</a:t>
+              <a:t>11/17/2015</a:t>
             </a:fld>
             <a:endParaRPr lang="en-US" dirty="0"/>
           </a:p>
@@ -2976,7 +2983,7 @@
             <a:fld id="{B61BEF0D-F0BB-DE4B-95CE-6DB70DBA9567}" type="datetimeFigureOut">
               <a:rPr lang="en-US" dirty="0"/>
               <a:pPr/>
-              <a:t>11/16/2015</a:t>
+              <a:t>11/17/2015</a:t>
             </a:fld>
             <a:endParaRPr lang="en-US" dirty="0"/>
           </a:p>
@@ -3220,7 +3227,7 @@
             <a:fld id="{B61BEF0D-F0BB-DE4B-95CE-6DB70DBA9567}" type="datetimeFigureOut">
               <a:rPr lang="en-US" dirty="0"/>
               <a:pPr/>
-              <a:t>11/16/2015</a:t>
+              <a:t>11/17/2015</a:t>
             </a:fld>
             <a:endParaRPr lang="en-US" dirty="0"/>
           </a:p>
@@ -3448,7 +3455,7 @@
           <a:p>
             <a:fld id="{EB712588-04B1-427B-82EE-E8DB90309F08}" type="datetimeFigureOut">
               <a:rPr lang="en-US" dirty="0"/>
-              <a:t>11/16/2015</a:t>
+              <a:t>11/17/2015</a:t>
             </a:fld>
             <a:endParaRPr lang="en-US" dirty="0"/>
           </a:p>
@@ -3818,7 +3825,7 @@
             <a:fld id="{B61BEF0D-F0BB-DE4B-95CE-6DB70DBA9567}" type="datetimeFigureOut">
               <a:rPr lang="en-US" dirty="0"/>
               <a:pPr/>
-              <a:t>11/16/2015</a:t>
+              <a:t>11/17/2015</a:t>
             </a:fld>
             <a:endParaRPr lang="en-US" dirty="0"/>
           </a:p>
@@ -3938,7 +3945,7 @@
             <a:fld id="{B61BEF0D-F0BB-DE4B-95CE-6DB70DBA9567}" type="datetimeFigureOut">
               <a:rPr lang="en-US" dirty="0"/>
               <a:pPr/>
-              <a:t>11/16/2015</a:t>
+              <a:t>11/17/2015</a:t>
             </a:fld>
             <a:endParaRPr lang="en-US" dirty="0"/>
           </a:p>
@@ -4030,7 +4037,7 @@
             <a:fld id="{B61BEF0D-F0BB-DE4B-95CE-6DB70DBA9567}" type="datetimeFigureOut">
               <a:rPr lang="en-US" dirty="0"/>
               <a:pPr/>
-              <a:t>11/16/2015</a:t>
+              <a:t>11/17/2015</a:t>
             </a:fld>
             <a:endParaRPr lang="en-US" dirty="0"/>
           </a:p>
@@ -4281,7 +4288,7 @@
           <a:p>
             <a:fld id="{42A54C80-263E-416B-A8E0-580EDEADCBDC}" type="datetimeFigureOut">
               <a:rPr lang="en-US" dirty="0"/>
-              <a:t>11/16/2015</a:t>
+              <a:t>11/17/2015</a:t>
             </a:fld>
             <a:endParaRPr lang="en-US" dirty="0"/>
           </a:p>
@@ -4540,7 +4547,7 @@
             <a:fld id="{B61BEF0D-F0BB-DE4B-95CE-6DB70DBA9567}" type="datetimeFigureOut">
               <a:rPr lang="en-US" dirty="0"/>
               <a:pPr/>
-              <a:t>11/16/2015</a:t>
+              <a:t>11/17/2015</a:t>
             </a:fld>
             <a:endParaRPr lang="en-US" dirty="0"/>
           </a:p>
@@ -5280,7 +5287,7 @@
             <a:fld id="{B61BEF0D-F0BB-DE4B-95CE-6DB70DBA9567}" type="datetimeFigureOut">
               <a:rPr lang="en-US" dirty="0"/>
               <a:pPr/>
-              <a:t>11/16/2015</a:t>
+              <a:t>11/17/2015</a:t>
             </a:fld>
             <a:endParaRPr lang="en-US" dirty="0"/>
           </a:p>
@@ -5853,6 +5860,500 @@
           <a:chExt cx="0" cy="0"/>
         </a:xfrm>
       </p:grpSpPr>
+      <p:sp>
+        <p:nvSpPr>
+          <p:cNvPr id="2" name="1 Título"/>
+          <p:cNvSpPr>
+            <a:spLocks noGrp="1"/>
+          </p:cNvSpPr>
+          <p:nvPr>
+            <p:ph type="title"/>
+          </p:nvPr>
+        </p:nvSpPr>
+        <p:spPr/>
+        <p:txBody>
+          <a:bodyPr/>
+          <a:lstStyle/>
+          <a:p>
+            <a:r>
+              <a:rPr lang="es-MX" dirty="0" smtClean="0"/>
+              <a:t>STM time formula</a:t>
+            </a:r>
+            <a:endParaRPr lang="es-MX" dirty="0"/>
+          </a:p>
+        </p:txBody>
+      </p:sp>
+      <mc:AlternateContent xmlns:mc="http://schemas.openxmlformats.org/markup-compatibility/2006">
+        <mc:Choice xmlns:a14="http://schemas.microsoft.com/office/drawing/2010/main" Requires="a14">
+          <p:sp>
+            <p:nvSpPr>
+              <p:cNvPr id="3" name="2 CuadroTexto"/>
+              <p:cNvSpPr txBox="1"/>
+              <p:nvPr/>
+            </p:nvSpPr>
+            <p:spPr>
+              <a:xfrm>
+                <a:off x="972355" y="2088463"/>
+                <a:ext cx="7386034" cy="925190"/>
+              </a:xfrm>
+              <a:prstGeom prst="rect">
+                <a:avLst/>
+              </a:prstGeom>
+              <a:noFill/>
+            </p:spPr>
+            <p:txBody>
+              <a:bodyPr wrap="square" rtlCol="0">
+                <a:spAutoFit/>
+              </a:bodyPr>
+              <a:lstStyle/>
+              <a:p>
+                <a14:m>
+                  <m:oMathPara xmlns:m="http://schemas.openxmlformats.org/officeDocument/2006/math">
+                    <m:oMathParaPr>
+                      <m:jc m:val="centerGroup"/>
+                    </m:oMathParaPr>
+                    <m:oMath xmlns:m="http://schemas.openxmlformats.org/officeDocument/2006/math">
+                      <m:r>
+                        <a:rPr lang="es-MX" b="0" i="1" smtClean="0">
+                          <a:latin typeface="Cambria Math"/>
+                        </a:rPr>
+                        <m:t>𝑇𝑖𝑚𝑒</m:t>
+                      </m:r>
+                      <m:r>
+                        <a:rPr lang="es-MX" b="0" i="1" smtClean="0">
+                          <a:latin typeface="Cambria Math"/>
+                        </a:rPr>
+                        <m:t> </m:t>
+                      </m:r>
+                      <m:r>
+                        <a:rPr lang="es-MX" b="0" i="1" smtClean="0">
+                          <a:latin typeface="Cambria Math"/>
+                        </a:rPr>
+                        <m:t>𝑉𝑎𝑙𝑢𝑒</m:t>
+                      </m:r>
+                      <m:r>
+                        <a:rPr lang="es-MX" b="0" i="1" smtClean="0">
+                          <a:latin typeface="Cambria Math"/>
+                        </a:rPr>
+                        <m:t>=</m:t>
+                      </m:r>
+                      <m:f>
+                        <m:fPr>
+                          <m:ctrlPr>
+                            <a:rPr lang="es-MX" b="0" i="1" smtClean="0">
+                              <a:latin typeface="Cambria Math"/>
+                            </a:rPr>
+                          </m:ctrlPr>
+                        </m:fPr>
+                        <m:num>
+                          <m:d>
+                            <m:dPr>
+                              <m:ctrlPr>
+                                <a:rPr lang="es-MX" b="0" i="1" smtClean="0">
+                                  <a:latin typeface="Cambria Math"/>
+                                </a:rPr>
+                              </m:ctrlPr>
+                            </m:dPr>
+                            <m:e>
+                              <m:r>
+                                <a:rPr lang="es-MX" b="0" i="1" smtClean="0">
+                                  <a:latin typeface="Cambria Math"/>
+                                </a:rPr>
+                                <m:t>𝑇𝑖𝑚𝑒</m:t>
+                              </m:r>
+                            </m:e>
+                          </m:d>
+                          <m:r>
+                            <a:rPr lang="es-MX" b="0" i="1" smtClean="0">
+                              <a:latin typeface="Cambria Math"/>
+                            </a:rPr>
+                            <m:t>∗</m:t>
+                          </m:r>
+                          <m:r>
+                            <a:rPr lang="es-MX" b="0" i="1" smtClean="0">
+                              <a:latin typeface="Cambria Math"/>
+                            </a:rPr>
+                            <m:t>𝐹𝑟𝑒𝑐</m:t>
+                          </m:r>
+                        </m:num>
+                        <m:den>
+                          <m:r>
+                            <a:rPr lang="es-MX" b="0" i="1" smtClean="0">
+                              <a:latin typeface="Cambria Math"/>
+                            </a:rPr>
+                            <m:t>𝑃𝑟𝑒𝑠𝑐𝑎𝑙𝑎𝑡𝑜𝑟</m:t>
+                          </m:r>
+                        </m:den>
+                      </m:f>
+                      <m:r>
+                        <a:rPr lang="es-MX" b="0" i="1" smtClean="0">
+                          <a:latin typeface="Cambria Math"/>
+                        </a:rPr>
+                        <m:t>=</m:t>
+                      </m:r>
+                      <m:f>
+                        <m:fPr>
+                          <m:ctrlPr>
+                            <a:rPr lang="es-MX" i="1" smtClean="0">
+                              <a:latin typeface="Cambria Math"/>
+                            </a:rPr>
+                          </m:ctrlPr>
+                        </m:fPr>
+                        <m:num>
+                          <m:d>
+                            <m:dPr>
+                              <m:ctrlPr>
+                                <a:rPr lang="es-MX" i="1">
+                                  <a:latin typeface="Cambria Math"/>
+                                </a:rPr>
+                              </m:ctrlPr>
+                            </m:dPr>
+                            <m:e>
+                              <m:r>
+                                <a:rPr lang="es-MX" i="1">
+                                  <a:latin typeface="Cambria Math"/>
+                                </a:rPr>
+                                <m:t>1</m:t>
+                              </m:r>
+                              <m:r>
+                                <a:rPr lang="es-MX" i="1">
+                                  <a:latin typeface="Cambria Math"/>
+                                </a:rPr>
+                                <m:t>𝑥</m:t>
+                              </m:r>
+                              <m:sSup>
+                                <m:sSupPr>
+                                  <m:ctrlPr>
+                                    <a:rPr lang="es-MX" i="1">
+                                      <a:latin typeface="Cambria Math"/>
+                                    </a:rPr>
+                                  </m:ctrlPr>
+                                </m:sSupPr>
+                                <m:e>
+                                  <m:r>
+                                    <a:rPr lang="es-MX" i="1">
+                                      <a:latin typeface="Cambria Math"/>
+                                    </a:rPr>
+                                    <m:t>10</m:t>
+                                  </m:r>
+                                </m:e>
+                                <m:sup>
+                                  <m:r>
+                                    <a:rPr lang="es-MX" b="0" i="1" smtClean="0">
+                                      <a:latin typeface="Cambria Math"/>
+                                    </a:rPr>
+                                    <m:t>−</m:t>
+                                  </m:r>
+                                  <m:r>
+                                    <a:rPr lang="es-MX" i="1">
+                                      <a:latin typeface="Cambria Math"/>
+                                    </a:rPr>
+                                    <m:t>3</m:t>
+                                  </m:r>
+                                </m:sup>
+                              </m:sSup>
+                            </m:e>
+                          </m:d>
+                          <m:r>
+                            <a:rPr lang="es-MX" i="1">
+                              <a:latin typeface="Cambria Math"/>
+                            </a:rPr>
+                            <m:t>∗</m:t>
+                          </m:r>
+                          <m:r>
+                            <a:rPr lang="es-MX" b="0" i="1" smtClean="0">
+                              <a:latin typeface="Cambria Math"/>
+                            </a:rPr>
+                            <m:t>64</m:t>
+                          </m:r>
+                          <m:r>
+                            <a:rPr lang="es-MX" b="0" i="1" smtClean="0">
+                              <a:latin typeface="Cambria Math"/>
+                            </a:rPr>
+                            <m:t>𝑀𝐻𝑧</m:t>
+                          </m:r>
+                        </m:num>
+                        <m:den>
+                          <m:r>
+                            <a:rPr lang="es-MX" b="0" i="1" smtClean="0">
+                              <a:latin typeface="Cambria Math"/>
+                            </a:rPr>
+                            <m:t>1</m:t>
+                          </m:r>
+                        </m:den>
+                      </m:f>
+                      <m:r>
+                        <a:rPr lang="es-MX" i="1">
+                          <a:latin typeface="Cambria Math"/>
+                        </a:rPr>
+                        <m:t>=</m:t>
+                      </m:r>
+                      <m:r>
+                        <a:rPr lang="es-MX" b="0" i="1" smtClean="0">
+                          <a:latin typeface="Cambria Math"/>
+                        </a:rPr>
+                        <m:t>64</m:t>
+                      </m:r>
+                      <m:r>
+                        <a:rPr lang="es-MX" b="0" i="1" smtClean="0">
+                          <a:latin typeface="Cambria Math"/>
+                        </a:rPr>
+                        <m:t>𝑥</m:t>
+                      </m:r>
+                      <m:sSup>
+                        <m:sSupPr>
+                          <m:ctrlPr>
+                            <a:rPr lang="es-MX" b="0" i="1" smtClean="0">
+                              <a:latin typeface="Cambria Math"/>
+                            </a:rPr>
+                          </m:ctrlPr>
+                        </m:sSupPr>
+                        <m:e>
+                          <m:r>
+                            <a:rPr lang="es-MX" b="0" i="1" smtClean="0">
+                              <a:latin typeface="Cambria Math"/>
+                            </a:rPr>
+                            <m:t>10</m:t>
+                          </m:r>
+                        </m:e>
+                        <m:sup>
+                          <m:r>
+                            <a:rPr lang="es-MX" b="0" i="1" smtClean="0">
+                              <a:latin typeface="Cambria Math"/>
+                            </a:rPr>
+                            <m:t>3</m:t>
+                          </m:r>
+                        </m:sup>
+                      </m:sSup>
+                    </m:oMath>
+                  </m:oMathPara>
+                </a14:m>
+                <a:endParaRPr lang="es-MX" dirty="0"/>
+              </a:p>
+              <a:p>
+                <a:endParaRPr lang="es-MX" dirty="0"/>
+              </a:p>
+            </p:txBody>
+          </p:sp>
+        </mc:Choice>
+        <mc:Fallback>
+          <p:sp>
+            <p:nvSpPr>
+              <p:cNvPr id="3" name="2 CuadroTexto"/>
+              <p:cNvSpPr txBox="1">
+                <a:spLocks noRot="1" noChangeAspect="1" noMove="1" noResize="1" noEditPoints="1" noAdjustHandles="1" noChangeArrowheads="1" noChangeShapeType="1" noTextEdit="1"/>
+              </p:cNvSpPr>
+              <p:nvPr/>
+            </p:nvSpPr>
+            <p:spPr>
+              <a:xfrm>
+                <a:off x="972355" y="2088463"/>
+                <a:ext cx="7386034" cy="925190"/>
+              </a:xfrm>
+              <a:prstGeom prst="rect">
+                <a:avLst/>
+              </a:prstGeom>
+              <a:blipFill rotWithShape="1">
+                <a:blip r:embed="rId2"/>
+                <a:stretch>
+                  <a:fillRect/>
+                </a:stretch>
+              </a:blipFill>
+            </p:spPr>
+            <p:txBody>
+              <a:bodyPr/>
+              <a:lstStyle/>
+              <a:p>
+                <a:r>
+                  <a:rPr lang="es-MX">
+                    <a:noFill/>
+                  </a:rPr>
+                  <a:t> </a:t>
+                </a:r>
+              </a:p>
+            </p:txBody>
+          </p:sp>
+        </mc:Fallback>
+      </mc:AlternateContent>
+      <mc:AlternateContent xmlns:mc="http://schemas.openxmlformats.org/markup-compatibility/2006">
+        <mc:Choice xmlns:a14="http://schemas.microsoft.com/office/drawing/2010/main" Requires="a14">
+          <p:sp>
+            <p:nvSpPr>
+              <p:cNvPr id="4" name="3 CuadroTexto"/>
+              <p:cNvSpPr txBox="1"/>
+              <p:nvPr/>
+            </p:nvSpPr>
+            <p:spPr>
+              <a:xfrm>
+                <a:off x="1511121" y="3288992"/>
+                <a:ext cx="7386034" cy="646331"/>
+              </a:xfrm>
+              <a:prstGeom prst="rect">
+                <a:avLst/>
+              </a:prstGeom>
+              <a:noFill/>
+            </p:spPr>
+            <p:txBody>
+              <a:bodyPr wrap="square" rtlCol="0">
+                <a:spAutoFit/>
+              </a:bodyPr>
+              <a:lstStyle/>
+              <a:p>
+                <a14:m>
+                  <m:oMath xmlns:m="http://schemas.openxmlformats.org/officeDocument/2006/math">
+                    <m:r>
+                      <m:rPr>
+                        <m:nor/>
+                      </m:rPr>
+                      <a:rPr lang="es-MX" dirty="0" smtClean="0"/>
+                      <m:t>DECIMAL</m:t>
+                    </m:r>
+                    <m:r>
+                      <a:rPr lang="es-MX" b="0" i="1" dirty="0" smtClean="0">
+                        <a:latin typeface="Cambria Math"/>
+                      </a:rPr>
+                      <m:t>=</m:t>
+                    </m:r>
+                    <m:r>
+                      <a:rPr lang="es-MX" b="0" i="1" smtClean="0">
+                        <a:latin typeface="Cambria Math"/>
+                      </a:rPr>
+                      <m:t>64</m:t>
+                    </m:r>
+                    <m:r>
+                      <a:rPr lang="es-MX" b="0" i="1" smtClean="0">
+                        <a:latin typeface="Cambria Math"/>
+                      </a:rPr>
+                      <m:t>𝑥</m:t>
+                    </m:r>
+                    <m:sSup>
+                      <m:sSupPr>
+                        <m:ctrlPr>
+                          <a:rPr lang="es-MX" b="0" i="1" smtClean="0">
+                            <a:latin typeface="Cambria Math"/>
+                          </a:rPr>
+                        </m:ctrlPr>
+                      </m:sSupPr>
+                      <m:e>
+                        <m:r>
+                          <a:rPr lang="es-MX" b="0" i="1" smtClean="0">
+                            <a:latin typeface="Cambria Math"/>
+                          </a:rPr>
+                          <m:t>10</m:t>
+                        </m:r>
+                      </m:e>
+                      <m:sup>
+                        <m:r>
+                          <a:rPr lang="es-MX" b="0" i="1" smtClean="0">
+                            <a:latin typeface="Cambria Math"/>
+                          </a:rPr>
+                          <m:t>3</m:t>
+                        </m:r>
+                      </m:sup>
+                    </m:sSup>
+                    <m:r>
+                      <a:rPr lang="es-MX" b="0" i="1" smtClean="0">
+                        <a:latin typeface="Cambria Math"/>
+                      </a:rPr>
+                      <m:t>   </m:t>
+                    </m:r>
+                    <m:r>
+                      <a:rPr lang="es-MX" b="0" i="0" smtClean="0">
+                        <a:latin typeface="Cambria Math"/>
+                      </a:rPr>
+                      <m:t>−−→    </m:t>
+                    </m:r>
+                  </m:oMath>
+                </a14:m>
+                <a:r>
+                  <a:rPr lang="es-MX" u="sng" dirty="0" smtClean="0"/>
+                  <a:t>HEX =</a:t>
+                </a:r>
+                <a:r>
+                  <a:rPr lang="es-MX" u="sng" dirty="0"/>
+                  <a:t> </a:t>
+                </a:r>
+                <a:r>
+                  <a:rPr lang="es-MX" u="sng" dirty="0" smtClean="0"/>
+                  <a:t>0x0000FA00</a:t>
+                </a:r>
+                <a:endParaRPr lang="es-MX" u="sng" dirty="0"/>
+              </a:p>
+              <a:p>
+                <a:endParaRPr lang="es-MX" dirty="0"/>
+              </a:p>
+            </p:txBody>
+          </p:sp>
+        </mc:Choice>
+        <mc:Fallback>
+          <p:sp>
+            <p:nvSpPr>
+              <p:cNvPr id="4" name="3 CuadroTexto"/>
+              <p:cNvSpPr txBox="1">
+                <a:spLocks noRot="1" noChangeAspect="1" noMove="1" noResize="1" noEditPoints="1" noAdjustHandles="1" noChangeArrowheads="1" noChangeShapeType="1" noTextEdit="1"/>
+              </p:cNvSpPr>
+              <p:nvPr/>
+            </p:nvSpPr>
+            <p:spPr>
+              <a:xfrm>
+                <a:off x="1511121" y="3288992"/>
+                <a:ext cx="7386034" cy="646331"/>
+              </a:xfrm>
+              <a:prstGeom prst="rect">
+                <a:avLst/>
+              </a:prstGeom>
+              <a:blipFill rotWithShape="1">
+                <a:blip r:embed="rId3"/>
+                <a:stretch>
+                  <a:fillRect t="-5660"/>
+                </a:stretch>
+              </a:blipFill>
+            </p:spPr>
+            <p:txBody>
+              <a:bodyPr/>
+              <a:lstStyle/>
+              <a:p>
+                <a:r>
+                  <a:rPr lang="es-MX">
+                    <a:noFill/>
+                  </a:rPr>
+                  <a:t> </a:t>
+                </a:r>
+              </a:p>
+            </p:txBody>
+          </p:sp>
+        </mc:Fallback>
+      </mc:AlternateContent>
+    </p:spTree>
+    <p:extLst>
+      <p:ext uri="{BB962C8B-B14F-4D97-AF65-F5344CB8AC3E}">
+        <p14:creationId xmlns:p14="http://schemas.microsoft.com/office/powerpoint/2010/main" val="310117466"/>
+      </p:ext>
+    </p:extLst>
+  </p:cSld>
+  <p:clrMapOvr>
+    <a:masterClrMapping/>
+  </p:clrMapOvr>
+</p:sld>
+</file>
+
+<file path=ppt/slides/slide11.xml><?xml version="1.0" encoding="utf-8"?>
+<p:sld xmlns:a="http://schemas.openxmlformats.org/drawingml/2006/main" xmlns:r="http://schemas.openxmlformats.org/officeDocument/2006/relationships" xmlns:p="http://schemas.openxmlformats.org/presentationml/2006/main">
+  <p:cSld>
+    <p:spTree>
+      <p:nvGrpSpPr>
+        <p:cNvPr id="1" name=""/>
+        <p:cNvGrpSpPr/>
+        <p:nvPr/>
+      </p:nvGrpSpPr>
+      <p:grpSpPr>
+        <a:xfrm>
+          <a:off x="0" y="0"/>
+          <a:ext cx="0" cy="0"/>
+          <a:chOff x="0" y="0"/>
+          <a:chExt cx="0" cy="0"/>
+        </a:xfrm>
+      </p:grpSpPr>
       <p:graphicFrame>
         <p:nvGraphicFramePr>
           <p:cNvPr id="3" name="Tabla 2"/>
@@ -6339,7 +6840,7 @@
 </p:sld>
 </file>
 
-<file path=ppt/slides/slide11.xml><?xml version="1.0" encoding="utf-8"?>
+<file path=ppt/slides/slide12.xml><?xml version="1.0" encoding="utf-8"?>
 <p:sld xmlns:a="http://schemas.openxmlformats.org/drawingml/2006/main" xmlns:r="http://schemas.openxmlformats.org/officeDocument/2006/relationships" xmlns:p="http://schemas.openxmlformats.org/presentationml/2006/main">
   <p:cSld>
     <p:spTree>
@@ -7160,7 +7661,7 @@
 </p:sld>
 </file>
 
-<file path=ppt/slides/slide12.xml><?xml version="1.0" encoding="utf-8"?>
+<file path=ppt/slides/slide13.xml><?xml version="1.0" encoding="utf-8"?>
 <p:sld xmlns:a="http://schemas.openxmlformats.org/drawingml/2006/main" xmlns:r="http://schemas.openxmlformats.org/officeDocument/2006/relationships" xmlns:p="http://schemas.openxmlformats.org/presentationml/2006/main">
   <p:cSld>
     <p:spTree>
@@ -7591,7 +8092,7 @@
 </p:sld>
 </file>
 
-<file path=ppt/slides/slide13.xml><?xml version="1.0" encoding="utf-8"?>
+<file path=ppt/slides/slide14.xml><?xml version="1.0" encoding="utf-8"?>
 <p:sld xmlns:a="http://schemas.openxmlformats.org/drawingml/2006/main" xmlns:r="http://schemas.openxmlformats.org/officeDocument/2006/relationships" xmlns:p="http://schemas.openxmlformats.org/presentationml/2006/main">
   <p:cSld>
     <p:spTree>
@@ -8530,7 +9031,7 @@
 </p:sld>
 </file>
 
-<file path=ppt/slides/slide14.xml><?xml version="1.0" encoding="utf-8"?>
+<file path=ppt/slides/slide15.xml><?xml version="1.0" encoding="utf-8"?>
 <p:sld xmlns:a="http://schemas.openxmlformats.org/drawingml/2006/main" xmlns:r="http://schemas.openxmlformats.org/officeDocument/2006/relationships" xmlns:p="http://schemas.openxmlformats.org/presentationml/2006/main">
   <p:cSld>
     <p:spTree>
@@ -9067,7 +9568,7 @@
 </p:sld>
 </file>
 
-<file path=ppt/slides/slide15.xml><?xml version="1.0" encoding="utf-8"?>
+<file path=ppt/slides/slide16.xml><?xml version="1.0" encoding="utf-8"?>
 <p:sld xmlns:a="http://schemas.openxmlformats.org/drawingml/2006/main" xmlns:r="http://schemas.openxmlformats.org/officeDocument/2006/relationships" xmlns:p="http://schemas.openxmlformats.org/presentationml/2006/main">
   <p:cSld>
     <p:spTree>
@@ -9598,7 +10099,7 @@
 </p:sld>
 </file>
 
-<file path=ppt/slides/slide16.xml><?xml version="1.0" encoding="utf-8"?>
+<file path=ppt/slides/slide17.xml><?xml version="1.0" encoding="utf-8"?>
 <p:sld xmlns:a="http://schemas.openxmlformats.org/drawingml/2006/main" xmlns:r="http://schemas.openxmlformats.org/officeDocument/2006/relationships" xmlns:p="http://schemas.openxmlformats.org/presentationml/2006/main">
   <p:cSld>
     <p:spTree>
@@ -9624,14 +10125,14 @@
           <p:nvPr>
             <p:extLst>
               <p:ext uri="{D42A27DB-BD31-4B8C-83A1-F6EECF244321}">
-                <p14:modId xmlns:p14="http://schemas.microsoft.com/office/powerpoint/2010/main" val="3677822983"/>
+                <p14:modId xmlns:p14="http://schemas.microsoft.com/office/powerpoint/2010/main" val="3229074605"/>
               </p:ext>
             </p:extLst>
           </p:nvPr>
         </p:nvGraphicFramePr>
         <p:xfrm>
           <a:off x="587023" y="595488"/>
-          <a:ext cx="8128000" cy="2646680"/>
+          <a:ext cx="8128000" cy="2225040"/>
         </p:xfrm>
         <a:graphic>
           <a:graphicData uri="http://schemas.openxmlformats.org/drawingml/2006/table">
@@ -9650,25 +10151,78 @@
                     <a:lstStyle/>
                     <a:p>
                       <a:r>
+                        <a:rPr lang="es-MX" sz="1600" b="1" dirty="0" err="1" smtClean="0">
+                          <a:latin typeface="Arial" panose="020B0604020202020204" pitchFamily="34" charset="0"/>
+                          <a:cs typeface="Arial" panose="020B0604020202020204" pitchFamily="34" charset="0"/>
+                        </a:rPr>
+                        <a:t>Service</a:t>
+                      </a:r>
+                      <a:r>
+                        <a:rPr lang="es-MX" sz="1600" b="1" dirty="0" smtClean="0">
+                          <a:latin typeface="Arial" panose="020B0604020202020204" pitchFamily="34" charset="0"/>
+                          <a:cs typeface="Arial" panose="020B0604020202020204" pitchFamily="34" charset="0"/>
+                        </a:rPr>
+                        <a:t> </a:t>
+                      </a:r>
+                      <a:r>
+                        <a:rPr lang="es-MX" sz="1600" b="1" dirty="0" err="1" smtClean="0">
+                          <a:latin typeface="Arial" panose="020B0604020202020204" pitchFamily="34" charset="0"/>
+                          <a:cs typeface="Arial" panose="020B0604020202020204" pitchFamily="34" charset="0"/>
+                        </a:rPr>
+                        <a:t>name</a:t>
+                      </a:r>
+                      <a:r>
+                        <a:rPr lang="es-MX" sz="1600" b="1" dirty="0" smtClean="0">
+                          <a:latin typeface="Arial" panose="020B0604020202020204" pitchFamily="34" charset="0"/>
+                          <a:cs typeface="Arial" panose="020B0604020202020204" pitchFamily="34" charset="0"/>
+                        </a:rPr>
+                        <a:t>: </a:t>
+                      </a:r>
+                      <a:endParaRPr lang="es-MX" sz="1600" b="1" dirty="0">
+                        <a:latin typeface="Arial" panose="020B0604020202020204" pitchFamily="34" charset="0"/>
+                        <a:cs typeface="Arial" panose="020B0604020202020204" pitchFamily="34" charset="0"/>
+                      </a:endParaRPr>
+                    </a:p>
+                  </a:txBody>
+                  <a:tcPr/>
+                </a:tc>
+                <a:tc>
+                  <a:txBody>
+                    <a:bodyPr/>
+                    <a:lstStyle/>
+                    <a:p>
+                      <a:r>
+                        <a:rPr lang="es-MX" sz="1600" b="1" kern="1200" dirty="0" err="1" smtClean="0">
+                          <a:solidFill>
+                            <a:schemeClr val="lt1"/>
+                          </a:solidFill>
+                          <a:latin typeface="Arial" pitchFamily="34" charset="0"/>
+                          <a:ea typeface="+mn-ea"/>
+                          <a:cs typeface="Arial" pitchFamily="34" charset="0"/>
+                        </a:rPr>
+                        <a:t>STM_config_clock</a:t>
+                      </a:r>
+                      <a:endParaRPr lang="es-MX" sz="1600" b="1" dirty="0">
+                        <a:latin typeface="Arial" panose="020B0604020202020204" pitchFamily="34" charset="0"/>
+                        <a:cs typeface="Arial" panose="020B0604020202020204" pitchFamily="34" charset="0"/>
+                      </a:endParaRPr>
+                    </a:p>
+                  </a:txBody>
+                  <a:tcPr/>
+                </a:tc>
+              </a:tr>
+              <a:tr h="370840">
+                <a:tc>
+                  <a:txBody>
+                    <a:bodyPr/>
+                    <a:lstStyle/>
+                    <a:p>
+                      <a:r>
                         <a:rPr lang="es-MX" sz="1400" b="0" dirty="0" err="1" smtClean="0">
                           <a:latin typeface="Arial" panose="020B0604020202020204" pitchFamily="34" charset="0"/>
                           <a:cs typeface="Arial" panose="020B0604020202020204" pitchFamily="34" charset="0"/>
                         </a:rPr>
-                        <a:t>Service</a:t>
-                      </a:r>
-                      <a:r>
-                        <a:rPr lang="es-MX" sz="1400" b="0" dirty="0" smtClean="0">
-                          <a:latin typeface="Arial" panose="020B0604020202020204" pitchFamily="34" charset="0"/>
-                          <a:cs typeface="Arial" panose="020B0604020202020204" pitchFamily="34" charset="0"/>
-                        </a:rPr>
-                        <a:t> </a:t>
-                      </a:r>
-                      <a:r>
-                        <a:rPr lang="es-MX" sz="1400" b="0" dirty="0" err="1" smtClean="0">
-                          <a:latin typeface="Arial" panose="020B0604020202020204" pitchFamily="34" charset="0"/>
-                          <a:cs typeface="Arial" panose="020B0604020202020204" pitchFamily="34" charset="0"/>
-                        </a:rPr>
-                        <a:t>name</a:t>
+                        <a:t>Syntax</a:t>
                       </a:r>
                       <a:r>
                         <a:rPr lang="es-MX" sz="1400" b="0" dirty="0" smtClean="0">
@@ -9691,80 +10245,27 @@
                     <a:lstStyle/>
                     <a:p>
                       <a:r>
-                        <a:rPr lang="es-MX" sz="1800" b="1" kern="1200" dirty="0" err="1" smtClean="0">
-                          <a:solidFill>
-                            <a:schemeClr val="lt1"/>
-                          </a:solidFill>
-                          <a:latin typeface="+mn-lt"/>
-                          <a:ea typeface="+mn-ea"/>
-                          <a:cs typeface="+mn-cs"/>
-                        </a:rPr>
-                        <a:t>STM_config_clock</a:t>
-                      </a:r>
-                      <a:endParaRPr lang="es-MX" sz="1400" b="0" dirty="0">
-                        <a:latin typeface="Arial" panose="020B0604020202020204" pitchFamily="34" charset="0"/>
-                        <a:cs typeface="Arial" panose="020B0604020202020204" pitchFamily="34" charset="0"/>
-                      </a:endParaRPr>
-                    </a:p>
-                  </a:txBody>
-                  <a:tcPr/>
-                </a:tc>
-              </a:tr>
-              <a:tr h="370840">
-                <a:tc>
-                  <a:txBody>
-                    <a:bodyPr/>
-                    <a:lstStyle/>
-                    <a:p>
-                      <a:r>
                         <a:rPr lang="es-MX" sz="1400" b="0" dirty="0" err="1" smtClean="0">
                           <a:latin typeface="Arial" panose="020B0604020202020204" pitchFamily="34" charset="0"/>
                           <a:cs typeface="Arial" panose="020B0604020202020204" pitchFamily="34" charset="0"/>
                         </a:rPr>
-                        <a:t>Syntax</a:t>
+                        <a:t>Void</a:t>
                       </a:r>
                       <a:r>
                         <a:rPr lang="es-MX" sz="1400" b="0" dirty="0" smtClean="0">
                           <a:latin typeface="Arial" panose="020B0604020202020204" pitchFamily="34" charset="0"/>
                           <a:cs typeface="Arial" panose="020B0604020202020204" pitchFamily="34" charset="0"/>
                         </a:rPr>
-                        <a:t>: </a:t>
-                      </a:r>
-                      <a:endParaRPr lang="es-MX" sz="1400" b="0" dirty="0">
-                        <a:latin typeface="Arial" panose="020B0604020202020204" pitchFamily="34" charset="0"/>
-                        <a:cs typeface="Arial" panose="020B0604020202020204" pitchFamily="34" charset="0"/>
-                      </a:endParaRPr>
-                    </a:p>
-                  </a:txBody>
-                  <a:tcPr/>
-                </a:tc>
-                <a:tc>
-                  <a:txBody>
-                    <a:bodyPr/>
-                    <a:lstStyle/>
-                    <a:p>
-                      <a:r>
-                        <a:rPr lang="es-MX" sz="1400" b="0" dirty="0" err="1" smtClean="0">
-                          <a:latin typeface="Arial" panose="020B0604020202020204" pitchFamily="34" charset="0"/>
-                          <a:cs typeface="Arial" panose="020B0604020202020204" pitchFamily="34" charset="0"/>
-                        </a:rPr>
-                        <a:t>Void</a:t>
-                      </a:r>
-                      <a:r>
-                        <a:rPr lang="es-MX" sz="1400" b="0" dirty="0" smtClean="0">
-                          <a:latin typeface="Arial" panose="020B0604020202020204" pitchFamily="34" charset="0"/>
-                          <a:cs typeface="Arial" panose="020B0604020202020204" pitchFamily="34" charset="0"/>
-                        </a:rPr>
                         <a:t> </a:t>
                       </a:r>
                       <a:r>
-                        <a:rPr lang="es-MX" sz="1800" b="1" kern="1200" dirty="0" err="1" smtClean="0">
+                        <a:rPr lang="es-MX" sz="1400" b="1" i="1" kern="1200" dirty="0" err="1" smtClean="0">
                           <a:solidFill>
                             <a:schemeClr val="dk1"/>
                           </a:solidFill>
-                          <a:latin typeface="+mn-lt"/>
+                          <a:latin typeface="Arial" pitchFamily="34" charset="0"/>
                           <a:ea typeface="+mn-ea"/>
-                          <a:cs typeface="+mn-cs"/>
+                          <a:cs typeface="Arial" pitchFamily="34" charset="0"/>
                         </a:rPr>
                         <a:t>STM_config_clock</a:t>
                       </a:r>
@@ -9773,9 +10274,9 @@
                           <a:solidFill>
                             <a:schemeClr val="dk1"/>
                           </a:solidFill>
-                          <a:latin typeface="+mn-lt"/>
+                          <a:latin typeface="Arial" pitchFamily="34" charset="0"/>
                           <a:ea typeface="+mn-ea"/>
-                          <a:cs typeface="+mn-cs"/>
+                          <a:cs typeface="Arial" pitchFamily="34" charset="0"/>
                         </a:rPr>
                         <a:t> </a:t>
                       </a:r>
@@ -9786,8 +10287,6 @@
                         </a:rPr>
                         <a:t>(</a:t>
                       </a:r>
-                    </a:p>
-                    <a:p>
                       <a:r>
                         <a:rPr lang="es-MX" sz="1400" b="0" dirty="0" err="1" smtClean="0">
                           <a:latin typeface="Arial" panose="020B0604020202020204" pitchFamily="34" charset="0"/>
@@ -9795,12 +10294,6 @@
                         </a:rPr>
                         <a:t>Void</a:t>
                       </a:r>
-                      <a:endParaRPr lang="es-MX" sz="1400" b="0" dirty="0" smtClean="0">
-                        <a:latin typeface="Arial" panose="020B0604020202020204" pitchFamily="34" charset="0"/>
-                        <a:cs typeface="Arial" panose="020B0604020202020204" pitchFamily="34" charset="0"/>
-                      </a:endParaRPr>
-                    </a:p>
-                    <a:p>
                       <a:r>
                         <a:rPr lang="es-MX" sz="1400" b="0" dirty="0" smtClean="0">
                           <a:latin typeface="Arial" panose="020B0604020202020204" pitchFamily="34" charset="0"/>
@@ -10075,14 +10568,14 @@
           <p:nvPr>
             <p:extLst>
               <p:ext uri="{D42A27DB-BD31-4B8C-83A1-F6EECF244321}">
-                <p14:modId xmlns:p14="http://schemas.microsoft.com/office/powerpoint/2010/main" val="2332838704"/>
+                <p14:modId xmlns:p14="http://schemas.microsoft.com/office/powerpoint/2010/main" val="943731530"/>
               </p:ext>
             </p:extLst>
           </p:nvPr>
         </p:nvGraphicFramePr>
         <p:xfrm>
           <a:off x="587023" y="3603977"/>
-          <a:ext cx="8128000" cy="2585720"/>
+          <a:ext cx="8128000" cy="2225040"/>
         </p:xfrm>
         <a:graphic>
           <a:graphicData uri="http://schemas.openxmlformats.org/drawingml/2006/table">
@@ -10101,25 +10594,78 @@
                     <a:lstStyle/>
                     <a:p>
                       <a:r>
+                        <a:rPr lang="es-MX" sz="1600" b="1" dirty="0" err="1" smtClean="0">
+                          <a:latin typeface="Arial" panose="020B0604020202020204" pitchFamily="34" charset="0"/>
+                          <a:cs typeface="Arial" panose="020B0604020202020204" pitchFamily="34" charset="0"/>
+                        </a:rPr>
+                        <a:t>Service</a:t>
+                      </a:r>
+                      <a:r>
+                        <a:rPr lang="es-MX" sz="1600" b="1" dirty="0" smtClean="0">
+                          <a:latin typeface="Arial" panose="020B0604020202020204" pitchFamily="34" charset="0"/>
+                          <a:cs typeface="Arial" panose="020B0604020202020204" pitchFamily="34" charset="0"/>
+                        </a:rPr>
+                        <a:t> </a:t>
+                      </a:r>
+                      <a:r>
+                        <a:rPr lang="es-MX" sz="1600" b="1" dirty="0" err="1" smtClean="0">
+                          <a:latin typeface="Arial" panose="020B0604020202020204" pitchFamily="34" charset="0"/>
+                          <a:cs typeface="Arial" panose="020B0604020202020204" pitchFamily="34" charset="0"/>
+                        </a:rPr>
+                        <a:t>name</a:t>
+                      </a:r>
+                      <a:r>
+                        <a:rPr lang="es-MX" sz="1600" b="1" dirty="0" smtClean="0">
+                          <a:latin typeface="Arial" panose="020B0604020202020204" pitchFamily="34" charset="0"/>
+                          <a:cs typeface="Arial" panose="020B0604020202020204" pitchFamily="34" charset="0"/>
+                        </a:rPr>
+                        <a:t>: </a:t>
+                      </a:r>
+                      <a:endParaRPr lang="es-MX" sz="1600" b="1" dirty="0">
+                        <a:latin typeface="Arial" panose="020B0604020202020204" pitchFamily="34" charset="0"/>
+                        <a:cs typeface="Arial" panose="020B0604020202020204" pitchFamily="34" charset="0"/>
+                      </a:endParaRPr>
+                    </a:p>
+                  </a:txBody>
+                  <a:tcPr/>
+                </a:tc>
+                <a:tc>
+                  <a:txBody>
+                    <a:bodyPr/>
+                    <a:lstStyle/>
+                    <a:p>
+                      <a:r>
+                        <a:rPr lang="es-MX" sz="1600" b="1" kern="1200" dirty="0" err="1" smtClean="0">
+                          <a:solidFill>
+                            <a:schemeClr val="lt1"/>
+                          </a:solidFill>
+                          <a:latin typeface="Arial" panose="020B0604020202020204" pitchFamily="34" charset="0"/>
+                          <a:ea typeface="+mn-ea"/>
+                          <a:cs typeface="Arial" panose="020B0604020202020204" pitchFamily="34" charset="0"/>
+                        </a:rPr>
+                        <a:t>function_time</a:t>
+                      </a:r>
+                      <a:endParaRPr lang="es-MX" sz="1600" b="1" dirty="0">
+                        <a:latin typeface="Arial" panose="020B0604020202020204" pitchFamily="34" charset="0"/>
+                        <a:cs typeface="Arial" panose="020B0604020202020204" pitchFamily="34" charset="0"/>
+                      </a:endParaRPr>
+                    </a:p>
+                  </a:txBody>
+                  <a:tcPr/>
+                </a:tc>
+              </a:tr>
+              <a:tr h="370840">
+                <a:tc>
+                  <a:txBody>
+                    <a:bodyPr/>
+                    <a:lstStyle/>
+                    <a:p>
+                      <a:r>
                         <a:rPr lang="es-MX" sz="1400" b="0" dirty="0" err="1" smtClean="0">
                           <a:latin typeface="Arial" panose="020B0604020202020204" pitchFamily="34" charset="0"/>
                           <a:cs typeface="Arial" panose="020B0604020202020204" pitchFamily="34" charset="0"/>
                         </a:rPr>
-                        <a:t>Service</a:t>
-                      </a:r>
-                      <a:r>
-                        <a:rPr lang="es-MX" sz="1400" b="0" dirty="0" smtClean="0">
-                          <a:latin typeface="Arial" panose="020B0604020202020204" pitchFamily="34" charset="0"/>
-                          <a:cs typeface="Arial" panose="020B0604020202020204" pitchFamily="34" charset="0"/>
-                        </a:rPr>
-                        <a:t> </a:t>
-                      </a:r>
-                      <a:r>
-                        <a:rPr lang="es-MX" sz="1400" b="0" dirty="0" err="1" smtClean="0">
-                          <a:latin typeface="Arial" panose="020B0604020202020204" pitchFamily="34" charset="0"/>
-                          <a:cs typeface="Arial" panose="020B0604020202020204" pitchFamily="34" charset="0"/>
-                        </a:rPr>
-                        <a:t>name</a:t>
+                        <a:t>Syntax</a:t>
                       </a:r>
                       <a:r>
                         <a:rPr lang="es-MX" sz="1400" b="0" dirty="0" smtClean="0">
@@ -10142,74 +10688,21 @@
                     <a:lstStyle/>
                     <a:p>
                       <a:r>
-                        <a:rPr lang="es-MX" sz="1400" b="0" kern="1200" dirty="0" err="1" smtClean="0">
-                          <a:solidFill>
-                            <a:schemeClr val="lt1"/>
-                          </a:solidFill>
-                          <a:latin typeface="Arial" panose="020B0604020202020204" pitchFamily="34" charset="0"/>
-                          <a:ea typeface="+mn-ea"/>
-                          <a:cs typeface="Arial" panose="020B0604020202020204" pitchFamily="34" charset="0"/>
-                        </a:rPr>
-                        <a:t>function_time</a:t>
-                      </a:r>
-                      <a:endParaRPr lang="es-MX" sz="1400" b="0" dirty="0">
-                        <a:latin typeface="Arial" panose="020B0604020202020204" pitchFamily="34" charset="0"/>
-                        <a:cs typeface="Arial" panose="020B0604020202020204" pitchFamily="34" charset="0"/>
-                      </a:endParaRPr>
-                    </a:p>
-                  </a:txBody>
-                  <a:tcPr/>
-                </a:tc>
-              </a:tr>
-              <a:tr h="370840">
-                <a:tc>
-                  <a:txBody>
-                    <a:bodyPr/>
-                    <a:lstStyle/>
-                    <a:p>
-                      <a:r>
                         <a:rPr lang="es-MX" sz="1400" b="0" dirty="0" err="1" smtClean="0">
                           <a:latin typeface="Arial" panose="020B0604020202020204" pitchFamily="34" charset="0"/>
                           <a:cs typeface="Arial" panose="020B0604020202020204" pitchFamily="34" charset="0"/>
                         </a:rPr>
-                        <a:t>Syntax</a:t>
+                        <a:t>Void</a:t>
                       </a:r>
                       <a:r>
                         <a:rPr lang="es-MX" sz="1400" b="0" dirty="0" smtClean="0">
                           <a:latin typeface="Arial" panose="020B0604020202020204" pitchFamily="34" charset="0"/>
                           <a:cs typeface="Arial" panose="020B0604020202020204" pitchFamily="34" charset="0"/>
                         </a:rPr>
-                        <a:t>: </a:t>
-                      </a:r>
-                      <a:endParaRPr lang="es-MX" sz="1400" b="0" dirty="0">
-                        <a:latin typeface="Arial" panose="020B0604020202020204" pitchFamily="34" charset="0"/>
-                        <a:cs typeface="Arial" panose="020B0604020202020204" pitchFamily="34" charset="0"/>
-                      </a:endParaRPr>
-                    </a:p>
-                  </a:txBody>
-                  <a:tcPr/>
-                </a:tc>
-                <a:tc>
-                  <a:txBody>
-                    <a:bodyPr/>
-                    <a:lstStyle/>
-                    <a:p>
-                      <a:r>
-                        <a:rPr lang="es-MX" sz="1400" b="0" dirty="0" err="1" smtClean="0">
-                          <a:latin typeface="Arial" panose="020B0604020202020204" pitchFamily="34" charset="0"/>
-                          <a:cs typeface="Arial" panose="020B0604020202020204" pitchFamily="34" charset="0"/>
-                        </a:rPr>
-                        <a:t>Void</a:t>
-                      </a:r>
-                      <a:r>
-                        <a:rPr lang="es-MX" sz="1400" b="0" dirty="0" smtClean="0">
-                          <a:latin typeface="Arial" panose="020B0604020202020204" pitchFamily="34" charset="0"/>
-                          <a:cs typeface="Arial" panose="020B0604020202020204" pitchFamily="34" charset="0"/>
-                        </a:rPr>
                         <a:t> </a:t>
                       </a:r>
                       <a:r>
-                        <a:rPr lang="es-MX" sz="1400" b="0" kern="1200" dirty="0" err="1" smtClean="0">
+                        <a:rPr lang="es-MX" sz="1400" b="1" i="1" kern="1200" dirty="0" err="1" smtClean="0">
                           <a:solidFill>
                             <a:schemeClr val="dk1"/>
                           </a:solidFill>
@@ -10237,8 +10730,6 @@
                         </a:rPr>
                         <a:t>(</a:t>
                       </a:r>
-                    </a:p>
-                    <a:p>
                       <a:r>
                         <a:rPr lang="es-MX" sz="1400" b="0" dirty="0" err="1" smtClean="0">
                           <a:latin typeface="Arial" panose="020B0604020202020204" pitchFamily="34" charset="0"/>
@@ -10246,12 +10737,6 @@
                         </a:rPr>
                         <a:t>Void</a:t>
                       </a:r>
-                      <a:endParaRPr lang="es-MX" sz="1400" b="0" dirty="0" smtClean="0">
-                        <a:latin typeface="Arial" panose="020B0604020202020204" pitchFamily="34" charset="0"/>
-                        <a:cs typeface="Arial" panose="020B0604020202020204" pitchFamily="34" charset="0"/>
-                      </a:endParaRPr>
-                    </a:p>
-                    <a:p>
                       <a:r>
                         <a:rPr lang="es-MX" sz="1400" b="0" dirty="0" smtClean="0">
                           <a:latin typeface="Arial" panose="020B0604020202020204" pitchFamily="34" charset="0"/>
@@ -10527,7 +11012,7 @@
 </p:sld>
 </file>
 
-<file path=ppt/slides/slide17.xml><?xml version="1.0" encoding="utf-8"?>
+<file path=ppt/slides/slide18.xml><?xml version="1.0" encoding="utf-8"?>
 <p:sld xmlns:a="http://schemas.openxmlformats.org/drawingml/2006/main" xmlns:r="http://schemas.openxmlformats.org/officeDocument/2006/relationships" xmlns:p="http://schemas.openxmlformats.org/presentationml/2006/main">
   <p:cSld>
     <p:spTree>
@@ -10553,14 +11038,14 @@
           <p:nvPr>
             <p:extLst>
               <p:ext uri="{D42A27DB-BD31-4B8C-83A1-F6EECF244321}">
-                <p14:modId xmlns:p14="http://schemas.microsoft.com/office/powerpoint/2010/main" val="1789730611"/>
+                <p14:modId xmlns:p14="http://schemas.microsoft.com/office/powerpoint/2010/main" val="329593436"/>
               </p:ext>
             </p:extLst>
           </p:nvPr>
         </p:nvGraphicFramePr>
         <p:xfrm>
           <a:off x="587021" y="1981200"/>
-          <a:ext cx="8127999" cy="1986280"/>
+          <a:ext cx="8127999" cy="1955800"/>
         </p:xfrm>
         <a:graphic>
           <a:graphicData uri="http://schemas.openxmlformats.org/drawingml/2006/table">
@@ -10580,20 +11065,20 @@
                     <a:lstStyle/>
                     <a:p>
                       <a:r>
-                        <a:rPr lang="es-MX" sz="1400" b="0" dirty="0" err="1" smtClean="0">
+                        <a:rPr lang="es-MX" sz="1600" b="1" dirty="0" err="1" smtClean="0">
                           <a:latin typeface="Arial" panose="020B0604020202020204" pitchFamily="34" charset="0"/>
                           <a:cs typeface="Arial" panose="020B0604020202020204" pitchFamily="34" charset="0"/>
                         </a:rPr>
                         <a:t>Name</a:t>
                       </a:r>
                       <a:r>
-                        <a:rPr lang="es-MX" sz="1400" b="0" dirty="0" smtClean="0">
+                        <a:rPr lang="es-MX" sz="1600" b="1" dirty="0" smtClean="0">
                           <a:latin typeface="Arial" panose="020B0604020202020204" pitchFamily="34" charset="0"/>
                           <a:cs typeface="Arial" panose="020B0604020202020204" pitchFamily="34" charset="0"/>
                         </a:rPr>
                         <a:t>:</a:t>
                       </a:r>
-                      <a:endParaRPr lang="es-MX" sz="1400" b="0" dirty="0">
+                      <a:endParaRPr lang="es-MX" sz="1600" b="1" dirty="0">
                         <a:latin typeface="Arial" panose="020B0604020202020204" pitchFamily="34" charset="0"/>
                         <a:cs typeface="Arial" panose="020B0604020202020204" pitchFamily="34" charset="0"/>
                       </a:endParaRPr>
@@ -10607,17 +11092,17 @@
                     <a:lstStyle/>
                     <a:p>
                       <a:r>
-                        <a:rPr lang="es-MX" sz="1800" b="1" kern="1200" dirty="0" smtClean="0">
+                        <a:rPr lang="es-MX" sz="1600" b="1" kern="1200" dirty="0" smtClean="0">
                           <a:solidFill>
                             <a:schemeClr val="lt1"/>
                           </a:solidFill>
-                          <a:latin typeface="+mn-lt"/>
+                          <a:latin typeface="Arial" pitchFamily="34" charset="0"/>
                           <a:ea typeface="+mn-ea"/>
-                          <a:cs typeface="+mn-cs"/>
-                        </a:rPr>
-                        <a:t>tareas</a:t>
-                      </a:r>
-                      <a:endParaRPr lang="es-MX" sz="1400" b="0" dirty="0">
+                          <a:cs typeface="Arial" pitchFamily="34" charset="0"/>
+                        </a:rPr>
+                        <a:t>Tareas</a:t>
+                      </a:r>
+                      <a:endParaRPr lang="es-MX" sz="1600" b="0" dirty="0">
                         <a:latin typeface="Arial" panose="020B0604020202020204" pitchFamily="34" charset="0"/>
                         <a:cs typeface="Arial" panose="020B0604020202020204" pitchFamily="34" charset="0"/>
                       </a:endParaRPr>
@@ -10939,6 +11424,192 @@
     <p:extLst>
       <p:ext uri="{BB962C8B-B14F-4D97-AF65-F5344CB8AC3E}">
         <p14:creationId xmlns:p14="http://schemas.microsoft.com/office/powerpoint/2010/main" val="2432682835"/>
+      </p:ext>
+    </p:extLst>
+  </p:cSld>
+  <p:clrMapOvr>
+    <a:masterClrMapping/>
+  </p:clrMapOvr>
+</p:sld>
+</file>
+
+<file path=ppt/slides/slide19.xml><?xml version="1.0" encoding="utf-8"?>
+<p:sld xmlns:a="http://schemas.openxmlformats.org/drawingml/2006/main" xmlns:r="http://schemas.openxmlformats.org/officeDocument/2006/relationships" xmlns:p="http://schemas.openxmlformats.org/presentationml/2006/main">
+  <p:cSld>
+    <p:spTree>
+      <p:nvGrpSpPr>
+        <p:cNvPr id="1" name=""/>
+        <p:cNvGrpSpPr/>
+        <p:nvPr/>
+      </p:nvGrpSpPr>
+      <p:grpSpPr>
+        <a:xfrm>
+          <a:off x="0" y="0"/>
+          <a:ext cx="0" cy="0"/>
+          <a:chOff x="0" y="0"/>
+          <a:chExt cx="0" cy="0"/>
+        </a:xfrm>
+      </p:grpSpPr>
+      <p:sp>
+        <p:nvSpPr>
+          <p:cNvPr id="2" name="1 Título"/>
+          <p:cNvSpPr>
+            <a:spLocks noGrp="1"/>
+          </p:cNvSpPr>
+          <p:nvPr>
+            <p:ph type="title"/>
+          </p:nvPr>
+        </p:nvSpPr>
+        <p:spPr>
+          <a:xfrm>
+            <a:off x="296354" y="197476"/>
+            <a:ext cx="8596668" cy="691166"/>
+          </a:xfrm>
+        </p:spPr>
+        <p:txBody>
+          <a:bodyPr/>
+          <a:lstStyle/>
+          <a:p>
+            <a:r>
+              <a:rPr lang="en-US" dirty="0" smtClean="0"/>
+              <a:t>Adding more functions to the scheduler</a:t>
+            </a:r>
+            <a:endParaRPr lang="en-US" dirty="0"/>
+          </a:p>
+        </p:txBody>
+      </p:sp>
+      <p:sp>
+        <p:nvSpPr>
+          <p:cNvPr id="3" name="Rectángulo 2"/>
+          <p:cNvSpPr/>
+          <p:nvPr/>
+        </p:nvSpPr>
+        <p:spPr>
+          <a:xfrm>
+            <a:off x="381119" y="1260698"/>
+            <a:ext cx="8840154" cy="1200329"/>
+          </a:xfrm>
+          <a:prstGeom prst="rect">
+            <a:avLst/>
+          </a:prstGeom>
+        </p:spPr>
+        <p:txBody>
+          <a:bodyPr wrap="square">
+            <a:spAutoFit/>
+          </a:bodyPr>
+          <a:lstStyle/>
+          <a:p>
+            <a:pPr algn="just"/>
+            <a:r>
+              <a:rPr lang="en-US" dirty="0" smtClean="0"/>
+              <a:t>In order to add another task in the scheduler system, please follow  the next steps:</a:t>
+            </a:r>
+          </a:p>
+          <a:p>
+            <a:pPr marL="342900" indent="-342900" algn="just">
+              <a:buFont typeface="+mj-lt"/>
+              <a:buAutoNum type="arabicParenR"/>
+            </a:pPr>
+            <a:r>
+              <a:rPr lang="en-US" dirty="0" smtClean="0"/>
+              <a:t> In the file </a:t>
+            </a:r>
+            <a:r>
+              <a:rPr lang="en-US" dirty="0" err="1" smtClean="0"/>
+              <a:t>tasks.h</a:t>
+            </a:r>
+            <a:r>
+              <a:rPr lang="en-US" dirty="0" smtClean="0"/>
+              <a:t>, in the </a:t>
+            </a:r>
+            <a:r>
+              <a:rPr lang="en-US" b="1" i="1" dirty="0" err="1" smtClean="0"/>
+              <a:t>enum</a:t>
+            </a:r>
+            <a:r>
+              <a:rPr lang="en-US" dirty="0" smtClean="0"/>
+              <a:t> structure, write with the same format, the name of the next function. Is important not to modify </a:t>
+            </a:r>
+            <a:r>
+              <a:rPr lang="en-US" b="1" i="1" dirty="0" smtClean="0"/>
+              <a:t>E_ISK_TASK_NUM.</a:t>
+            </a:r>
+            <a:r>
+              <a:rPr lang="en-US" dirty="0" smtClean="0"/>
+              <a:t> Please refer to the next image:</a:t>
+            </a:r>
+            <a:endParaRPr lang="en-US" dirty="0"/>
+          </a:p>
+        </p:txBody>
+      </p:sp>
+      <p:pic>
+        <p:nvPicPr>
+          <p:cNvPr id="1027" name="Picture 3"/>
+          <p:cNvPicPr>
+            <a:picLocks noChangeAspect="1" noChangeArrowheads="1"/>
+          </p:cNvPicPr>
+          <p:nvPr/>
+        </p:nvPicPr>
+        <p:blipFill>
+          <a:blip r:embed="rId2">
+            <a:extLst>
+              <a:ext uri="{28A0092B-C50C-407E-A947-70E740481C1C}">
+                <a14:useLocalDpi xmlns:a14="http://schemas.microsoft.com/office/drawing/2010/main" val="0"/>
+              </a:ext>
+            </a:extLst>
+          </a:blip>
+          <a:srcRect/>
+          <a:stretch>
+            <a:fillRect/>
+          </a:stretch>
+        </p:blipFill>
+        <p:spPr bwMode="auto">
+          <a:xfrm>
+            <a:off x="588918" y="2461027"/>
+            <a:ext cx="7992605" cy="3294443"/>
+          </a:xfrm>
+          <a:prstGeom prst="rect">
+            <a:avLst/>
+          </a:prstGeom>
+          <a:noFill/>
+          <a:ln>
+            <a:noFill/>
+          </a:ln>
+          <a:effectLst/>
+          <a:extLst>
+            <a:ext uri="{909E8E84-426E-40DD-AFC4-6F175D3DCCD1}">
+              <a14:hiddenFill xmlns:a14="http://schemas.microsoft.com/office/drawing/2010/main">
+                <a:solidFill>
+                  <a:schemeClr val="accent1"/>
+                </a:solidFill>
+              </a14:hiddenFill>
+            </a:ext>
+            <a:ext uri="{91240B29-F687-4F45-9708-019B960494DF}">
+              <a14:hiddenLine xmlns:a14="http://schemas.microsoft.com/office/drawing/2010/main" w="9525">
+                <a:solidFill>
+                  <a:schemeClr val="tx1"/>
+                </a:solidFill>
+                <a:miter lim="800000"/>
+                <a:headEnd/>
+                <a:tailEnd/>
+              </a14:hiddenLine>
+            </a:ext>
+            <a:ext uri="{AF507438-7753-43E0-B8FC-AC1667EBCBE1}">
+              <a14:hiddenEffects xmlns:a14="http://schemas.microsoft.com/office/drawing/2010/main">
+                <a:effectLst>
+                  <a:outerShdw dist="35921" dir="2700000" algn="ctr" rotWithShape="0">
+                    <a:schemeClr val="bg2"/>
+                  </a:outerShdw>
+                </a:effectLst>
+              </a14:hiddenEffects>
+            </a:ext>
+          </a:extLst>
+        </p:spPr>
+      </p:pic>
+    </p:spTree>
+    <p:extLst>
+      <p:ext uri="{BB962C8B-B14F-4D97-AF65-F5344CB8AC3E}">
+        <p14:creationId xmlns:p14="http://schemas.microsoft.com/office/powerpoint/2010/main" val="2245260705"/>
       </p:ext>
     </p:extLst>
   </p:cSld>
@@ -10974,14 +11645,14 @@
           <p:nvPr>
             <p:extLst>
               <p:ext uri="{D42A27DB-BD31-4B8C-83A1-F6EECF244321}">
-                <p14:modId xmlns:p14="http://schemas.microsoft.com/office/powerpoint/2010/main" val="753577347"/>
+                <p14:modId xmlns:p14="http://schemas.microsoft.com/office/powerpoint/2010/main" val="869033090"/>
               </p:ext>
             </p:extLst>
           </p:nvPr>
         </p:nvGraphicFramePr>
         <p:xfrm>
-          <a:off x="1550988" y="2432939"/>
-          <a:ext cx="6851650" cy="1255714"/>
+          <a:off x="1709529" y="2055240"/>
+          <a:ext cx="6239217" cy="1597598"/>
         </p:xfrm>
         <a:graphic>
           <a:graphicData uri="http://schemas.openxmlformats.org/drawingml/2006/table">
@@ -10990,10 +11661,10 @@
                 <a:tableStyleId>{5C22544A-7EE6-4342-B048-85BDC9FD1C3A}</a:tableStyleId>
               </a:tblPr>
               <a:tblGrid>
-                <a:gridCol w="1712595"/>
-                <a:gridCol w="1712595"/>
-                <a:gridCol w="1713230"/>
-                <a:gridCol w="1713230"/>
+                <a:gridCol w="1091855"/>
+                <a:gridCol w="988736"/>
+                <a:gridCol w="2719298"/>
+                <a:gridCol w="1439328"/>
               </a:tblGrid>
               <a:tr h="0">
                 <a:tc gridSpan="4">
@@ -11062,124 +11733,6 @@
                     <a:bodyPr/>
                     <a:lstStyle/>
                     <a:p>
-                      <a:pPr>
-                        <a:lnSpc>
-                          <a:spcPct val="107000"/>
-                        </a:lnSpc>
-                        <a:spcAft>
-                          <a:spcPts val="0"/>
-                        </a:spcAft>
-                      </a:pPr>
-                      <a:r>
-                        <a:rPr lang="es-MX" sz="1100">
-                          <a:effectLst/>
-                        </a:rPr>
-                        <a:t>Versión índex</a:t>
-                      </a:r>
-                      <a:endParaRPr lang="es-MX" sz="1100">
-                        <a:effectLst/>
-                        <a:latin typeface="Calibri" panose="020F0502020204030204" pitchFamily="34" charset="0"/>
-                        <a:ea typeface="Calibri" panose="020F0502020204030204" pitchFamily="34" charset="0"/>
-                        <a:cs typeface="Times New Roman" panose="02020603050405020304" pitchFamily="18" charset="0"/>
-                      </a:endParaRPr>
-                    </a:p>
-                  </a:txBody>
-                  <a:tcPr marL="68580" marR="68580" marT="0" marB="0"/>
-                </a:tc>
-                <a:tc>
-                  <a:txBody>
-                    <a:bodyPr/>
-                    <a:lstStyle/>
-                    <a:p>
-                      <a:pPr>
-                        <a:lnSpc>
-                          <a:spcPct val="107000"/>
-                        </a:lnSpc>
-                        <a:spcAft>
-                          <a:spcPts val="0"/>
-                        </a:spcAft>
-                      </a:pPr>
-                      <a:r>
-                        <a:rPr lang="es-MX" sz="1100">
-                          <a:effectLst/>
-                        </a:rPr>
-                        <a:t>Date </a:t>
-                      </a:r>
-                      <a:endParaRPr lang="es-MX" sz="1100">
-                        <a:effectLst/>
-                        <a:latin typeface="Calibri" panose="020F0502020204030204" pitchFamily="34" charset="0"/>
-                        <a:ea typeface="Calibri" panose="020F0502020204030204" pitchFamily="34" charset="0"/>
-                        <a:cs typeface="Times New Roman" panose="02020603050405020304" pitchFamily="18" charset="0"/>
-                      </a:endParaRPr>
-                    </a:p>
-                  </a:txBody>
-                  <a:tcPr marL="68580" marR="68580" marT="0" marB="0"/>
-                </a:tc>
-                <a:tc>
-                  <a:txBody>
-                    <a:bodyPr/>
-                    <a:lstStyle/>
-                    <a:p>
-                      <a:pPr>
-                        <a:lnSpc>
-                          <a:spcPct val="107000"/>
-                        </a:lnSpc>
-                        <a:spcAft>
-                          <a:spcPts val="0"/>
-                        </a:spcAft>
-                      </a:pPr>
-                      <a:r>
-                        <a:rPr lang="es-MX" sz="1100">
-                          <a:effectLst/>
-                        </a:rPr>
-                        <a:t>Author</a:t>
-                      </a:r>
-                      <a:endParaRPr lang="es-MX" sz="1100">
-                        <a:effectLst/>
-                        <a:latin typeface="Calibri" panose="020F0502020204030204" pitchFamily="34" charset="0"/>
-                        <a:ea typeface="Calibri" panose="020F0502020204030204" pitchFamily="34" charset="0"/>
-                        <a:cs typeface="Times New Roman" panose="02020603050405020304" pitchFamily="18" charset="0"/>
-                      </a:endParaRPr>
-                    </a:p>
-                  </a:txBody>
-                  <a:tcPr marL="68580" marR="68580" marT="0" marB="0"/>
-                </a:tc>
-                <a:tc>
-                  <a:txBody>
-                    <a:bodyPr/>
-                    <a:lstStyle/>
-                    <a:p>
-                      <a:pPr>
-                        <a:lnSpc>
-                          <a:spcPct val="107000"/>
-                        </a:lnSpc>
-                        <a:spcAft>
-                          <a:spcPts val="0"/>
-                        </a:spcAft>
-                      </a:pPr>
-                      <a:r>
-                        <a:rPr lang="es-MX" sz="1100">
-                          <a:effectLst/>
-                        </a:rPr>
-                        <a:t>Description </a:t>
-                      </a:r>
-                      <a:endParaRPr lang="es-MX" sz="1100">
-                        <a:effectLst/>
-                        <a:latin typeface="Calibri" panose="020F0502020204030204" pitchFamily="34" charset="0"/>
-                        <a:ea typeface="Calibri" panose="020F0502020204030204" pitchFamily="34" charset="0"/>
-                        <a:cs typeface="Times New Roman" panose="02020603050405020304" pitchFamily="18" charset="0"/>
-                      </a:endParaRPr>
-                    </a:p>
-                  </a:txBody>
-                  <a:tcPr marL="68580" marR="68580" marT="0" marB="0"/>
-                </a:tc>
-              </a:tr>
-              <a:tr h="0">
-                <a:tc>
-                  <a:txBody>
-                    <a:bodyPr/>
-                    <a:lstStyle/>
-                    <a:p>
                       <a:pPr algn="ctr">
                         <a:lnSpc>
                           <a:spcPct val="107000"/>
@@ -11192,7 +11745,7 @@
                         <a:rPr lang="es-MX" sz="1100">
                           <a:effectLst/>
                         </a:rPr>
-                        <a:t>1.0</a:t>
+                        <a:t>Versión índex</a:t>
                       </a:r>
                       <a:endParaRPr lang="es-MX" sz="1100">
                         <a:effectLst/>
@@ -11218,18 +11771,12 @@
                         </a:spcAft>
                       </a:pPr>
                       <a:r>
-                        <a:rPr lang="es-MX" sz="1100" dirty="0">
+                        <a:rPr lang="es-MX" sz="1100">
                           <a:effectLst/>
                         </a:rPr>
-                        <a:t> </a:t>
-                      </a:r>
-                      <a:r>
-                        <a:rPr lang="es-MX" sz="1100" dirty="0" smtClean="0">
-                          <a:effectLst/>
-                        </a:rPr>
-                        <a:t>15/11/2015</a:t>
-                      </a:r>
-                      <a:endParaRPr lang="es-MX" sz="1100" dirty="0">
+                        <a:t>Date </a:t>
+                      </a:r>
+                      <a:endParaRPr lang="es-MX" sz="1100">
                         <a:effectLst/>
                         <a:latin typeface="Calibri" panose="020F0502020204030204" pitchFamily="34" charset="0"/>
                         <a:ea typeface="Calibri" panose="020F0502020204030204" pitchFamily="34" charset="0"/>
@@ -11253,12 +11800,12 @@
                         </a:spcAft>
                       </a:pPr>
                       <a:r>
-                        <a:rPr lang="es-MX" sz="1100" dirty="0">
+                        <a:rPr lang="es-MX" sz="1100">
                           <a:effectLst/>
                         </a:rPr>
-                        <a:t>Francisco Javier Quirarte Pelayo</a:t>
-                      </a:r>
-                      <a:endParaRPr lang="es-MX" sz="1100" dirty="0">
+                        <a:t>Author</a:t>
+                      </a:r>
+                      <a:endParaRPr lang="es-MX" sz="1100">
                         <a:effectLst/>
                         <a:latin typeface="Calibri" panose="020F0502020204030204" pitchFamily="34" charset="0"/>
                         <a:ea typeface="Calibri" panose="020F0502020204030204" pitchFamily="34" charset="0"/>
@@ -11282,12 +11829,27 @@
                         </a:spcAft>
                       </a:pPr>
                       <a:r>
-                        <a:rPr lang="es-MX" sz="1100" dirty="0">
+                        <a:rPr lang="es-MX" sz="1100">
                           <a:effectLst/>
                         </a:rPr>
-                        <a:t>First revisión of scheduler</a:t>
-                      </a:r>
-                    </a:p>
+                        <a:t>Description </a:t>
+                      </a:r>
+                      <a:endParaRPr lang="es-MX" sz="1100">
+                        <a:effectLst/>
+                        <a:latin typeface="Calibri" panose="020F0502020204030204" pitchFamily="34" charset="0"/>
+                        <a:ea typeface="Calibri" panose="020F0502020204030204" pitchFamily="34" charset="0"/>
+                        <a:cs typeface="Times New Roman" panose="02020603050405020304" pitchFamily="18" charset="0"/>
+                      </a:endParaRPr>
+                    </a:p>
+                  </a:txBody>
+                  <a:tcPr marL="68580" marR="68580" marT="0" marB="0"/>
+                </a:tc>
+              </a:tr>
+              <a:tr h="137015">
+                <a:tc>
+                  <a:txBody>
+                    <a:bodyPr/>
+                    <a:lstStyle/>
                     <a:p>
                       <a:pPr algn="ctr">
                         <a:lnSpc>
@@ -11297,28 +11859,10 @@
                           <a:spcPts val="0"/>
                         </a:spcAft>
                       </a:pPr>
-                      <a:r>
-                        <a:rPr lang="es-MX" sz="1100" dirty="0">
-                          <a:effectLst/>
-                        </a:rPr>
-                        <a:t> </a:t>
-                      </a:r>
-                      <a:endParaRPr lang="es-MX" sz="1100" dirty="0">
+                      <a:endParaRPr lang="es-MX" sz="1100" dirty="0" smtClean="0">
                         <a:effectLst/>
-                        <a:latin typeface="Calibri" panose="020F0502020204030204" pitchFamily="34" charset="0"/>
-                        <a:ea typeface="Calibri" panose="020F0502020204030204" pitchFamily="34" charset="0"/>
-                        <a:cs typeface="Times New Roman" panose="02020603050405020304" pitchFamily="18" charset="0"/>
                       </a:endParaRPr>
                     </a:p>
-                  </a:txBody>
-                  <a:tcPr marL="68580" marR="68580" marT="0" marB="0"/>
-                </a:tc>
-              </a:tr>
-              <a:tr h="0">
-                <a:tc>
-                  <a:txBody>
-                    <a:bodyPr/>
-                    <a:lstStyle/>
                     <a:p>
                       <a:pPr algn="ctr">
                         <a:lnSpc>
@@ -11329,12 +11873,12 @@
                         </a:spcAft>
                       </a:pPr>
                       <a:r>
-                        <a:rPr lang="es-MX" sz="1100">
+                        <a:rPr lang="es-MX" sz="1100" dirty="0" smtClean="0">
                           <a:effectLst/>
                         </a:rPr>
-                        <a:t> </a:t>
-                      </a:r>
-                      <a:endParaRPr lang="es-MX" sz="1100">
+                        <a:t>1.0</a:t>
+                      </a:r>
+                      <a:endParaRPr lang="es-MX" sz="1100" dirty="0">
                         <a:effectLst/>
                         <a:latin typeface="Calibri" panose="020F0502020204030204" pitchFamily="34" charset="0"/>
                         <a:ea typeface="Calibri" panose="020F0502020204030204" pitchFamily="34" charset="0"/>
@@ -11358,25 +11902,15 @@
                         </a:spcAft>
                       </a:pPr>
                       <a:r>
-                        <a:rPr lang="es-MX" sz="1100">
+                        <a:rPr lang="es-MX" sz="1100" dirty="0">
                           <a:effectLst/>
                         </a:rPr>
                         <a:t> </a:t>
                       </a:r>
-                      <a:endParaRPr lang="es-MX" sz="1100">
+                      <a:endParaRPr lang="es-MX" sz="1100" dirty="0" smtClean="0">
                         <a:effectLst/>
-                        <a:latin typeface="Calibri" panose="020F0502020204030204" pitchFamily="34" charset="0"/>
-                        <a:ea typeface="Calibri" panose="020F0502020204030204" pitchFamily="34" charset="0"/>
-                        <a:cs typeface="Times New Roman" panose="02020603050405020304" pitchFamily="18" charset="0"/>
                       </a:endParaRPr>
                     </a:p>
-                  </a:txBody>
-                  <a:tcPr marL="68580" marR="68580" marT="0" marB="0"/>
-                </a:tc>
-                <a:tc>
-                  <a:txBody>
-                    <a:bodyPr/>
-                    <a:lstStyle/>
                     <a:p>
                       <a:pPr algn="ctr">
                         <a:lnSpc>
@@ -11387,12 +11921,254 @@
                         </a:spcAft>
                       </a:pPr>
                       <a:r>
+                        <a:rPr lang="es-MX" sz="1100" dirty="0" smtClean="0">
+                          <a:effectLst/>
+                        </a:rPr>
+                        <a:t>15/11/2015</a:t>
+                      </a:r>
+                      <a:endParaRPr lang="es-MX" sz="1100" dirty="0">
+                        <a:effectLst/>
+                        <a:latin typeface="Calibri" panose="020F0502020204030204" pitchFamily="34" charset="0"/>
+                        <a:ea typeface="Calibri" panose="020F0502020204030204" pitchFamily="34" charset="0"/>
+                        <a:cs typeface="Times New Roman" panose="02020603050405020304" pitchFamily="18" charset="0"/>
+                      </a:endParaRPr>
+                    </a:p>
+                  </a:txBody>
+                  <a:tcPr marL="68580" marR="68580" marT="0" marB="0"/>
+                </a:tc>
+                <a:tc>
+                  <a:txBody>
+                    <a:bodyPr/>
+                    <a:lstStyle/>
+                    <a:p>
+                      <a:pPr algn="ctr">
+                        <a:lnSpc>
+                          <a:spcPct val="107000"/>
+                        </a:lnSpc>
+                        <a:spcAft>
+                          <a:spcPts val="0"/>
+                        </a:spcAft>
+                      </a:pPr>
+                      <a:endParaRPr lang="es-MX" sz="1100" dirty="0" smtClean="0">
+                        <a:effectLst/>
+                      </a:endParaRPr>
+                    </a:p>
+                    <a:p>
+                      <a:pPr algn="ctr">
+                        <a:lnSpc>
+                          <a:spcPct val="107000"/>
+                        </a:lnSpc>
+                        <a:spcAft>
+                          <a:spcPts val="0"/>
+                        </a:spcAft>
+                      </a:pPr>
+                      <a:r>
+                        <a:rPr lang="es-MX" sz="1100" dirty="0" smtClean="0">
+                          <a:effectLst/>
+                        </a:rPr>
+                        <a:t>Francisco </a:t>
+                      </a:r>
+                      <a:r>
+                        <a:rPr lang="es-MX" sz="1100" dirty="0">
+                          <a:effectLst/>
+                        </a:rPr>
+                        <a:t>Javier Quirarte Pelayo</a:t>
+                      </a:r>
+                      <a:endParaRPr lang="es-MX" sz="1100" dirty="0">
+                        <a:effectLst/>
+                        <a:latin typeface="Calibri" panose="020F0502020204030204" pitchFamily="34" charset="0"/>
+                        <a:ea typeface="Calibri" panose="020F0502020204030204" pitchFamily="34" charset="0"/>
+                        <a:cs typeface="Times New Roman" panose="02020603050405020304" pitchFamily="18" charset="0"/>
+                      </a:endParaRPr>
+                    </a:p>
+                  </a:txBody>
+                  <a:tcPr marL="68580" marR="68580" marT="0" marB="0"/>
+                </a:tc>
+                <a:tc>
+                  <a:txBody>
+                    <a:bodyPr/>
+                    <a:lstStyle/>
+                    <a:p>
+                      <a:pPr algn="ctr">
+                        <a:lnSpc>
+                          <a:spcPct val="107000"/>
+                        </a:lnSpc>
+                        <a:spcAft>
+                          <a:spcPts val="0"/>
+                        </a:spcAft>
+                      </a:pPr>
+                      <a:endParaRPr lang="es-MX" sz="1100" dirty="0" smtClean="0">
+                        <a:effectLst/>
+                      </a:endParaRPr>
+                    </a:p>
+                    <a:p>
+                      <a:pPr algn="ctr">
+                        <a:lnSpc>
+                          <a:spcPct val="107000"/>
+                        </a:lnSpc>
+                        <a:spcAft>
+                          <a:spcPts val="0"/>
+                        </a:spcAft>
+                      </a:pPr>
+                      <a:r>
+                        <a:rPr lang="es-MX" sz="1100" dirty="0" err="1" smtClean="0">
+                          <a:effectLst/>
+                        </a:rPr>
+                        <a:t>First</a:t>
+                      </a:r>
+                      <a:r>
+                        <a:rPr lang="es-MX" sz="1100" dirty="0" smtClean="0">
+                          <a:effectLst/>
+                        </a:rPr>
+                        <a:t> </a:t>
+                      </a:r>
+                      <a:r>
+                        <a:rPr lang="es-MX" sz="1100" dirty="0">
+                          <a:effectLst/>
+                        </a:rPr>
+                        <a:t>revisión of scheduler</a:t>
+                      </a:r>
+                    </a:p>
+                    <a:p>
+                      <a:pPr algn="ctr">
+                        <a:lnSpc>
+                          <a:spcPct val="107000"/>
+                        </a:lnSpc>
+                        <a:spcAft>
+                          <a:spcPts val="0"/>
+                        </a:spcAft>
+                      </a:pPr>
+                      <a:r>
+                        <a:rPr lang="es-MX" sz="1100" dirty="0">
+                          <a:effectLst/>
+                        </a:rPr>
+                        <a:t> </a:t>
+                      </a:r>
+                      <a:endParaRPr lang="es-MX" sz="1100" dirty="0">
+                        <a:effectLst/>
+                        <a:latin typeface="Calibri" panose="020F0502020204030204" pitchFamily="34" charset="0"/>
+                        <a:ea typeface="Calibri" panose="020F0502020204030204" pitchFamily="34" charset="0"/>
+                        <a:cs typeface="Times New Roman" panose="02020603050405020304" pitchFamily="18" charset="0"/>
+                      </a:endParaRPr>
+                    </a:p>
+                  </a:txBody>
+                  <a:tcPr marL="68580" marR="68580" marT="0" marB="0"/>
+                </a:tc>
+              </a:tr>
+              <a:tr h="0">
+                <a:tc>
+                  <a:txBody>
+                    <a:bodyPr/>
+                    <a:lstStyle/>
+                    <a:p>
+                      <a:pPr algn="ctr">
+                        <a:lnSpc>
+                          <a:spcPct val="107000"/>
+                        </a:lnSpc>
+                        <a:spcAft>
+                          <a:spcPts val="0"/>
+                        </a:spcAft>
+                      </a:pPr>
+                      <a:r>
                         <a:rPr lang="es-MX" sz="1100">
                           <a:effectLst/>
                         </a:rPr>
-                        <a:t>David Antonio Díaz Ramírez</a:t>
+                        <a:t> </a:t>
                       </a:r>
                       <a:endParaRPr lang="es-MX" sz="1100">
+                        <a:effectLst/>
+                        <a:latin typeface="Calibri" panose="020F0502020204030204" pitchFamily="34" charset="0"/>
+                        <a:ea typeface="Calibri" panose="020F0502020204030204" pitchFamily="34" charset="0"/>
+                        <a:cs typeface="Times New Roman" panose="02020603050405020304" pitchFamily="18" charset="0"/>
+                      </a:endParaRPr>
+                    </a:p>
+                  </a:txBody>
+                  <a:tcPr marL="68580" marR="68580" marT="0" marB="0"/>
+                </a:tc>
+                <a:tc>
+                  <a:txBody>
+                    <a:bodyPr/>
+                    <a:lstStyle/>
+                    <a:p>
+                      <a:pPr algn="ctr">
+                        <a:lnSpc>
+                          <a:spcPct val="107000"/>
+                        </a:lnSpc>
+                        <a:spcAft>
+                          <a:spcPts val="0"/>
+                        </a:spcAft>
+                      </a:pPr>
+                      <a:r>
+                        <a:rPr lang="es-MX" sz="1100" dirty="0">
+                          <a:effectLst/>
+                        </a:rPr>
+                        <a:t> </a:t>
+                      </a:r>
+                      <a:endParaRPr lang="es-MX" sz="1100" dirty="0">
+                        <a:effectLst/>
+                        <a:latin typeface="Calibri" panose="020F0502020204030204" pitchFamily="34" charset="0"/>
+                        <a:ea typeface="Calibri" panose="020F0502020204030204" pitchFamily="34" charset="0"/>
+                        <a:cs typeface="Times New Roman" panose="02020603050405020304" pitchFamily="18" charset="0"/>
+                      </a:endParaRPr>
+                    </a:p>
+                  </a:txBody>
+                  <a:tcPr marL="68580" marR="68580" marT="0" marB="0"/>
+                </a:tc>
+                <a:tc>
+                  <a:txBody>
+                    <a:bodyPr/>
+                    <a:lstStyle/>
+                    <a:p>
+                      <a:pPr algn="ctr">
+                        <a:lnSpc>
+                          <a:spcPct val="107000"/>
+                        </a:lnSpc>
+                        <a:spcAft>
+                          <a:spcPts val="0"/>
+                        </a:spcAft>
+                      </a:pPr>
+                      <a:endParaRPr lang="es-MX" sz="1100" dirty="0" smtClean="0">
+                        <a:effectLst/>
+                      </a:endParaRPr>
+                    </a:p>
+                    <a:p>
+                      <a:pPr algn="ctr">
+                        <a:lnSpc>
+                          <a:spcPct val="107000"/>
+                        </a:lnSpc>
+                        <a:spcAft>
+                          <a:spcPts val="0"/>
+                        </a:spcAft>
+                      </a:pPr>
+                      <a:r>
+                        <a:rPr lang="es-MX" sz="1100" dirty="0" smtClean="0">
+                          <a:effectLst/>
+                        </a:rPr>
+                        <a:t>David </a:t>
+                      </a:r>
+                      <a:r>
+                        <a:rPr lang="es-MX" sz="1100" dirty="0">
+                          <a:effectLst/>
+                        </a:rPr>
+                        <a:t>Antonio Díaz </a:t>
+                      </a:r>
+                      <a:r>
+                        <a:rPr lang="es-MX" sz="1100" dirty="0" smtClean="0">
+                          <a:effectLst/>
+                        </a:rPr>
+                        <a:t>Ramírez</a:t>
+                      </a:r>
+                    </a:p>
+                    <a:p>
+                      <a:pPr algn="ctr">
+                        <a:lnSpc>
+                          <a:spcPct val="107000"/>
+                        </a:lnSpc>
+                        <a:spcAft>
+                          <a:spcPts val="0"/>
+                        </a:spcAft>
+                      </a:pPr>
+                      <a:endParaRPr lang="es-MX" sz="1100" dirty="0">
                         <a:effectLst/>
                         <a:latin typeface="Calibri" panose="020F0502020204030204" pitchFamily="34" charset="0"/>
                         <a:ea typeface="Calibri" panose="020F0502020204030204" pitchFamily="34" charset="0"/>
@@ -11512,6 +12288,688 @@
 </p:sld>
 </file>
 
+<file path=ppt/slides/slide20.xml><?xml version="1.0" encoding="utf-8"?>
+<p:sld xmlns:a="http://schemas.openxmlformats.org/drawingml/2006/main" xmlns:r="http://schemas.openxmlformats.org/officeDocument/2006/relationships" xmlns:p="http://schemas.openxmlformats.org/presentationml/2006/main">
+  <p:cSld>
+    <p:spTree>
+      <p:nvGrpSpPr>
+        <p:cNvPr id="1" name=""/>
+        <p:cNvGrpSpPr/>
+        <p:nvPr/>
+      </p:nvGrpSpPr>
+      <p:grpSpPr>
+        <a:xfrm>
+          <a:off x="0" y="0"/>
+          <a:ext cx="0" cy="0"/>
+          <a:chOff x="0" y="0"/>
+          <a:chExt cx="0" cy="0"/>
+        </a:xfrm>
+      </p:grpSpPr>
+      <p:sp>
+        <p:nvSpPr>
+          <p:cNvPr id="3" name="2 Rectángulo"/>
+          <p:cNvSpPr/>
+          <p:nvPr/>
+        </p:nvSpPr>
+        <p:spPr>
+          <a:xfrm>
+            <a:off x="837361" y="834844"/>
+            <a:ext cx="3680897" cy="369332"/>
+          </a:xfrm>
+          <a:prstGeom prst="rect">
+            <a:avLst/>
+          </a:prstGeom>
+        </p:spPr>
+        <p:txBody>
+          <a:bodyPr wrap="square">
+            <a:spAutoFit/>
+          </a:bodyPr>
+          <a:lstStyle/>
+          <a:p>
+            <a:pPr algn="just"/>
+            <a:r>
+              <a:rPr lang="en-US" dirty="0" smtClean="0"/>
+              <a:t>Example of a new task added:</a:t>
+            </a:r>
+            <a:endParaRPr lang="en-US" dirty="0"/>
+          </a:p>
+        </p:txBody>
+      </p:sp>
+      <p:pic>
+        <p:nvPicPr>
+          <p:cNvPr id="4100" name="Picture 4"/>
+          <p:cNvPicPr>
+            <a:picLocks noChangeAspect="1" noChangeArrowheads="1"/>
+          </p:cNvPicPr>
+          <p:nvPr/>
+        </p:nvPicPr>
+        <p:blipFill>
+          <a:blip r:embed="rId2">
+            <a:extLst>
+              <a:ext uri="{28A0092B-C50C-407E-A947-70E740481C1C}">
+                <a14:useLocalDpi xmlns:a14="http://schemas.microsoft.com/office/drawing/2010/main" val="0"/>
+              </a:ext>
+            </a:extLst>
+          </a:blip>
+          <a:srcRect/>
+          <a:stretch>
+            <a:fillRect/>
+          </a:stretch>
+        </p:blipFill>
+        <p:spPr bwMode="auto">
+          <a:xfrm>
+            <a:off x="730807" y="1496497"/>
+            <a:ext cx="8577885" cy="3680809"/>
+          </a:xfrm>
+          <a:prstGeom prst="rect">
+            <a:avLst/>
+          </a:prstGeom>
+          <a:noFill/>
+          <a:ln>
+            <a:noFill/>
+          </a:ln>
+          <a:effectLst/>
+          <a:extLst>
+            <a:ext uri="{909E8E84-426E-40DD-AFC4-6F175D3DCCD1}">
+              <a14:hiddenFill xmlns:a14="http://schemas.microsoft.com/office/drawing/2010/main">
+                <a:solidFill>
+                  <a:schemeClr val="accent1"/>
+                </a:solidFill>
+              </a14:hiddenFill>
+            </a:ext>
+            <a:ext uri="{91240B29-F687-4F45-9708-019B960494DF}">
+              <a14:hiddenLine xmlns:a14="http://schemas.microsoft.com/office/drawing/2010/main" w="9525">
+                <a:solidFill>
+                  <a:schemeClr val="tx1"/>
+                </a:solidFill>
+                <a:miter lim="800000"/>
+                <a:headEnd/>
+                <a:tailEnd/>
+              </a14:hiddenLine>
+            </a:ext>
+            <a:ext uri="{AF507438-7753-43E0-B8FC-AC1667EBCBE1}">
+              <a14:hiddenEffects xmlns:a14="http://schemas.microsoft.com/office/drawing/2010/main">
+                <a:effectLst>
+                  <a:outerShdw dist="35921" dir="2700000" algn="ctr" rotWithShape="0">
+                    <a:schemeClr val="bg2"/>
+                  </a:outerShdw>
+                </a:effectLst>
+              </a14:hiddenEffects>
+            </a:ext>
+          </a:extLst>
+        </p:spPr>
+      </p:pic>
+    </p:spTree>
+    <p:extLst>
+      <p:ext uri="{BB962C8B-B14F-4D97-AF65-F5344CB8AC3E}">
+        <p14:creationId xmlns:p14="http://schemas.microsoft.com/office/powerpoint/2010/main" val="2157169770"/>
+      </p:ext>
+    </p:extLst>
+  </p:cSld>
+  <p:clrMapOvr>
+    <a:masterClrMapping/>
+  </p:clrMapOvr>
+</p:sld>
+</file>
+
+<file path=ppt/slides/slide21.xml><?xml version="1.0" encoding="utf-8"?>
+<p:sld xmlns:a="http://schemas.openxmlformats.org/drawingml/2006/main" xmlns:r="http://schemas.openxmlformats.org/officeDocument/2006/relationships" xmlns:p="http://schemas.openxmlformats.org/presentationml/2006/main">
+  <p:cSld>
+    <p:spTree>
+      <p:nvGrpSpPr>
+        <p:cNvPr id="1" name=""/>
+        <p:cNvGrpSpPr/>
+        <p:nvPr/>
+      </p:nvGrpSpPr>
+      <p:grpSpPr>
+        <a:xfrm>
+          <a:off x="0" y="0"/>
+          <a:ext cx="0" cy="0"/>
+          <a:chOff x="0" y="0"/>
+          <a:chExt cx="0" cy="0"/>
+        </a:xfrm>
+      </p:grpSpPr>
+      <p:sp>
+        <p:nvSpPr>
+          <p:cNvPr id="3" name="2 Rectángulo"/>
+          <p:cNvSpPr/>
+          <p:nvPr/>
+        </p:nvSpPr>
+        <p:spPr>
+          <a:xfrm>
+            <a:off x="386367" y="430197"/>
+            <a:ext cx="8886422" cy="923330"/>
+          </a:xfrm>
+          <a:prstGeom prst="rect">
+            <a:avLst/>
+          </a:prstGeom>
+        </p:spPr>
+        <p:txBody>
+          <a:bodyPr wrap="square">
+            <a:spAutoFit/>
+          </a:bodyPr>
+          <a:lstStyle/>
+          <a:p>
+            <a:r>
+              <a:rPr lang="en-US" dirty="0"/>
+              <a:t> </a:t>
+            </a:r>
+            <a:r>
+              <a:rPr lang="en-US" dirty="0" smtClean="0"/>
+              <a:t>2) In </a:t>
+            </a:r>
+            <a:r>
+              <a:rPr lang="en-US"/>
+              <a:t>the </a:t>
+            </a:r>
+            <a:r>
+              <a:rPr lang="en-US" smtClean="0"/>
+              <a:t>file main.c</a:t>
+            </a:r>
+            <a:r>
+              <a:rPr lang="en-US" dirty="0" smtClean="0"/>
+              <a:t>, in the </a:t>
+            </a:r>
+            <a:r>
+              <a:rPr lang="en-US" dirty="0"/>
+              <a:t>I</a:t>
+            </a:r>
+            <a:r>
+              <a:rPr lang="en-US" dirty="0" smtClean="0"/>
+              <a:t>nline functions  section,  in the </a:t>
+            </a:r>
+            <a:r>
+              <a:rPr lang="en-US" b="1" i="1" dirty="0" smtClean="0"/>
+              <a:t>S_TASK</a:t>
+            </a:r>
+            <a:r>
+              <a:rPr lang="en-US" dirty="0" smtClean="0"/>
+              <a:t> type structure </a:t>
+            </a:r>
+            <a:r>
+              <a:rPr lang="en-US" b="1" i="1" dirty="0" smtClean="0"/>
+              <a:t>TASK_LIST</a:t>
+            </a:r>
+            <a:r>
+              <a:rPr lang="en-US" dirty="0" smtClean="0"/>
+              <a:t>, </a:t>
+            </a:r>
+            <a:r>
+              <a:rPr lang="en-US" dirty="0"/>
+              <a:t>write with the same format, the name of the next </a:t>
+            </a:r>
+            <a:r>
+              <a:rPr lang="en-US" dirty="0" smtClean="0"/>
+              <a:t>task, its period and its offset. </a:t>
+            </a:r>
+            <a:r>
+              <a:rPr lang="en-US" dirty="0"/>
+              <a:t>Please refer to the next image:</a:t>
+            </a:r>
+            <a:endParaRPr lang="es-MX" dirty="0"/>
+          </a:p>
+        </p:txBody>
+      </p:sp>
+      <p:pic>
+        <p:nvPicPr>
+          <p:cNvPr id="2050" name="Picture 2"/>
+          <p:cNvPicPr>
+            <a:picLocks noChangeAspect="1" noChangeArrowheads="1"/>
+          </p:cNvPicPr>
+          <p:nvPr/>
+        </p:nvPicPr>
+        <p:blipFill>
+          <a:blip r:embed="rId2">
+            <a:extLst>
+              <a:ext uri="{28A0092B-C50C-407E-A947-70E740481C1C}">
+                <a14:useLocalDpi xmlns:a14="http://schemas.microsoft.com/office/drawing/2010/main" val="0"/>
+              </a:ext>
+            </a:extLst>
+          </a:blip>
+          <a:srcRect/>
+          <a:stretch>
+            <a:fillRect/>
+          </a:stretch>
+        </p:blipFill>
+        <p:spPr bwMode="auto">
+          <a:xfrm>
+            <a:off x="115910" y="2150772"/>
+            <a:ext cx="10174310" cy="1957588"/>
+          </a:xfrm>
+          <a:prstGeom prst="rect">
+            <a:avLst/>
+          </a:prstGeom>
+          <a:noFill/>
+          <a:ln>
+            <a:noFill/>
+          </a:ln>
+          <a:effectLst/>
+          <a:extLst>
+            <a:ext uri="{909E8E84-426E-40DD-AFC4-6F175D3DCCD1}">
+              <a14:hiddenFill xmlns:a14="http://schemas.microsoft.com/office/drawing/2010/main">
+                <a:solidFill>
+                  <a:schemeClr val="accent1"/>
+                </a:solidFill>
+              </a14:hiddenFill>
+            </a:ext>
+            <a:ext uri="{91240B29-F687-4F45-9708-019B960494DF}">
+              <a14:hiddenLine xmlns:a14="http://schemas.microsoft.com/office/drawing/2010/main" w="9525">
+                <a:solidFill>
+                  <a:schemeClr val="tx1"/>
+                </a:solidFill>
+                <a:miter lim="800000"/>
+                <a:headEnd/>
+                <a:tailEnd/>
+              </a14:hiddenLine>
+            </a:ext>
+            <a:ext uri="{AF507438-7753-43E0-B8FC-AC1667EBCBE1}">
+              <a14:hiddenEffects xmlns:a14="http://schemas.microsoft.com/office/drawing/2010/main">
+                <a:effectLst>
+                  <a:outerShdw dist="35921" dir="2700000" algn="ctr" rotWithShape="0">
+                    <a:schemeClr val="bg2"/>
+                  </a:outerShdw>
+                </a:effectLst>
+              </a14:hiddenEffects>
+            </a:ext>
+          </a:extLst>
+        </p:spPr>
+      </p:pic>
+    </p:spTree>
+    <p:extLst>
+      <p:ext uri="{BB962C8B-B14F-4D97-AF65-F5344CB8AC3E}">
+        <p14:creationId xmlns:p14="http://schemas.microsoft.com/office/powerpoint/2010/main" val="1170505219"/>
+      </p:ext>
+    </p:extLst>
+  </p:cSld>
+  <p:clrMapOvr>
+    <a:masterClrMapping/>
+  </p:clrMapOvr>
+</p:sld>
+</file>
+
+<file path=ppt/slides/slide22.xml><?xml version="1.0" encoding="utf-8"?>
+<p:sld xmlns:a="http://schemas.openxmlformats.org/drawingml/2006/main" xmlns:r="http://schemas.openxmlformats.org/officeDocument/2006/relationships" xmlns:p="http://schemas.openxmlformats.org/presentationml/2006/main">
+  <p:cSld>
+    <p:spTree>
+      <p:nvGrpSpPr>
+        <p:cNvPr id="1" name=""/>
+        <p:cNvGrpSpPr/>
+        <p:nvPr/>
+      </p:nvGrpSpPr>
+      <p:grpSpPr>
+        <a:xfrm>
+          <a:off x="0" y="0"/>
+          <a:ext cx="0" cy="0"/>
+          <a:chOff x="0" y="0"/>
+          <a:chExt cx="0" cy="0"/>
+        </a:xfrm>
+      </p:grpSpPr>
+      <p:pic>
+        <p:nvPicPr>
+          <p:cNvPr id="5122" name="Picture 2"/>
+          <p:cNvPicPr>
+            <a:picLocks noChangeAspect="1" noChangeArrowheads="1"/>
+          </p:cNvPicPr>
+          <p:nvPr/>
+        </p:nvPicPr>
+        <p:blipFill>
+          <a:blip r:embed="rId2">
+            <a:extLst>
+              <a:ext uri="{28A0092B-C50C-407E-A947-70E740481C1C}">
+                <a14:useLocalDpi xmlns:a14="http://schemas.microsoft.com/office/drawing/2010/main" val="0"/>
+              </a:ext>
+            </a:extLst>
+          </a:blip>
+          <a:srcRect/>
+          <a:stretch>
+            <a:fillRect/>
+          </a:stretch>
+        </p:blipFill>
+        <p:spPr bwMode="auto">
+          <a:xfrm>
+            <a:off x="0" y="1790163"/>
+            <a:ext cx="9916498" cy="2375604"/>
+          </a:xfrm>
+          <a:prstGeom prst="rect">
+            <a:avLst/>
+          </a:prstGeom>
+          <a:noFill/>
+          <a:ln>
+            <a:noFill/>
+          </a:ln>
+          <a:effectLst/>
+          <a:extLst>
+            <a:ext uri="{909E8E84-426E-40DD-AFC4-6F175D3DCCD1}">
+              <a14:hiddenFill xmlns:a14="http://schemas.microsoft.com/office/drawing/2010/main">
+                <a:solidFill>
+                  <a:schemeClr val="accent1"/>
+                </a:solidFill>
+              </a14:hiddenFill>
+            </a:ext>
+            <a:ext uri="{91240B29-F687-4F45-9708-019B960494DF}">
+              <a14:hiddenLine xmlns:a14="http://schemas.microsoft.com/office/drawing/2010/main" w="9525">
+                <a:solidFill>
+                  <a:schemeClr val="tx1"/>
+                </a:solidFill>
+                <a:miter lim="800000"/>
+                <a:headEnd/>
+                <a:tailEnd/>
+              </a14:hiddenLine>
+            </a:ext>
+            <a:ext uri="{AF507438-7753-43E0-B8FC-AC1667EBCBE1}">
+              <a14:hiddenEffects xmlns:a14="http://schemas.microsoft.com/office/drawing/2010/main">
+                <a:effectLst>
+                  <a:outerShdw dist="35921" dir="2700000" algn="ctr" rotWithShape="0">
+                    <a:schemeClr val="bg2"/>
+                  </a:outerShdw>
+                </a:effectLst>
+              </a14:hiddenEffects>
+            </a:ext>
+          </a:extLst>
+        </p:spPr>
+      </p:pic>
+      <p:sp>
+        <p:nvSpPr>
+          <p:cNvPr id="4" name="3 Rectángulo"/>
+          <p:cNvSpPr/>
+          <p:nvPr/>
+        </p:nvSpPr>
+        <p:spPr>
+          <a:xfrm>
+            <a:off x="296214" y="809086"/>
+            <a:ext cx="3680897" cy="369332"/>
+          </a:xfrm>
+          <a:prstGeom prst="rect">
+            <a:avLst/>
+          </a:prstGeom>
+        </p:spPr>
+        <p:txBody>
+          <a:bodyPr wrap="square">
+            <a:spAutoFit/>
+          </a:bodyPr>
+          <a:lstStyle/>
+          <a:p>
+            <a:pPr algn="just"/>
+            <a:r>
+              <a:rPr lang="en-US" dirty="0" smtClean="0"/>
+              <a:t>Example of a new task added:</a:t>
+            </a:r>
+            <a:endParaRPr lang="en-US" dirty="0"/>
+          </a:p>
+        </p:txBody>
+      </p:sp>
+    </p:spTree>
+    <p:extLst>
+      <p:ext uri="{BB962C8B-B14F-4D97-AF65-F5344CB8AC3E}">
+        <p14:creationId xmlns:p14="http://schemas.microsoft.com/office/powerpoint/2010/main" val="2493691333"/>
+      </p:ext>
+    </p:extLst>
+  </p:cSld>
+  <p:clrMapOvr>
+    <a:masterClrMapping/>
+  </p:clrMapOvr>
+</p:sld>
+</file>
+
+<file path=ppt/slides/slide23.xml><?xml version="1.0" encoding="utf-8"?>
+<p:sld xmlns:a="http://schemas.openxmlformats.org/drawingml/2006/main" xmlns:r="http://schemas.openxmlformats.org/officeDocument/2006/relationships" xmlns:p="http://schemas.openxmlformats.org/presentationml/2006/main">
+  <p:cSld>
+    <p:spTree>
+      <p:nvGrpSpPr>
+        <p:cNvPr id="1" name=""/>
+        <p:cNvGrpSpPr/>
+        <p:nvPr/>
+      </p:nvGrpSpPr>
+      <p:grpSpPr>
+        <a:xfrm>
+          <a:off x="0" y="0"/>
+          <a:ext cx="0" cy="0"/>
+          <a:chOff x="0" y="0"/>
+          <a:chExt cx="0" cy="0"/>
+        </a:xfrm>
+      </p:grpSpPr>
+      <p:pic>
+        <p:nvPicPr>
+          <p:cNvPr id="3074" name="Picture 2"/>
+          <p:cNvPicPr>
+            <a:picLocks noChangeAspect="1" noChangeArrowheads="1"/>
+          </p:cNvPicPr>
+          <p:nvPr/>
+        </p:nvPicPr>
+        <p:blipFill>
+          <a:blip r:embed="rId2">
+            <a:extLst>
+              <a:ext uri="{28A0092B-C50C-407E-A947-70E740481C1C}">
+                <a14:useLocalDpi xmlns:a14="http://schemas.microsoft.com/office/drawing/2010/main" val="0"/>
+              </a:ext>
+            </a:extLst>
+          </a:blip>
+          <a:srcRect/>
+          <a:stretch>
+            <a:fillRect/>
+          </a:stretch>
+        </p:blipFill>
+        <p:spPr bwMode="auto">
+          <a:xfrm>
+            <a:off x="471936" y="1542242"/>
+            <a:ext cx="8880056" cy="4008552"/>
+          </a:xfrm>
+          <a:prstGeom prst="rect">
+            <a:avLst/>
+          </a:prstGeom>
+          <a:noFill/>
+          <a:ln>
+            <a:noFill/>
+          </a:ln>
+          <a:effectLst/>
+          <a:extLst>
+            <a:ext uri="{909E8E84-426E-40DD-AFC4-6F175D3DCCD1}">
+              <a14:hiddenFill xmlns:a14="http://schemas.microsoft.com/office/drawing/2010/main">
+                <a:solidFill>
+                  <a:schemeClr val="accent1"/>
+                </a:solidFill>
+              </a14:hiddenFill>
+            </a:ext>
+            <a:ext uri="{91240B29-F687-4F45-9708-019B960494DF}">
+              <a14:hiddenLine xmlns:a14="http://schemas.microsoft.com/office/drawing/2010/main" w="9525">
+                <a:solidFill>
+                  <a:schemeClr val="tx1"/>
+                </a:solidFill>
+                <a:miter lim="800000"/>
+                <a:headEnd/>
+                <a:tailEnd/>
+              </a14:hiddenLine>
+            </a:ext>
+            <a:ext uri="{AF507438-7753-43E0-B8FC-AC1667EBCBE1}">
+              <a14:hiddenEffects xmlns:a14="http://schemas.microsoft.com/office/drawing/2010/main">
+                <a:effectLst>
+                  <a:outerShdw dist="35921" dir="2700000" algn="ctr" rotWithShape="0">
+                    <a:schemeClr val="bg2"/>
+                  </a:outerShdw>
+                </a:effectLst>
+              </a14:hiddenEffects>
+            </a:ext>
+          </a:extLst>
+        </p:spPr>
+      </p:pic>
+      <p:sp>
+        <p:nvSpPr>
+          <p:cNvPr id="4" name="3 Rectángulo"/>
+          <p:cNvSpPr/>
+          <p:nvPr/>
+        </p:nvSpPr>
+        <p:spPr>
+          <a:xfrm>
+            <a:off x="166811" y="449462"/>
+            <a:ext cx="8628844" cy="646331"/>
+          </a:xfrm>
+          <a:prstGeom prst="rect">
+            <a:avLst/>
+          </a:prstGeom>
+        </p:spPr>
+        <p:txBody>
+          <a:bodyPr wrap="square">
+            <a:spAutoFit/>
+          </a:bodyPr>
+          <a:lstStyle/>
+          <a:p>
+            <a:r>
+              <a:rPr lang="en-US" dirty="0"/>
+              <a:t> </a:t>
+            </a:r>
+            <a:r>
+              <a:rPr lang="en-US" dirty="0" smtClean="0"/>
+              <a:t>3) In the </a:t>
+            </a:r>
+            <a:r>
+              <a:rPr lang="en-US" dirty="0" err="1" smtClean="0"/>
+              <a:t>task.c</a:t>
+            </a:r>
+            <a:r>
+              <a:rPr lang="en-US" dirty="0" smtClean="0"/>
+              <a:t> file, add the next function for the task with its following number  and content.</a:t>
+            </a:r>
+            <a:endParaRPr lang="es-MX" dirty="0"/>
+          </a:p>
+        </p:txBody>
+      </p:sp>
+    </p:spTree>
+    <p:extLst>
+      <p:ext uri="{BB962C8B-B14F-4D97-AF65-F5344CB8AC3E}">
+        <p14:creationId xmlns:p14="http://schemas.microsoft.com/office/powerpoint/2010/main" val="4103507813"/>
+      </p:ext>
+    </p:extLst>
+  </p:cSld>
+  <p:clrMapOvr>
+    <a:masterClrMapping/>
+  </p:clrMapOvr>
+</p:sld>
+</file>
+
+<file path=ppt/slides/slide24.xml><?xml version="1.0" encoding="utf-8"?>
+<p:sld xmlns:a="http://schemas.openxmlformats.org/drawingml/2006/main" xmlns:r="http://schemas.openxmlformats.org/officeDocument/2006/relationships" xmlns:p="http://schemas.openxmlformats.org/presentationml/2006/main">
+  <p:cSld>
+    <p:spTree>
+      <p:nvGrpSpPr>
+        <p:cNvPr id="1" name=""/>
+        <p:cNvGrpSpPr/>
+        <p:nvPr/>
+      </p:nvGrpSpPr>
+      <p:grpSpPr>
+        <a:xfrm>
+          <a:off x="0" y="0"/>
+          <a:ext cx="0" cy="0"/>
+          <a:chOff x="0" y="0"/>
+          <a:chExt cx="0" cy="0"/>
+        </a:xfrm>
+      </p:grpSpPr>
+      <p:pic>
+        <p:nvPicPr>
+          <p:cNvPr id="6147" name="Picture 3"/>
+          <p:cNvPicPr>
+            <a:picLocks noChangeAspect="1" noChangeArrowheads="1"/>
+          </p:cNvPicPr>
+          <p:nvPr/>
+        </p:nvPicPr>
+        <p:blipFill>
+          <a:blip r:embed="rId2">
+            <a:extLst>
+              <a:ext uri="{28A0092B-C50C-407E-A947-70E740481C1C}">
+                <a14:useLocalDpi xmlns:a14="http://schemas.microsoft.com/office/drawing/2010/main" val="0"/>
+              </a:ext>
+            </a:extLst>
+          </a:blip>
+          <a:srcRect/>
+          <a:stretch>
+            <a:fillRect/>
+          </a:stretch>
+        </p:blipFill>
+        <p:spPr bwMode="auto">
+          <a:xfrm>
+            <a:off x="412124" y="999991"/>
+            <a:ext cx="8576740" cy="4885654"/>
+          </a:xfrm>
+          <a:prstGeom prst="rect">
+            <a:avLst/>
+          </a:prstGeom>
+          <a:noFill/>
+          <a:ln>
+            <a:noFill/>
+          </a:ln>
+          <a:effectLst/>
+          <a:extLst>
+            <a:ext uri="{909E8E84-426E-40DD-AFC4-6F175D3DCCD1}">
+              <a14:hiddenFill xmlns:a14="http://schemas.microsoft.com/office/drawing/2010/main">
+                <a:solidFill>
+                  <a:schemeClr val="accent1"/>
+                </a:solidFill>
+              </a14:hiddenFill>
+            </a:ext>
+            <a:ext uri="{91240B29-F687-4F45-9708-019B960494DF}">
+              <a14:hiddenLine xmlns:a14="http://schemas.microsoft.com/office/drawing/2010/main" w="9525">
+                <a:solidFill>
+                  <a:schemeClr val="tx1"/>
+                </a:solidFill>
+                <a:miter lim="800000"/>
+                <a:headEnd/>
+                <a:tailEnd/>
+              </a14:hiddenLine>
+            </a:ext>
+            <a:ext uri="{AF507438-7753-43E0-B8FC-AC1667EBCBE1}">
+              <a14:hiddenEffects xmlns:a14="http://schemas.microsoft.com/office/drawing/2010/main">
+                <a:effectLst>
+                  <a:outerShdw dist="35921" dir="2700000" algn="ctr" rotWithShape="0">
+                    <a:schemeClr val="bg2"/>
+                  </a:outerShdw>
+                </a:effectLst>
+              </a14:hiddenEffects>
+            </a:ext>
+          </a:extLst>
+        </p:spPr>
+      </p:pic>
+      <p:sp>
+        <p:nvSpPr>
+          <p:cNvPr id="5" name="4 Rectángulo"/>
+          <p:cNvSpPr/>
+          <p:nvPr/>
+        </p:nvSpPr>
+        <p:spPr>
+          <a:xfrm>
+            <a:off x="412124" y="401118"/>
+            <a:ext cx="3680897" cy="369332"/>
+          </a:xfrm>
+          <a:prstGeom prst="rect">
+            <a:avLst/>
+          </a:prstGeom>
+        </p:spPr>
+        <p:txBody>
+          <a:bodyPr wrap="square">
+            <a:spAutoFit/>
+          </a:bodyPr>
+          <a:lstStyle/>
+          <a:p>
+            <a:pPr algn="just"/>
+            <a:r>
+              <a:rPr lang="en-US" dirty="0" smtClean="0"/>
+              <a:t>Example of a new task added:</a:t>
+            </a:r>
+            <a:endParaRPr lang="en-US" dirty="0"/>
+          </a:p>
+        </p:txBody>
+      </p:sp>
+    </p:spTree>
+    <p:extLst>
+      <p:ext uri="{BB962C8B-B14F-4D97-AF65-F5344CB8AC3E}">
+        <p14:creationId xmlns:p14="http://schemas.microsoft.com/office/powerpoint/2010/main" val="1030366267"/>
+      </p:ext>
+    </p:extLst>
+  </p:cSld>
+  <p:clrMapOvr>
+    <a:masterClrMapping/>
+  </p:clrMapOvr>
+</p:sld>
+</file>
+
 <file path=ppt/slides/slide3.xml><?xml version="1.0" encoding="utf-8"?>
 <p:sld xmlns:a="http://schemas.openxmlformats.org/drawingml/2006/main" xmlns:r="http://schemas.openxmlformats.org/officeDocument/2006/relationships" xmlns:p="http://schemas.openxmlformats.org/presentationml/2006/main">
   <p:cSld>
@@ -11614,6 +13072,13 @@
   <p:clrMapOvr>
     <a:masterClrMapping/>
   </p:clrMapOvr>
+  <p:timing>
+    <p:tnLst>
+      <p:par>
+        <p:cTn id="1" dur="indefinite" restart="never" nodeType="tmRoot"/>
+      </p:par>
+    </p:tnLst>
+  </p:timing>
 </p:sld>
 </file>
 
@@ -11711,6 +13176,13 @@
   <p:clrMapOvr>
     <a:masterClrMapping/>
   </p:clrMapOvr>
+  <p:timing>
+    <p:tnLst>
+      <p:par>
+        <p:cTn id="1" dur="indefinite" restart="never" nodeType="tmRoot"/>
+      </p:par>
+    </p:tnLst>
+  </p:timing>
 </p:sld>
 </file>
 
@@ -11814,7 +13286,11 @@
             <a:pPr algn="just"/>
             <a:r>
               <a:rPr lang="en-US" dirty="0"/>
-              <a:t>Given the mask and the OS tick period we can obtain the task rate. Therefore the task rate is:  task rate = OS tick * (mask + 1) </a:t>
+              <a:t>Given the mask and the OS tick period we can obtain the task rate. Therefore the task rate is:  task rate = OS tick * (mask + 1</a:t>
+            </a:r>
+            <a:r>
+              <a:rPr lang="en-US" dirty="0" smtClean="0"/>
+              <a:t>).</a:t>
             </a:r>
             <a:endParaRPr lang="es-MX" dirty="0"/>
           </a:p>
@@ -11830,6 +13306,13 @@
   <p:clrMapOvr>
     <a:masterClrMapping/>
   </p:clrMapOvr>
+  <p:timing>
+    <p:tnLst>
+      <p:par>
+        <p:cTn id="1" dur="indefinite" restart="never" nodeType="tmRoot"/>
+      </p:par>
+    </p:tnLst>
+  </p:timing>
 </p:sld>
 </file>
 
@@ -11927,6 +13410,13 @@
   <p:clrMapOvr>
     <a:masterClrMapping/>
   </p:clrMapOvr>
+  <p:timing>
+    <p:tnLst>
+      <p:par>
+        <p:cTn id="1" dur="indefinite" restart="never" nodeType="tmRoot"/>
+      </p:par>
+    </p:tnLst>
+  </p:timing>
 </p:sld>
 </file>
 
@@ -11957,7 +13447,12 @@
             <p:ph type="title"/>
           </p:nvPr>
         </p:nvSpPr>
-        <p:spPr/>
+        <p:spPr>
+          <a:xfrm>
+            <a:off x="677334" y="609600"/>
+            <a:ext cx="8596668" cy="639651"/>
+          </a:xfrm>
+        </p:spPr>
         <p:txBody>
           <a:bodyPr>
             <a:normAutofit fontScale="90000"/>
@@ -11976,75 +13471,12 @@
               <a:rPr lang="es-MX" dirty="0" smtClean="0"/>
             </a:br>
             <a:r>
-              <a:rPr lang="en-US" sz="1800" dirty="0">
-                <a:solidFill>
-                  <a:schemeClr val="tx1"/>
-                </a:solidFill>
-              </a:rPr>
-              <a:t>The scheduler module has dependencies on project specific timer module.  </a:t>
+              <a:rPr lang="es-MX" dirty="0" smtClean="0"/>
+              <a:t/>
             </a:r>
             <a:br>
-              <a:rPr lang="en-US" sz="1800" dirty="0">
-                <a:solidFill>
-                  <a:schemeClr val="tx1"/>
-                </a:solidFill>
-              </a:rPr>
+              <a:rPr lang="es-MX" dirty="0" smtClean="0"/>
             </a:br>
-            <a:r>
-              <a:rPr lang="en-US" sz="1800" dirty="0">
-                <a:solidFill>
-                  <a:schemeClr val="tx1"/>
-                </a:solidFill>
-              </a:rPr>
-              <a:t>File Structure  </a:t>
-            </a:r>
-            <a:br>
-              <a:rPr lang="en-US" sz="1800" dirty="0">
-                <a:solidFill>
-                  <a:schemeClr val="tx1"/>
-                </a:solidFill>
-              </a:rPr>
-            </a:br>
-            <a:r>
-              <a:rPr lang="en-US" sz="1800" dirty="0">
-                <a:solidFill>
-                  <a:schemeClr val="tx1"/>
-                </a:solidFill>
-              </a:rPr>
-              <a:t>The include structure of the </a:t>
-            </a:r>
-            <a:r>
-              <a:rPr lang="en-US" sz="1800" dirty="0" err="1" smtClean="0">
-                <a:solidFill>
-                  <a:schemeClr val="tx1"/>
-                </a:solidFill>
-              </a:rPr>
-              <a:t>SchModule</a:t>
-            </a:r>
-            <a:r>
-              <a:rPr lang="en-US" sz="1800" dirty="0" smtClean="0">
-                <a:solidFill>
-                  <a:schemeClr val="tx1"/>
-                </a:solidFill>
-              </a:rPr>
-              <a:t> </a:t>
-            </a:r>
-            <a:r>
-              <a:rPr lang="en-US" sz="1800" dirty="0">
-                <a:solidFill>
-                  <a:schemeClr val="tx1"/>
-                </a:solidFill>
-              </a:rPr>
-              <a:t>module shall be as follows: </a:t>
-            </a:r>
-            <a:r>
-              <a:rPr lang="es-MX" sz="1800" dirty="0" smtClean="0">
-                <a:solidFill>
-                  <a:schemeClr val="tx1"/>
-                </a:solidFill>
-              </a:rPr>
-              <a:t> </a:t>
-            </a:r>
             <a:endParaRPr lang="es-MX" sz="1800" dirty="0">
               <a:solidFill>
                 <a:schemeClr val="tx1"/>
@@ -12069,14 +13501,63 @@
         </p:blipFill>
         <p:spPr>
           <a:xfrm>
-            <a:off x="677334" y="2470595"/>
-            <a:ext cx="5830736" cy="3768188"/>
+            <a:off x="1394735" y="2419080"/>
+            <a:ext cx="6187105" cy="3998496"/>
           </a:xfrm>
           <a:prstGeom prst="rect">
             <a:avLst/>
           </a:prstGeom>
         </p:spPr>
       </p:pic>
+      <p:sp>
+        <p:nvSpPr>
+          <p:cNvPr id="3" name="2 CuadroTexto"/>
+          <p:cNvSpPr txBox="1"/>
+          <p:nvPr/>
+        </p:nvSpPr>
+        <p:spPr>
+          <a:xfrm>
+            <a:off x="643944" y="1352282"/>
+            <a:ext cx="8203842" cy="646331"/>
+          </a:xfrm>
+          <a:prstGeom prst="rect">
+            <a:avLst/>
+          </a:prstGeom>
+          <a:noFill/>
+        </p:spPr>
+        <p:txBody>
+          <a:bodyPr wrap="square" rtlCol="0">
+            <a:spAutoFit/>
+          </a:bodyPr>
+          <a:lstStyle/>
+          <a:p>
+            <a:r>
+              <a:rPr lang="en-US" dirty="0"/>
+              <a:t>The scheduler module has dependencies on project specific timer module.  </a:t>
+            </a:r>
+            <a:endParaRPr lang="en-US" dirty="0" smtClean="0"/>
+          </a:p>
+          <a:p>
+            <a:r>
+              <a:rPr lang="en-US" dirty="0" smtClean="0"/>
+              <a:t>The </a:t>
+            </a:r>
+            <a:r>
+              <a:rPr lang="en-US" dirty="0"/>
+              <a:t>include structure of the </a:t>
+            </a:r>
+            <a:r>
+              <a:rPr lang="en-US" dirty="0" smtClean="0"/>
+              <a:t>Scheduler </a:t>
+            </a:r>
+            <a:r>
+              <a:rPr lang="en-US" dirty="0"/>
+              <a:t>module shall be as follows:</a:t>
+            </a:r>
+            <a:endParaRPr lang="es-MX" dirty="0"/>
+          </a:p>
+        </p:txBody>
+      </p:sp>
     </p:spTree>
     <p:extLst>
       <p:ext uri="{BB962C8B-B14F-4D97-AF65-F5344CB8AC3E}">
@@ -12087,6 +13568,13 @@
   <p:clrMapOvr>
     <a:masterClrMapping/>
   </p:clrMapOvr>
+  <p:timing>
+    <p:tnLst>
+      <p:par>
+        <p:cTn id="1" dur="indefinite" restart="never" nodeType="tmRoot"/>
+      </p:par>
+    </p:tnLst>
+  </p:timing>
 </p:sld>
 </file>
 
@@ -12116,7 +13604,7 @@
           <p:nvPr>
             <p:extLst>
               <p:ext uri="{D42A27DB-BD31-4B8C-83A1-F6EECF244321}">
-                <p14:modId xmlns:p14="http://schemas.microsoft.com/office/powerpoint/2010/main" val="3609787848"/>
+                <p14:modId xmlns:p14="http://schemas.microsoft.com/office/powerpoint/2010/main" val="3467343101"/>
               </p:ext>
             </p:extLst>
           </p:nvPr>
@@ -12142,14 +13630,23 @@
                     <a:lstStyle/>
                     <a:p>
                       <a:r>
-                        <a:rPr lang="es-MX" dirty="0" smtClean="0"/>
+                        <a:rPr lang="es-MX" dirty="0" smtClean="0">
+                          <a:latin typeface="Arial" pitchFamily="34" charset="0"/>
+                          <a:cs typeface="Arial" pitchFamily="34" charset="0"/>
+                        </a:rPr>
                         <a:t>File </a:t>
                       </a:r>
                       <a:r>
-                        <a:rPr lang="es-MX" dirty="0" err="1" smtClean="0"/>
+                        <a:rPr lang="es-MX" dirty="0" err="1" smtClean="0">
+                          <a:latin typeface="Arial" pitchFamily="34" charset="0"/>
+                          <a:cs typeface="Arial" pitchFamily="34" charset="0"/>
+                        </a:rPr>
                         <a:t>Name</a:t>
                       </a:r>
-                      <a:endParaRPr lang="es-MX" dirty="0"/>
+                      <a:endParaRPr lang="es-MX" dirty="0">
+                        <a:latin typeface="Arial" pitchFamily="34" charset="0"/>
+                        <a:cs typeface="Arial" pitchFamily="34" charset="0"/>
+                      </a:endParaRPr>
                     </a:p>
                   </a:txBody>
                   <a:tcPr/>
@@ -12160,10 +13657,16 @@
                     <a:lstStyle/>
                     <a:p>
                       <a:r>
-                        <a:rPr lang="es-MX" dirty="0" err="1" smtClean="0"/>
+                        <a:rPr lang="es-MX" dirty="0" err="1" smtClean="0">
+                          <a:latin typeface="Arial" pitchFamily="34" charset="0"/>
+                          <a:cs typeface="Arial" pitchFamily="34" charset="0"/>
+                        </a:rPr>
                         <a:t>Description</a:t>
                       </a:r>
-                      <a:endParaRPr lang="es-MX" dirty="0"/>
+                      <a:endParaRPr lang="es-MX" dirty="0">
+                        <a:latin typeface="Arial" pitchFamily="34" charset="0"/>
+                        <a:cs typeface="Arial" pitchFamily="34" charset="0"/>
+                      </a:endParaRPr>
                     </a:p>
                   </a:txBody>
                   <a:tcPr/>
@@ -12875,14 +14378,42 @@
                           <a:latin typeface="Arial" panose="020B0604020202020204" pitchFamily="34" charset="0"/>
                           <a:cs typeface="Arial" panose="020B0604020202020204" pitchFamily="34" charset="0"/>
                         </a:rPr>
-                        <a:t> PORTA</a:t>
+                        <a:t> </a:t>
+                      </a:r>
+                      <a:r>
+                        <a:rPr lang="es-MX" sz="1400" b="0" dirty="0" smtClean="0">
+                          <a:latin typeface="Arial" panose="020B0604020202020204" pitchFamily="34" charset="0"/>
+                          <a:cs typeface="Arial" panose="020B0604020202020204" pitchFamily="34" charset="0"/>
+                        </a:rPr>
+                        <a:t>PORT</a:t>
                       </a:r>
                       <a:r>
                         <a:rPr lang="es-MX" sz="1400" b="0" baseline="0" dirty="0" smtClean="0">
                           <a:latin typeface="Arial" panose="020B0604020202020204" pitchFamily="34" charset="0"/>
                           <a:cs typeface="Arial" panose="020B0604020202020204" pitchFamily="34" charset="0"/>
                         </a:rPr>
-                        <a:t>  as outputs and led1 to led4 </a:t>
+                        <a:t> </a:t>
+                      </a:r>
+                      <a:r>
+                        <a:rPr lang="es-MX" sz="1400" b="0" dirty="0" smtClean="0">
+                          <a:latin typeface="Arial" panose="020B0604020202020204" pitchFamily="34" charset="0"/>
+                          <a:cs typeface="Arial" panose="020B0604020202020204" pitchFamily="34" charset="0"/>
+                        </a:rPr>
+                        <a:t>A</a:t>
+                      </a:r>
+                      <a:r>
+                        <a:rPr lang="es-MX" sz="1400" b="0" baseline="0" dirty="0" smtClean="0">
+                          <a:latin typeface="Arial" panose="020B0604020202020204" pitchFamily="34" charset="0"/>
+                          <a:cs typeface="Arial" panose="020B0604020202020204" pitchFamily="34" charset="0"/>
+                        </a:rPr>
+                        <a:t>  </a:t>
+                      </a:r>
+                      <a:r>
+                        <a:rPr lang="es-MX" sz="1400" b="0" baseline="0" dirty="0" smtClean="0">
+                          <a:latin typeface="Arial" panose="020B0604020202020204" pitchFamily="34" charset="0"/>
+                          <a:cs typeface="Arial" panose="020B0604020202020204" pitchFamily="34" charset="0"/>
+                        </a:rPr>
+                        <a:t>as outputs and led1 to led4 </a:t>
                       </a:r>
                       <a:r>
                         <a:rPr lang="es-MX" sz="1400" b="0" baseline="0" dirty="0" err="1" smtClean="0">
@@ -12896,14 +14427,7 @@
                           <a:latin typeface="Arial" panose="020B0604020202020204" pitchFamily="34" charset="0"/>
                           <a:cs typeface="Arial" panose="020B0604020202020204" pitchFamily="34" charset="0"/>
                         </a:rPr>
-                        <a:t> </a:t>
-                      </a:r>
-                      <a:r>
-                        <a:rPr lang="es-MX" sz="1400" b="0" baseline="0" dirty="0" err="1" smtClean="0">
-                          <a:latin typeface="Arial" panose="020B0604020202020204" pitchFamily="34" charset="0"/>
-                          <a:cs typeface="Arial" panose="020B0604020202020204" pitchFamily="34" charset="0"/>
-                        </a:rPr>
-                        <a:t>board</a:t>
+                        <a:t> board</a:t>
                       </a:r>
                       <a:endParaRPr lang="es-MX" sz="1400" b="0" dirty="0">
                         <a:latin typeface="Arial" panose="020B0604020202020204" pitchFamily="34" charset="0"/>
@@ -13421,13 +14945,13 @@
                     <a:lstStyle/>
                     <a:p>
                       <a:r>
-                        <a:rPr lang="es-MX" sz="1400" b="0" dirty="0" err="1" smtClean="0">
+                        <a:rPr lang="en-US" sz="1400" b="0" noProof="0" dirty="0" err="1" smtClean="0">
                           <a:latin typeface="Arial" panose="020B0604020202020204" pitchFamily="34" charset="0"/>
                           <a:cs typeface="Arial" panose="020B0604020202020204" pitchFamily="34" charset="0"/>
                         </a:rPr>
                         <a:t>Kernel.h</a:t>
                       </a:r>
-                      <a:endParaRPr lang="es-MX" sz="1400" b="0" dirty="0">
+                      <a:endParaRPr lang="en-US" sz="1400" b="0" noProof="0" dirty="0">
                         <a:latin typeface="Arial" panose="020B0604020202020204" pitchFamily="34" charset="0"/>
                         <a:cs typeface="Arial" panose="020B0604020202020204" pitchFamily="34" charset="0"/>
                       </a:endParaRPr>
@@ -13601,7 +15125,7 @@
           <p:nvPr>
             <p:extLst>
               <p:ext uri="{D42A27DB-BD31-4B8C-83A1-F6EECF244321}">
-                <p14:modId xmlns:p14="http://schemas.microsoft.com/office/powerpoint/2010/main" val="2496454293"/>
+                <p14:modId xmlns:p14="http://schemas.microsoft.com/office/powerpoint/2010/main" val="3573617520"/>
               </p:ext>
             </p:extLst>
           </p:nvPr>
@@ -13619,8 +15143,8 @@
               <a:tblGrid>
                 <a:gridCol w="1365955"/>
                 <a:gridCol w="1016000"/>
-                <a:gridCol w="1715911"/>
-                <a:gridCol w="1128889"/>
+                <a:gridCol w="1808925"/>
+                <a:gridCol w="1035875"/>
                 <a:gridCol w="3578578"/>
               </a:tblGrid>
               <a:tr h="370840">
@@ -14359,7 +15883,7 @@
     </a:clrScheme>
     <a:fontScheme name="Facet">
       <a:majorFont>
-        <a:latin typeface="Trebuchet MS" panose="020B0603020202020204"/>
+        <a:latin typeface="Trebuchet MS"/>
         <a:ea typeface=""/>
         <a:cs typeface=""/>
         <a:font script="Jpan" typeface="メイリオ"/>
@@ -14394,7 +15918,7 @@
         <a:font script="Geor" typeface="Sylfaen"/>
       </a:majorFont>
       <a:minorFont>
-        <a:latin typeface="Trebuchet MS" panose="020B0603020202020204"/>
+        <a:latin typeface="Trebuchet MS"/>
         <a:ea typeface=""/>
         <a:cs typeface=""/>
         <a:font script="Jpan" typeface="メイリオ"/>
@@ -14567,7 +16091,7 @@
   <a:extraClrSchemeLst/>
   <a:extLst>
     <a:ext uri="{05A4C25C-085E-4340-85A3-A5531E510DB2}">
-      <thm15:themeFamily xmlns:thm15="http://schemas.microsoft.com/office/thememl/2012/main" name="Facet" id="{C0C680CD-088A-49FC-A102-D699147F32B2}" vid="{CFBC31BA-B70F-4F30-BCAA-4F3011E16C4D}"/>
+      <thm15:themeFamily xmlns:thm15="http://schemas.microsoft.com/office/thememl/2012/main" xmlns="" name="Facet" id="{C0C680CD-088A-49FC-A102-D699147F32B2}" vid="{CFBC31BA-B70F-4F30-BCAA-4F3011E16C4D}"/>
     </a:ext>
   </a:extLst>
 </a:theme>

</xml_diff>

<commit_message>
subida de manual version 2
</commit_message>
<xml_diff>
--- a/Scheduler Module.pptx
+++ b/Scheduler Module.pptx
@@ -129,7 +129,7 @@
   </p:defaultTextStyle>
   <p:extLst>
     <p:ext uri="{EFAFB233-063F-42B5-8137-9DF3F51BA10A}">
-      <p15:sldGuideLst xmlns:p15="http://schemas.microsoft.com/office/powerpoint/2012/main" xmlns=""/>
+      <p15:sldGuideLst xmlns="" xmlns:p15="http://schemas.microsoft.com/office/powerpoint/2012/main"/>
     </p:ext>
   </p:extLst>
 </p:presentation>
@@ -140,7 +140,7 @@
   <p:cmAuthor id="1" name="HP 240" initials="H2" lastIdx="1" clrIdx="0">
     <p:extLst>
       <p:ext uri="{19B8F6BF-5375-455C-9EA6-DF929625EA0E}">
-        <p15:presenceInfo xmlns:p15="http://schemas.microsoft.com/office/powerpoint/2012/main" xmlns="" userId="HP 240" providerId="None"/>
+        <p15:presenceInfo xmlns="" xmlns:p15="http://schemas.microsoft.com/office/powerpoint/2012/main" userId="HP 240" providerId="None"/>
       </p:ext>
     </p:extLst>
   </p:cmAuthor>
@@ -870,7 +870,7 @@
             <a:fld id="{B61BEF0D-F0BB-DE4B-95CE-6DB70DBA9567}" type="datetimeFigureOut">
               <a:rPr lang="en-US" dirty="0"/>
               <a:pPr/>
-              <a:t>11/17/2015</a:t>
+              <a:t>11/18/2015</a:t>
             </a:fld>
             <a:endParaRPr lang="en-US" dirty="0"/>
           </a:p>
@@ -1118,7 +1118,7 @@
             <a:fld id="{B61BEF0D-F0BB-DE4B-95CE-6DB70DBA9567}" type="datetimeFigureOut">
               <a:rPr lang="en-US" dirty="0"/>
               <a:pPr/>
-              <a:t>11/17/2015</a:t>
+              <a:t>11/18/2015</a:t>
             </a:fld>
             <a:endParaRPr lang="en-US" dirty="0"/>
           </a:p>
@@ -1429,7 +1429,7 @@
             <a:fld id="{B61BEF0D-F0BB-DE4B-95CE-6DB70DBA9567}" type="datetimeFigureOut">
               <a:rPr lang="en-US" dirty="0"/>
               <a:pPr/>
-              <a:t>11/17/2015</a:t>
+              <a:t>11/18/2015</a:t>
             </a:fld>
             <a:endParaRPr lang="en-US" dirty="0"/>
           </a:p>
@@ -1767,7 +1767,7 @@
             <a:fld id="{B61BEF0D-F0BB-DE4B-95CE-6DB70DBA9567}" type="datetimeFigureOut">
               <a:rPr lang="en-US" dirty="0"/>
               <a:pPr/>
-              <a:t>11/17/2015</a:t>
+              <a:t>11/18/2015</a:t>
             </a:fld>
             <a:endParaRPr lang="en-US" dirty="0"/>
           </a:p>
@@ -2078,7 +2078,7 @@
             <a:fld id="{B61BEF0D-F0BB-DE4B-95CE-6DB70DBA9567}" type="datetimeFigureOut">
               <a:rPr lang="en-US" dirty="0"/>
               <a:pPr/>
-              <a:t>11/17/2015</a:t>
+              <a:t>11/18/2015</a:t>
             </a:fld>
             <a:endParaRPr lang="en-US" dirty="0"/>
           </a:p>
@@ -2468,7 +2468,7 @@
             <a:fld id="{B61BEF0D-F0BB-DE4B-95CE-6DB70DBA9567}" type="datetimeFigureOut">
               <a:rPr lang="en-US" dirty="0"/>
               <a:pPr/>
-              <a:t>11/17/2015</a:t>
+              <a:t>11/18/2015</a:t>
             </a:fld>
             <a:endParaRPr lang="en-US" dirty="0"/>
           </a:p>
@@ -2634,7 +2634,7 @@
           <a:p>
             <a:fld id="{55C6B4A9-1611-4792-9094-5F34BCA07E0B}" type="datetimeFigureOut">
               <a:rPr lang="en-US" dirty="0"/>
-              <a:t>11/17/2015</a:t>
+              <a:t>11/18/2015</a:t>
             </a:fld>
             <a:endParaRPr lang="en-US" dirty="0"/>
           </a:p>
@@ -2810,7 +2810,7 @@
             <a:fld id="{B61BEF0D-F0BB-DE4B-95CE-6DB70DBA9567}" type="datetimeFigureOut">
               <a:rPr lang="en-US" dirty="0"/>
               <a:pPr/>
-              <a:t>11/17/2015</a:t>
+              <a:t>11/18/2015</a:t>
             </a:fld>
             <a:endParaRPr lang="en-US" dirty="0"/>
           </a:p>
@@ -2983,7 +2983,7 @@
             <a:fld id="{B61BEF0D-F0BB-DE4B-95CE-6DB70DBA9567}" type="datetimeFigureOut">
               <a:rPr lang="en-US" dirty="0"/>
               <a:pPr/>
-              <a:t>11/17/2015</a:t>
+              <a:t>11/18/2015</a:t>
             </a:fld>
             <a:endParaRPr lang="en-US" dirty="0"/>
           </a:p>
@@ -3227,7 +3227,7 @@
             <a:fld id="{B61BEF0D-F0BB-DE4B-95CE-6DB70DBA9567}" type="datetimeFigureOut">
               <a:rPr lang="en-US" dirty="0"/>
               <a:pPr/>
-              <a:t>11/17/2015</a:t>
+              <a:t>11/18/2015</a:t>
             </a:fld>
             <a:endParaRPr lang="en-US" dirty="0"/>
           </a:p>
@@ -3455,7 +3455,7 @@
           <a:p>
             <a:fld id="{EB712588-04B1-427B-82EE-E8DB90309F08}" type="datetimeFigureOut">
               <a:rPr lang="en-US" dirty="0"/>
-              <a:t>11/17/2015</a:t>
+              <a:t>11/18/2015</a:t>
             </a:fld>
             <a:endParaRPr lang="en-US" dirty="0"/>
           </a:p>
@@ -3825,7 +3825,7 @@
             <a:fld id="{B61BEF0D-F0BB-DE4B-95CE-6DB70DBA9567}" type="datetimeFigureOut">
               <a:rPr lang="en-US" dirty="0"/>
               <a:pPr/>
-              <a:t>11/17/2015</a:t>
+              <a:t>11/18/2015</a:t>
             </a:fld>
             <a:endParaRPr lang="en-US" dirty="0"/>
           </a:p>
@@ -3945,7 +3945,7 @@
             <a:fld id="{B61BEF0D-F0BB-DE4B-95CE-6DB70DBA9567}" type="datetimeFigureOut">
               <a:rPr lang="en-US" dirty="0"/>
               <a:pPr/>
-              <a:t>11/17/2015</a:t>
+              <a:t>11/18/2015</a:t>
             </a:fld>
             <a:endParaRPr lang="en-US" dirty="0"/>
           </a:p>
@@ -4037,7 +4037,7 @@
             <a:fld id="{B61BEF0D-F0BB-DE4B-95CE-6DB70DBA9567}" type="datetimeFigureOut">
               <a:rPr lang="en-US" dirty="0"/>
               <a:pPr/>
-              <a:t>11/17/2015</a:t>
+              <a:t>11/18/2015</a:t>
             </a:fld>
             <a:endParaRPr lang="en-US" dirty="0"/>
           </a:p>
@@ -4288,7 +4288,7 @@
           <a:p>
             <a:fld id="{42A54C80-263E-416B-A8E0-580EDEADCBDC}" type="datetimeFigureOut">
               <a:rPr lang="en-US" dirty="0"/>
-              <a:t>11/17/2015</a:t>
+              <a:t>11/18/2015</a:t>
             </a:fld>
             <a:endParaRPr lang="en-US" dirty="0"/>
           </a:p>
@@ -4547,7 +4547,7 @@
             <a:fld id="{B61BEF0D-F0BB-DE4B-95CE-6DB70DBA9567}" type="datetimeFigureOut">
               <a:rPr lang="en-US" dirty="0"/>
               <a:pPr/>
-              <a:t>11/17/2015</a:t>
+              <a:t>11/18/2015</a:t>
             </a:fld>
             <a:endParaRPr lang="en-US" dirty="0"/>
           </a:p>
@@ -5287,7 +5287,7 @@
             <a:fld id="{B61BEF0D-F0BB-DE4B-95CE-6DB70DBA9567}" type="datetimeFigureOut">
               <a:rPr lang="en-US" dirty="0"/>
               <a:pPr/>
-              <a:t>11/17/2015</a:t>
+              <a:t>11/18/2015</a:t>
             </a:fld>
             <a:endParaRPr lang="en-US" dirty="0"/>
           </a:p>
@@ -5907,6 +5907,7 @@
               </a:bodyPr>
               <a:lstStyle/>
               <a:p>
+                <a:pPr/>
                 <a14:m>
                   <m:oMathPara xmlns:m="http://schemas.openxmlformats.org/officeDocument/2006/math">
                     <m:oMathParaPr>
@@ -6052,6 +6053,18 @@
                                   </m:r>
                                 </m:sup>
                               </m:sSup>
+                              <m:r>
+                                <a:rPr lang="es-MX" b="0" i="1" smtClean="0">
+                                  <a:latin typeface="Cambria Math"/>
+                                </a:rPr>
+                                <m:t> </m:t>
+                              </m:r>
+                              <m:r>
+                                <a:rPr lang="es-MX" b="0" i="1" smtClean="0">
+                                  <a:latin typeface="Cambria Math"/>
+                                </a:rPr>
+                                <m:t>𝑠𝑒𝑔</m:t>
+                              </m:r>
                             </m:e>
                           </m:d>
                           <m:r>
@@ -6205,7 +6218,10 @@
                       <m:rPr>
                         <m:nor/>
                       </m:rPr>
-                      <a:rPr lang="es-MX" dirty="0" smtClean="0"/>
+                      <a:rPr lang="es-MX" dirty="0" smtClean="0">
+                        <a:latin typeface="Arial" pitchFamily="34" charset="0"/>
+                        <a:cs typeface="Arial" pitchFamily="34" charset="0"/>
+                      </a:rPr>
                       <m:t>DECIMAL</m:t>
                     </m:r>
                     <m:r>
@@ -6266,18 +6282,30 @@
                   </m:oMath>
                 </a14:m>
                 <a:r>
-                  <a:rPr lang="es-MX" u="sng" dirty="0" smtClean="0"/>
+                  <a:rPr lang="es-MX" u="sng" dirty="0" smtClean="0">
+                    <a:latin typeface="Arial" pitchFamily="34" charset="0"/>
+                    <a:cs typeface="Arial" pitchFamily="34" charset="0"/>
+                  </a:rPr>
                   <a:t>HEX =</a:t>
                 </a:r>
                 <a:r>
-                  <a:rPr lang="es-MX" u="sng" dirty="0"/>
+                  <a:rPr lang="es-MX" u="sng" dirty="0">
+                    <a:latin typeface="Arial" pitchFamily="34" charset="0"/>
+                    <a:cs typeface="Arial" pitchFamily="34" charset="0"/>
+                  </a:rPr>
                   <a:t> </a:t>
                 </a:r>
                 <a:r>
-                  <a:rPr lang="es-MX" u="sng" dirty="0" smtClean="0"/>
+                  <a:rPr lang="es-MX" u="sng" dirty="0" smtClean="0">
+                    <a:latin typeface="Arial" pitchFamily="34" charset="0"/>
+                    <a:cs typeface="Arial" pitchFamily="34" charset="0"/>
+                  </a:rPr>
                   <a:t>0x0000FA00</a:t>
                 </a:r>
-                <a:endParaRPr lang="es-MX" u="sng" dirty="0"/>
+                <a:endParaRPr lang="es-MX" u="sng" dirty="0">
+                  <a:latin typeface="Arial" pitchFamily="34" charset="0"/>
+                  <a:cs typeface="Arial" pitchFamily="34" charset="0"/>
+                </a:endParaRPr>
               </a:p>
               <a:p>
                 <a:endParaRPr lang="es-MX" dirty="0"/>
@@ -6305,7 +6333,7 @@
               <a:blipFill rotWithShape="1">
                 <a:blip r:embed="rId3"/>
                 <a:stretch>
-                  <a:fillRect t="-5660"/>
+                  <a:fillRect t="-4717"/>
                 </a:stretch>
               </a:blipFill>
             </p:spPr>
@@ -6363,7 +6391,7 @@
           <p:nvPr>
             <p:extLst>
               <p:ext uri="{D42A27DB-BD31-4B8C-83A1-F6EECF244321}">
-                <p14:modId xmlns:p14="http://schemas.microsoft.com/office/powerpoint/2010/main" val="583559261"/>
+                <p14:modId xmlns:p14="http://schemas.microsoft.com/office/powerpoint/2010/main" val="3108547823"/>
               </p:ext>
             </p:extLst>
           </p:nvPr>
@@ -6389,16 +6417,25 @@
                     <a:bodyPr/>
                     <a:lstStyle/>
                     <a:p>
-                      <a:pPr algn="ctr"/>
-                      <a:r>
-                        <a:rPr lang="es-MX" dirty="0" err="1" smtClean="0"/>
+                      <a:pPr algn="l"/>
+                      <a:r>
+                        <a:rPr lang="es-MX" dirty="0" err="1" smtClean="0">
+                          <a:latin typeface="Arial" pitchFamily="34" charset="0"/>
+                          <a:cs typeface="Arial" pitchFamily="34" charset="0"/>
+                        </a:rPr>
                         <a:t>Name</a:t>
                       </a:r>
                       <a:r>
-                        <a:rPr lang="es-MX" dirty="0" smtClean="0"/>
+                        <a:rPr lang="es-MX" dirty="0" smtClean="0">
+                          <a:latin typeface="Arial" pitchFamily="34" charset="0"/>
+                          <a:cs typeface="Arial" pitchFamily="34" charset="0"/>
+                        </a:rPr>
                         <a:t>:</a:t>
                       </a:r>
-                      <a:endParaRPr lang="es-MX" dirty="0"/>
+                      <a:endParaRPr lang="es-MX" dirty="0">
+                        <a:latin typeface="Arial" pitchFamily="34" charset="0"/>
+                        <a:cs typeface="Arial" pitchFamily="34" charset="0"/>
+                      </a:endParaRPr>
                     </a:p>
                   </a:txBody>
                   <a:tcPr/>
@@ -6408,12 +6445,18 @@
                     <a:bodyPr/>
                     <a:lstStyle/>
                     <a:p>
-                      <a:pPr algn="ctr"/>
-                      <a:r>
-                        <a:rPr lang="es-MX" dirty="0" err="1" smtClean="0"/>
+                      <a:pPr algn="l"/>
+                      <a:r>
+                        <a:rPr lang="es-MX" dirty="0" err="1" smtClean="0">
+                          <a:latin typeface="Arial" pitchFamily="34" charset="0"/>
+                          <a:cs typeface="Arial" pitchFamily="34" charset="0"/>
+                        </a:rPr>
                         <a:t>taskStateType</a:t>
                       </a:r>
-                      <a:endParaRPr lang="es-MX" dirty="0"/>
+                      <a:endParaRPr lang="es-MX" dirty="0">
+                        <a:latin typeface="Arial" pitchFamily="34" charset="0"/>
+                        <a:cs typeface="Arial" pitchFamily="34" charset="0"/>
+                      </a:endParaRPr>
                     </a:p>
                   </a:txBody>
                   <a:tcPr/>
@@ -6435,16 +6478,25 @@
                     <a:bodyPr/>
                     <a:lstStyle/>
                     <a:p>
-                      <a:pPr algn="ctr"/>
-                      <a:r>
-                        <a:rPr lang="es-MX" dirty="0" err="1" smtClean="0"/>
+                      <a:pPr algn="l"/>
+                      <a:r>
+                        <a:rPr lang="es-MX" dirty="0" err="1" smtClean="0">
+                          <a:latin typeface="Arial" pitchFamily="34" charset="0"/>
+                          <a:cs typeface="Arial" pitchFamily="34" charset="0"/>
+                        </a:rPr>
                         <a:t>Type</a:t>
                       </a:r>
                       <a:r>
-                        <a:rPr lang="es-MX" dirty="0" smtClean="0"/>
+                        <a:rPr lang="es-MX" dirty="0" smtClean="0">
+                          <a:latin typeface="Arial" pitchFamily="34" charset="0"/>
+                          <a:cs typeface="Arial" pitchFamily="34" charset="0"/>
+                        </a:rPr>
                         <a:t>: </a:t>
                       </a:r>
-                      <a:endParaRPr lang="es-MX" dirty="0"/>
+                      <a:endParaRPr lang="es-MX" dirty="0">
+                        <a:latin typeface="Arial" pitchFamily="34" charset="0"/>
+                        <a:cs typeface="Arial" pitchFamily="34" charset="0"/>
+                      </a:endParaRPr>
                     </a:p>
                   </a:txBody>
                   <a:tcPr/>
@@ -6454,12 +6506,18 @@
                     <a:bodyPr/>
                     <a:lstStyle/>
                     <a:p>
-                      <a:pPr algn="ctr"/>
-                      <a:r>
-                        <a:rPr lang="es-MX" dirty="0" smtClean="0"/>
+                      <a:pPr algn="l"/>
+                      <a:r>
+                        <a:rPr lang="es-MX" dirty="0" smtClean="0">
+                          <a:latin typeface="Arial" pitchFamily="34" charset="0"/>
+                          <a:cs typeface="Arial" pitchFamily="34" charset="0"/>
+                        </a:rPr>
                         <a:t>U8</a:t>
                       </a:r>
-                      <a:endParaRPr lang="es-MX" dirty="0"/>
+                      <a:endParaRPr lang="es-MX" dirty="0">
+                        <a:latin typeface="Arial" pitchFamily="34" charset="0"/>
+                        <a:cs typeface="Arial" pitchFamily="34" charset="0"/>
+                      </a:endParaRPr>
                     </a:p>
                   </a:txBody>
                   <a:tcPr/>
@@ -6481,16 +6539,25 @@
                     <a:bodyPr/>
                     <a:lstStyle/>
                     <a:p>
-                      <a:pPr algn="ctr"/>
-                      <a:r>
-                        <a:rPr lang="es-MX" dirty="0" err="1" smtClean="0"/>
+                      <a:pPr algn="l"/>
+                      <a:r>
+                        <a:rPr lang="es-MX" dirty="0" err="1" smtClean="0">
+                          <a:latin typeface="Arial" pitchFamily="34" charset="0"/>
+                          <a:cs typeface="Arial" pitchFamily="34" charset="0"/>
+                        </a:rPr>
                         <a:t>Range</a:t>
                       </a:r>
                       <a:r>
-                        <a:rPr lang="es-MX" dirty="0" smtClean="0"/>
+                        <a:rPr lang="es-MX" dirty="0" smtClean="0">
+                          <a:latin typeface="Arial" pitchFamily="34" charset="0"/>
+                          <a:cs typeface="Arial" pitchFamily="34" charset="0"/>
+                        </a:rPr>
                         <a:t>: </a:t>
                       </a:r>
-                      <a:endParaRPr lang="es-MX" dirty="0"/>
+                      <a:endParaRPr lang="es-MX" dirty="0">
+                        <a:latin typeface="Arial" pitchFamily="34" charset="0"/>
+                        <a:cs typeface="Arial" pitchFamily="34" charset="0"/>
+                      </a:endParaRPr>
                     </a:p>
                   </a:txBody>
                   <a:tcPr/>
@@ -6502,10 +6569,16 @@
                     <a:p>
                       <a:pPr algn="l"/>
                       <a:r>
-                        <a:rPr lang="es-MX" dirty="0" err="1" smtClean="0"/>
+                        <a:rPr lang="es-MX" dirty="0" err="1" smtClean="0">
+                          <a:latin typeface="Arial" pitchFamily="34" charset="0"/>
+                          <a:cs typeface="Arial" pitchFamily="34" charset="0"/>
+                        </a:rPr>
                         <a:t>Task_state_suspended</a:t>
                       </a:r>
-                      <a:endParaRPr lang="es-MX" dirty="0"/>
+                      <a:endParaRPr lang="es-MX" dirty="0">
+                        <a:latin typeface="Arial" pitchFamily="34" charset="0"/>
+                        <a:cs typeface="Arial" pitchFamily="34" charset="0"/>
+                      </a:endParaRPr>
                     </a:p>
                   </a:txBody>
                   <a:tcPr/>
@@ -6517,34 +6590,58 @@
                     <a:p>
                       <a:pPr algn="l"/>
                       <a:r>
-                        <a:rPr lang="es-MX" dirty="0" err="1" smtClean="0"/>
+                        <a:rPr lang="es-MX" dirty="0" err="1" smtClean="0">
+                          <a:latin typeface="Arial" pitchFamily="34" charset="0"/>
+                          <a:cs typeface="Arial" pitchFamily="34" charset="0"/>
+                        </a:rPr>
                         <a:t>Task</a:t>
                       </a:r>
                       <a:r>
-                        <a:rPr lang="es-MX" dirty="0" smtClean="0"/>
+                        <a:rPr lang="es-MX" dirty="0" smtClean="0">
+                          <a:latin typeface="Arial" pitchFamily="34" charset="0"/>
+                          <a:cs typeface="Arial" pitchFamily="34" charset="0"/>
+                        </a:rPr>
                         <a:t> </a:t>
                       </a:r>
                       <a:r>
-                        <a:rPr lang="es-MX" dirty="0" err="1" smtClean="0"/>
+                        <a:rPr lang="es-MX" dirty="0" err="1" smtClean="0">
+                          <a:latin typeface="Arial" pitchFamily="34" charset="0"/>
+                          <a:cs typeface="Arial" pitchFamily="34" charset="0"/>
+                        </a:rPr>
                         <a:t>state</a:t>
                       </a:r>
                       <a:r>
-                        <a:rPr lang="es-MX" dirty="0" smtClean="0"/>
+                        <a:rPr lang="es-MX" dirty="0" smtClean="0">
+                          <a:latin typeface="Arial" pitchFamily="34" charset="0"/>
+                          <a:cs typeface="Arial" pitchFamily="34" charset="0"/>
+                        </a:rPr>
                         <a:t> </a:t>
                       </a:r>
                       <a:r>
-                        <a:rPr lang="es-MX" dirty="0" err="1" smtClean="0"/>
+                        <a:rPr lang="es-MX" dirty="0" err="1" smtClean="0">
+                          <a:latin typeface="Arial" pitchFamily="34" charset="0"/>
+                          <a:cs typeface="Arial" pitchFamily="34" charset="0"/>
+                        </a:rPr>
                         <a:t>initial</a:t>
                       </a:r>
                       <a:r>
-                        <a:rPr lang="es-MX" dirty="0" smtClean="0"/>
+                        <a:rPr lang="es-MX" dirty="0" smtClean="0">
+                          <a:latin typeface="Arial" pitchFamily="34" charset="0"/>
+                          <a:cs typeface="Arial" pitchFamily="34" charset="0"/>
+                        </a:rPr>
                         <a:t> </a:t>
                       </a:r>
                       <a:r>
-                        <a:rPr lang="es-MX" dirty="0" err="1" smtClean="0"/>
+                        <a:rPr lang="es-MX" dirty="0" err="1" smtClean="0">
+                          <a:latin typeface="Arial" pitchFamily="34" charset="0"/>
+                          <a:cs typeface="Arial" pitchFamily="34" charset="0"/>
+                        </a:rPr>
                         <a:t>value</a:t>
                       </a:r>
-                      <a:endParaRPr lang="es-MX" dirty="0"/>
+                      <a:endParaRPr lang="es-MX" dirty="0">
+                        <a:latin typeface="Arial" pitchFamily="34" charset="0"/>
+                        <a:cs typeface="Arial" pitchFamily="34" charset="0"/>
+                      </a:endParaRPr>
                     </a:p>
                   </a:txBody>
                   <a:tcPr/>
@@ -6556,8 +6653,11 @@
                     <a:bodyPr/>
                     <a:lstStyle/>
                     <a:p>
-                      <a:pPr algn="ctr"/>
-                      <a:endParaRPr lang="es-MX" dirty="0"/>
+                      <a:pPr algn="l"/>
+                      <a:endParaRPr lang="es-MX" dirty="0">
+                        <a:latin typeface="Arial" pitchFamily="34" charset="0"/>
+                        <a:cs typeface="Arial" pitchFamily="34" charset="0"/>
+                      </a:endParaRPr>
                     </a:p>
                   </a:txBody>
                   <a:tcPr/>
@@ -6569,10 +6669,16 @@
                     <a:p>
                       <a:pPr algn="l"/>
                       <a:r>
-                        <a:rPr lang="es-MX" dirty="0" err="1" smtClean="0"/>
+                        <a:rPr lang="es-MX" dirty="0" err="1" smtClean="0">
+                          <a:latin typeface="Arial" pitchFamily="34" charset="0"/>
+                          <a:cs typeface="Arial" pitchFamily="34" charset="0"/>
+                        </a:rPr>
                         <a:t>Task_state_ready</a:t>
                       </a:r>
-                      <a:endParaRPr lang="es-MX" dirty="0"/>
+                      <a:endParaRPr lang="es-MX" dirty="0">
+                        <a:latin typeface="Arial" pitchFamily="34" charset="0"/>
+                        <a:cs typeface="Arial" pitchFamily="34" charset="0"/>
+                      </a:endParaRPr>
                     </a:p>
                   </a:txBody>
                   <a:tcPr/>
@@ -6584,66 +6690,114 @@
                     <a:p>
                       <a:pPr algn="l"/>
                       <a:r>
-                        <a:rPr lang="es-MX" dirty="0" err="1" smtClean="0"/>
+                        <a:rPr lang="es-MX" dirty="0" err="1" smtClean="0">
+                          <a:latin typeface="Arial" pitchFamily="34" charset="0"/>
+                          <a:cs typeface="Arial" pitchFamily="34" charset="0"/>
+                        </a:rPr>
                         <a:t>Task</a:t>
                       </a:r>
                       <a:r>
-                        <a:rPr lang="es-MX" dirty="0" smtClean="0"/>
+                        <a:rPr lang="es-MX" dirty="0" smtClean="0">
+                          <a:latin typeface="Arial" pitchFamily="34" charset="0"/>
+                          <a:cs typeface="Arial" pitchFamily="34" charset="0"/>
+                        </a:rPr>
                         <a:t> </a:t>
                       </a:r>
                       <a:r>
-                        <a:rPr lang="es-MX" dirty="0" err="1" smtClean="0"/>
+                        <a:rPr lang="es-MX" dirty="0" err="1" smtClean="0">
+                          <a:latin typeface="Arial" pitchFamily="34" charset="0"/>
+                          <a:cs typeface="Arial" pitchFamily="34" charset="0"/>
+                        </a:rPr>
                         <a:t>state</a:t>
                       </a:r>
                       <a:r>
-                        <a:rPr lang="es-MX" baseline="0" dirty="0" smtClean="0"/>
+                        <a:rPr lang="es-MX" baseline="0" dirty="0" smtClean="0">
+                          <a:latin typeface="Arial" pitchFamily="34" charset="0"/>
+                          <a:cs typeface="Arial" pitchFamily="34" charset="0"/>
+                        </a:rPr>
                         <a:t> </a:t>
                       </a:r>
                       <a:r>
-                        <a:rPr lang="es-MX" baseline="0" dirty="0" err="1" smtClean="0"/>
+                        <a:rPr lang="es-MX" baseline="0" dirty="0" err="1" smtClean="0">
+                          <a:latin typeface="Arial" pitchFamily="34" charset="0"/>
+                          <a:cs typeface="Arial" pitchFamily="34" charset="0"/>
+                        </a:rPr>
                         <a:t>indicates</a:t>
                       </a:r>
                       <a:r>
-                        <a:rPr lang="es-MX" baseline="0" dirty="0" smtClean="0"/>
+                        <a:rPr lang="es-MX" baseline="0" dirty="0" smtClean="0">
+                          <a:latin typeface="Arial" pitchFamily="34" charset="0"/>
+                          <a:cs typeface="Arial" pitchFamily="34" charset="0"/>
+                        </a:rPr>
                         <a:t> </a:t>
                       </a:r>
                       <a:r>
-                        <a:rPr lang="es-MX" baseline="0" dirty="0" err="1" smtClean="0"/>
+                        <a:rPr lang="es-MX" baseline="0" dirty="0" err="1" smtClean="0">
+                          <a:latin typeface="Arial" pitchFamily="34" charset="0"/>
+                          <a:cs typeface="Arial" pitchFamily="34" charset="0"/>
+                        </a:rPr>
                         <a:t>the</a:t>
                       </a:r>
                       <a:r>
-                        <a:rPr lang="es-MX" baseline="0" dirty="0" smtClean="0"/>
+                        <a:rPr lang="es-MX" baseline="0" dirty="0" smtClean="0">
+                          <a:latin typeface="Arial" pitchFamily="34" charset="0"/>
+                          <a:cs typeface="Arial" pitchFamily="34" charset="0"/>
+                        </a:rPr>
                         <a:t> </a:t>
                       </a:r>
                       <a:r>
-                        <a:rPr lang="es-MX" baseline="0" dirty="0" err="1" smtClean="0"/>
+                        <a:rPr lang="es-MX" baseline="0" dirty="0" err="1" smtClean="0">
+                          <a:latin typeface="Arial" pitchFamily="34" charset="0"/>
+                          <a:cs typeface="Arial" pitchFamily="34" charset="0"/>
+                        </a:rPr>
                         <a:t>task</a:t>
                       </a:r>
                       <a:r>
-                        <a:rPr lang="es-MX" baseline="0" dirty="0" smtClean="0"/>
+                        <a:rPr lang="es-MX" baseline="0" dirty="0" smtClean="0">
+                          <a:latin typeface="Arial" pitchFamily="34" charset="0"/>
+                          <a:cs typeface="Arial" pitchFamily="34" charset="0"/>
+                        </a:rPr>
                         <a:t> </a:t>
                       </a:r>
                       <a:r>
-                        <a:rPr lang="es-MX" baseline="0" dirty="0" err="1" smtClean="0"/>
+                        <a:rPr lang="es-MX" baseline="0" dirty="0" err="1" smtClean="0">
+                          <a:latin typeface="Arial" pitchFamily="34" charset="0"/>
+                          <a:cs typeface="Arial" pitchFamily="34" charset="0"/>
+                        </a:rPr>
                         <a:t>is</a:t>
                       </a:r>
                       <a:r>
-                        <a:rPr lang="es-MX" baseline="0" dirty="0" smtClean="0"/>
+                        <a:rPr lang="es-MX" baseline="0" dirty="0" smtClean="0">
+                          <a:latin typeface="Arial" pitchFamily="34" charset="0"/>
+                          <a:cs typeface="Arial" pitchFamily="34" charset="0"/>
+                        </a:rPr>
                         <a:t> </a:t>
                       </a:r>
                       <a:r>
-                        <a:rPr lang="es-MX" baseline="0" dirty="0" err="1" smtClean="0"/>
+                        <a:rPr lang="es-MX" baseline="0" dirty="0" err="1" smtClean="0">
+                          <a:latin typeface="Arial" pitchFamily="34" charset="0"/>
+                          <a:cs typeface="Arial" pitchFamily="34" charset="0"/>
+                        </a:rPr>
                         <a:t>ready</a:t>
                       </a:r>
                       <a:r>
-                        <a:rPr lang="es-MX" baseline="0" dirty="0" smtClean="0"/>
+                        <a:rPr lang="es-MX" baseline="0" dirty="0" smtClean="0">
+                          <a:latin typeface="Arial" pitchFamily="34" charset="0"/>
+                          <a:cs typeface="Arial" pitchFamily="34" charset="0"/>
+                        </a:rPr>
                         <a:t> to be </a:t>
                       </a:r>
                       <a:r>
-                        <a:rPr lang="es-MX" baseline="0" dirty="0" err="1" smtClean="0"/>
+                        <a:rPr lang="es-MX" baseline="0" dirty="0" err="1" smtClean="0">
+                          <a:latin typeface="Arial" pitchFamily="34" charset="0"/>
+                          <a:cs typeface="Arial" pitchFamily="34" charset="0"/>
+                        </a:rPr>
                         <a:t>executed</a:t>
                       </a:r>
-                      <a:endParaRPr lang="es-MX" dirty="0"/>
+                      <a:endParaRPr lang="es-MX" dirty="0">
+                        <a:latin typeface="Arial" pitchFamily="34" charset="0"/>
+                        <a:cs typeface="Arial" pitchFamily="34" charset="0"/>
+                      </a:endParaRPr>
                     </a:p>
                   </a:txBody>
                   <a:tcPr/>
@@ -6667,10 +6821,16 @@
                     <a:p>
                       <a:pPr algn="l"/>
                       <a:r>
-                        <a:rPr lang="es-MX" dirty="0" err="1" smtClean="0"/>
+                        <a:rPr lang="es-MX" dirty="0" err="1" smtClean="0">
+                          <a:latin typeface="Arial" pitchFamily="34" charset="0"/>
+                          <a:cs typeface="Arial" pitchFamily="34" charset="0"/>
+                        </a:rPr>
                         <a:t>Task_state_running</a:t>
                       </a:r>
-                      <a:endParaRPr lang="es-MX" dirty="0"/>
+                      <a:endParaRPr lang="es-MX" dirty="0">
+                        <a:latin typeface="Arial" pitchFamily="34" charset="0"/>
+                        <a:cs typeface="Arial" pitchFamily="34" charset="0"/>
+                      </a:endParaRPr>
                     </a:p>
                   </a:txBody>
                   <a:tcPr/>
@@ -6682,58 +6842,100 @@
                     <a:p>
                       <a:pPr algn="l"/>
                       <a:r>
-                        <a:rPr lang="es-MX" dirty="0" err="1" smtClean="0"/>
+                        <a:rPr lang="es-MX" dirty="0" err="1" smtClean="0">
+                          <a:latin typeface="Arial" pitchFamily="34" charset="0"/>
+                          <a:cs typeface="Arial" pitchFamily="34" charset="0"/>
+                        </a:rPr>
                         <a:t>Task</a:t>
                       </a:r>
                       <a:r>
-                        <a:rPr lang="es-MX" dirty="0" smtClean="0"/>
+                        <a:rPr lang="es-MX" dirty="0" smtClean="0">
+                          <a:latin typeface="Arial" pitchFamily="34" charset="0"/>
+                          <a:cs typeface="Arial" pitchFamily="34" charset="0"/>
+                        </a:rPr>
                         <a:t> </a:t>
                       </a:r>
                       <a:r>
-                        <a:rPr lang="es-MX" dirty="0" err="1" smtClean="0"/>
+                        <a:rPr lang="es-MX" dirty="0" err="1" smtClean="0">
+                          <a:latin typeface="Arial" pitchFamily="34" charset="0"/>
+                          <a:cs typeface="Arial" pitchFamily="34" charset="0"/>
+                        </a:rPr>
                         <a:t>state</a:t>
                       </a:r>
                       <a:r>
-                        <a:rPr lang="es-MX" dirty="0" smtClean="0"/>
+                        <a:rPr lang="es-MX" dirty="0" smtClean="0">
+                          <a:latin typeface="Arial" pitchFamily="34" charset="0"/>
+                          <a:cs typeface="Arial" pitchFamily="34" charset="0"/>
+                        </a:rPr>
                         <a:t> </a:t>
                       </a:r>
                       <a:r>
-                        <a:rPr lang="es-MX" dirty="0" err="1" smtClean="0"/>
+                        <a:rPr lang="es-MX" dirty="0" err="1" smtClean="0">
+                          <a:latin typeface="Arial" pitchFamily="34" charset="0"/>
+                          <a:cs typeface="Arial" pitchFamily="34" charset="0"/>
+                        </a:rPr>
                         <a:t>indicates</a:t>
                       </a:r>
                       <a:r>
-                        <a:rPr lang="es-MX" dirty="0" smtClean="0"/>
+                        <a:rPr lang="es-MX" dirty="0" smtClean="0">
+                          <a:latin typeface="Arial" pitchFamily="34" charset="0"/>
+                          <a:cs typeface="Arial" pitchFamily="34" charset="0"/>
+                        </a:rPr>
                         <a:t> </a:t>
                       </a:r>
                       <a:r>
-                        <a:rPr lang="es-MX" dirty="0" err="1" smtClean="0"/>
+                        <a:rPr lang="es-MX" dirty="0" err="1" smtClean="0">
+                          <a:latin typeface="Arial" pitchFamily="34" charset="0"/>
+                          <a:cs typeface="Arial" pitchFamily="34" charset="0"/>
+                        </a:rPr>
                         <a:t>the</a:t>
                       </a:r>
                       <a:r>
-                        <a:rPr lang="es-MX" dirty="0" smtClean="0"/>
+                        <a:rPr lang="es-MX" dirty="0" smtClean="0">
+                          <a:latin typeface="Arial" pitchFamily="34" charset="0"/>
+                          <a:cs typeface="Arial" pitchFamily="34" charset="0"/>
+                        </a:rPr>
                         <a:t> </a:t>
                       </a:r>
                       <a:r>
-                        <a:rPr lang="es-MX" dirty="0" err="1" smtClean="0"/>
+                        <a:rPr lang="es-MX" dirty="0" err="1" smtClean="0">
+                          <a:latin typeface="Arial" pitchFamily="34" charset="0"/>
+                          <a:cs typeface="Arial" pitchFamily="34" charset="0"/>
+                        </a:rPr>
                         <a:t>task</a:t>
                       </a:r>
                       <a:r>
-                        <a:rPr lang="es-MX" dirty="0" smtClean="0"/>
+                        <a:rPr lang="es-MX" dirty="0" smtClean="0">
+                          <a:latin typeface="Arial" pitchFamily="34" charset="0"/>
+                          <a:cs typeface="Arial" pitchFamily="34" charset="0"/>
+                        </a:rPr>
                         <a:t> </a:t>
                       </a:r>
                       <a:r>
-                        <a:rPr lang="es-MX" dirty="0" err="1" smtClean="0"/>
+                        <a:rPr lang="es-MX" dirty="0" err="1" smtClean="0">
+                          <a:latin typeface="Arial" pitchFamily="34" charset="0"/>
+                          <a:cs typeface="Arial" pitchFamily="34" charset="0"/>
+                        </a:rPr>
                         <a:t>iscurrectly</a:t>
                       </a:r>
                       <a:r>
-                        <a:rPr lang="es-MX" dirty="0" smtClean="0"/>
+                        <a:rPr lang="es-MX" dirty="0" smtClean="0">
+                          <a:latin typeface="Arial" pitchFamily="34" charset="0"/>
+                          <a:cs typeface="Arial" pitchFamily="34" charset="0"/>
+                        </a:rPr>
                         <a:t> </a:t>
                       </a:r>
                       <a:r>
-                        <a:rPr lang="es-MX" dirty="0" err="1" smtClean="0"/>
+                        <a:rPr lang="es-MX" dirty="0" err="1" smtClean="0">
+                          <a:latin typeface="Arial" pitchFamily="34" charset="0"/>
+                          <a:cs typeface="Arial" pitchFamily="34" charset="0"/>
+                        </a:rPr>
                         <a:t>running</a:t>
                       </a:r>
-                      <a:endParaRPr lang="es-MX" dirty="0"/>
+                      <a:endParaRPr lang="es-MX" dirty="0">
+                        <a:latin typeface="Arial" pitchFamily="34" charset="0"/>
+                        <a:cs typeface="Arial" pitchFamily="34" charset="0"/>
+                      </a:endParaRPr>
                     </a:p>
                   </a:txBody>
                   <a:tcPr/>
@@ -6745,16 +6947,25 @@
                     <a:bodyPr/>
                     <a:lstStyle/>
                     <a:p>
-                      <a:pPr algn="r"/>
-                      <a:r>
-                        <a:rPr lang="es-MX" dirty="0" err="1" smtClean="0"/>
+                      <a:pPr algn="l"/>
+                      <a:r>
+                        <a:rPr lang="es-MX" dirty="0" err="1" smtClean="0">
+                          <a:latin typeface="Arial" pitchFamily="34" charset="0"/>
+                          <a:cs typeface="Arial" pitchFamily="34" charset="0"/>
+                        </a:rPr>
                         <a:t>Description</a:t>
                       </a:r>
                       <a:r>
-                        <a:rPr lang="es-MX" dirty="0" smtClean="0"/>
+                        <a:rPr lang="es-MX" dirty="0" smtClean="0">
+                          <a:latin typeface="Arial" pitchFamily="34" charset="0"/>
+                          <a:cs typeface="Arial" pitchFamily="34" charset="0"/>
+                        </a:rPr>
                         <a:t>:</a:t>
                       </a:r>
-                      <a:endParaRPr lang="es-MX" dirty="0"/>
+                      <a:endParaRPr lang="es-MX" dirty="0">
+                        <a:latin typeface="Arial" pitchFamily="34" charset="0"/>
+                        <a:cs typeface="Arial" pitchFamily="34" charset="0"/>
+                      </a:endParaRPr>
                     </a:p>
                   </a:txBody>
                   <a:tcPr/>
@@ -6766,18 +6977,30 @@
                     <a:p>
                       <a:pPr algn="l"/>
                       <a:r>
-                        <a:rPr lang="es-MX" dirty="0" err="1" smtClean="0"/>
+                        <a:rPr lang="es-MX" dirty="0" err="1" smtClean="0">
+                          <a:latin typeface="Arial" pitchFamily="34" charset="0"/>
+                          <a:cs typeface="Arial" pitchFamily="34" charset="0"/>
+                        </a:rPr>
                         <a:t>Task</a:t>
                       </a:r>
                       <a:r>
-                        <a:rPr lang="es-MX" dirty="0" smtClean="0"/>
+                        <a:rPr lang="es-MX" dirty="0" smtClean="0">
+                          <a:latin typeface="Arial" pitchFamily="34" charset="0"/>
+                          <a:cs typeface="Arial" pitchFamily="34" charset="0"/>
+                        </a:rPr>
                         <a:t> </a:t>
                       </a:r>
                       <a:r>
-                        <a:rPr lang="es-MX" dirty="0" err="1" smtClean="0"/>
+                        <a:rPr lang="es-MX" dirty="0" err="1" smtClean="0">
+                          <a:latin typeface="Arial" pitchFamily="34" charset="0"/>
+                          <a:cs typeface="Arial" pitchFamily="34" charset="0"/>
+                        </a:rPr>
                         <a:t>states</a:t>
                       </a:r>
-                      <a:endParaRPr lang="es-MX" dirty="0"/>
+                      <a:endParaRPr lang="es-MX" dirty="0">
+                        <a:latin typeface="Arial" pitchFamily="34" charset="0"/>
+                        <a:cs typeface="Arial" pitchFamily="34" charset="0"/>
+                      </a:endParaRPr>
                     </a:p>
                   </a:txBody>
                   <a:tcPr/>
@@ -8203,7 +8426,7 @@
           <p:nvPr>
             <p:extLst>
               <p:ext uri="{D42A27DB-BD31-4B8C-83A1-F6EECF244321}">
-                <p14:modId xmlns:p14="http://schemas.microsoft.com/office/powerpoint/2010/main" val="1772493531"/>
+                <p14:modId xmlns:p14="http://schemas.microsoft.com/office/powerpoint/2010/main" val="3406683641"/>
               </p:ext>
             </p:extLst>
           </p:nvPr>
@@ -8327,6 +8550,17 @@
                         <a:t> </a:t>
                       </a:r>
                       <a:r>
+                        <a:rPr lang="es-MX" sz="1400" b="1" i="1" kern="1200" dirty="0" err="1" smtClean="0">
+                          <a:solidFill>
+                            <a:schemeClr val="tx1"/>
+                          </a:solidFill>
+                          <a:latin typeface="Arial" panose="020B0604020202020204" pitchFamily="34" charset="0"/>
+                          <a:ea typeface="+mn-ea"/>
+                          <a:cs typeface="Arial" panose="020B0604020202020204" pitchFamily="34" charset="0"/>
+                        </a:rPr>
+                        <a:t>INTC_InstallINTCInterruptHandle</a:t>
+                      </a:r>
+                      <a:r>
                         <a:rPr lang="es-MX" sz="1400" b="0" kern="1200" dirty="0" err="1" smtClean="0">
                           <a:solidFill>
                             <a:schemeClr val="tx1"/>
@@ -8335,7 +8569,7 @@
                           <a:ea typeface="+mn-ea"/>
                           <a:cs typeface="Arial" panose="020B0604020202020204" pitchFamily="34" charset="0"/>
                         </a:rPr>
-                        <a:t>INTC_InstallINTCInterruptHandler</a:t>
+                        <a:t>r</a:t>
                       </a:r>
                       <a:r>
                         <a:rPr lang="es-MX" sz="1400" b="0" kern="1200" dirty="0" smtClean="0">
@@ -9057,7 +9291,7 @@
           <p:nvPr>
             <p:extLst>
               <p:ext uri="{D42A27DB-BD31-4B8C-83A1-F6EECF244321}">
-                <p14:modId xmlns:p14="http://schemas.microsoft.com/office/powerpoint/2010/main" val="2374287867"/>
+                <p14:modId xmlns:p14="http://schemas.microsoft.com/office/powerpoint/2010/main" val="2902970577"/>
               </p:ext>
             </p:extLst>
           </p:nvPr>
@@ -9181,7 +9415,7 @@
                         <a:t> </a:t>
                       </a:r>
                       <a:r>
-                        <a:rPr lang="es-MX" sz="1400" b="0" kern="1200" dirty="0" err="1" smtClean="0">
+                        <a:rPr lang="es-MX" sz="1400" b="1" i="1" kern="1200" dirty="0" err="1" smtClean="0">
                           <a:solidFill>
                             <a:schemeClr val="dk1"/>
                           </a:solidFill>
@@ -9670,7 +9904,7 @@
           <p:nvPr>
             <p:extLst>
               <p:ext uri="{D42A27DB-BD31-4B8C-83A1-F6EECF244321}">
-                <p14:modId xmlns:p14="http://schemas.microsoft.com/office/powerpoint/2010/main" val="3428972887"/>
+                <p14:modId xmlns:p14="http://schemas.microsoft.com/office/powerpoint/2010/main" val="1199375249"/>
               </p:ext>
             </p:extLst>
           </p:nvPr>
@@ -9800,7 +10034,7 @@
                         <a:t> </a:t>
                       </a:r>
                       <a:r>
-                        <a:rPr lang="es-MX" sz="1400" b="0" dirty="0" err="1" smtClean="0">
+                        <a:rPr lang="es-MX" sz="1400" b="1" i="1" dirty="0" err="1" smtClean="0">
                           <a:latin typeface="Arial" panose="020B0604020202020204" pitchFamily="34" charset="0"/>
                           <a:cs typeface="Arial" panose="020B0604020202020204" pitchFamily="34" charset="0"/>
                         </a:rPr>
@@ -11652,7 +11886,7 @@
         </p:nvGraphicFramePr>
         <p:xfrm>
           <a:off x="1709529" y="2055240"/>
-          <a:ext cx="6239217" cy="1597598"/>
+          <a:ext cx="6239217" cy="1614489"/>
         </p:xfrm>
         <a:graphic>
           <a:graphicData uri="http://schemas.openxmlformats.org/drawingml/2006/table">
@@ -12863,9 +13097,39 @@
           <a:chExt cx="0" cy="0"/>
         </a:xfrm>
       </p:grpSpPr>
+      <p:sp>
+        <p:nvSpPr>
+          <p:cNvPr id="5" name="4 Rectángulo"/>
+          <p:cNvSpPr/>
+          <p:nvPr/>
+        </p:nvSpPr>
+        <p:spPr>
+          <a:xfrm>
+            <a:off x="412124" y="401118"/>
+            <a:ext cx="3680897" cy="369332"/>
+          </a:xfrm>
+          <a:prstGeom prst="rect">
+            <a:avLst/>
+          </a:prstGeom>
+        </p:spPr>
+        <p:txBody>
+          <a:bodyPr wrap="square">
+            <a:spAutoFit/>
+          </a:bodyPr>
+          <a:lstStyle/>
+          <a:p>
+            <a:pPr algn="just"/>
+            <a:r>
+              <a:rPr lang="en-US" dirty="0" smtClean="0"/>
+              <a:t>Example of a new task added:</a:t>
+            </a:r>
+            <a:endParaRPr lang="en-US" dirty="0"/>
+          </a:p>
+        </p:txBody>
+      </p:sp>
       <p:pic>
         <p:nvPicPr>
-          <p:cNvPr id="6147" name="Picture 3"/>
+          <p:cNvPr id="1026" name="Picture 2"/>
           <p:cNvPicPr>
             <a:picLocks noChangeAspect="1" noChangeArrowheads="1"/>
           </p:cNvPicPr>
@@ -12886,8 +13150,8 @@
         </p:blipFill>
         <p:spPr bwMode="auto">
           <a:xfrm>
-            <a:off x="412124" y="999991"/>
-            <a:ext cx="8576740" cy="4885654"/>
+            <a:off x="515155" y="1182710"/>
+            <a:ext cx="8506883" cy="4780208"/>
           </a:xfrm>
           <a:prstGeom prst="rect">
             <a:avLst/>
@@ -12927,36 +13191,6 @@
           </a:extLst>
         </p:spPr>
       </p:pic>
-      <p:sp>
-        <p:nvSpPr>
-          <p:cNvPr id="5" name="4 Rectángulo"/>
-          <p:cNvSpPr/>
-          <p:nvPr/>
-        </p:nvSpPr>
-        <p:spPr>
-          <a:xfrm>
-            <a:off x="412124" y="401118"/>
-            <a:ext cx="3680897" cy="369332"/>
-          </a:xfrm>
-          <a:prstGeom prst="rect">
-            <a:avLst/>
-          </a:prstGeom>
-        </p:spPr>
-        <p:txBody>
-          <a:bodyPr wrap="square">
-            <a:spAutoFit/>
-          </a:bodyPr>
-          <a:lstStyle/>
-          <a:p>
-            <a:pPr algn="just"/>
-            <a:r>
-              <a:rPr lang="en-US" dirty="0" smtClean="0"/>
-              <a:t>Example of a new task added:</a:t>
-            </a:r>
-            <a:endParaRPr lang="en-US" dirty="0"/>
-          </a:p>
-        </p:txBody>
-      </p:sp>
     </p:spTree>
     <p:extLst>
       <p:ext uri="{BB962C8B-B14F-4D97-AF65-F5344CB8AC3E}">
@@ -13604,7 +13838,7 @@
           <p:nvPr>
             <p:extLst>
               <p:ext uri="{D42A27DB-BD31-4B8C-83A1-F6EECF244321}">
-                <p14:modId xmlns:p14="http://schemas.microsoft.com/office/powerpoint/2010/main" val="3467343101"/>
+                <p14:modId xmlns:p14="http://schemas.microsoft.com/office/powerpoint/2010/main" val="3184082227"/>
               </p:ext>
             </p:extLst>
           </p:nvPr>
@@ -13679,11 +13913,87 @@
                     <a:lstStyle/>
                     <a:p>
                       <a:r>
+                        <a:rPr lang="es-MX" sz="1400" b="1" dirty="0" err="1" smtClean="0">
+                          <a:latin typeface="Arial" panose="020B0604020202020204" pitchFamily="34" charset="0"/>
+                          <a:cs typeface="Arial" panose="020B0604020202020204" pitchFamily="34" charset="0"/>
+                        </a:rPr>
+                        <a:t>Tasks.c</a:t>
+                      </a:r>
+                      <a:endParaRPr lang="es-MX" sz="1400" b="1" dirty="0">
+                        <a:latin typeface="Arial" panose="020B0604020202020204" pitchFamily="34" charset="0"/>
+                        <a:cs typeface="Arial" panose="020B0604020202020204" pitchFamily="34" charset="0"/>
+                      </a:endParaRPr>
+                    </a:p>
+                  </a:txBody>
+                  <a:tcPr/>
+                </a:tc>
+                <a:tc>
+                  <a:txBody>
+                    <a:bodyPr/>
+                    <a:lstStyle/>
+                    <a:p>
+                      <a:r>
                         <a:rPr lang="es-MX" sz="1400" b="0" dirty="0" err="1" smtClean="0">
                           <a:latin typeface="Arial" panose="020B0604020202020204" pitchFamily="34" charset="0"/>
                           <a:cs typeface="Arial" panose="020B0604020202020204" pitchFamily="34" charset="0"/>
                         </a:rPr>
-                        <a:t>Tasks.c</a:t>
+                        <a:t>Provides</a:t>
+                      </a:r>
+                      <a:r>
+                        <a:rPr lang="es-MX" sz="1400" b="0" dirty="0" smtClean="0">
+                          <a:latin typeface="Arial" panose="020B0604020202020204" pitchFamily="34" charset="0"/>
+                          <a:cs typeface="Arial" panose="020B0604020202020204" pitchFamily="34" charset="0"/>
+                        </a:rPr>
+                        <a:t> </a:t>
+                      </a:r>
+                      <a:r>
+                        <a:rPr lang="es-MX" sz="1400" b="0" dirty="0" err="1" smtClean="0">
+                          <a:latin typeface="Arial" panose="020B0604020202020204" pitchFamily="34" charset="0"/>
+                          <a:cs typeface="Arial" panose="020B0604020202020204" pitchFamily="34" charset="0"/>
+                        </a:rPr>
+                        <a:t>the</a:t>
+                      </a:r>
+                      <a:r>
+                        <a:rPr lang="es-MX" sz="1400" b="0" dirty="0" smtClean="0">
+                          <a:latin typeface="Arial" panose="020B0604020202020204" pitchFamily="34" charset="0"/>
+                          <a:cs typeface="Arial" panose="020B0604020202020204" pitchFamily="34" charset="0"/>
+                        </a:rPr>
+                        <a:t> </a:t>
+                      </a:r>
+                      <a:r>
+                        <a:rPr lang="es-MX" sz="1400" b="0" dirty="0" err="1" smtClean="0">
+                          <a:latin typeface="Arial" panose="020B0604020202020204" pitchFamily="34" charset="0"/>
+                          <a:cs typeface="Arial" panose="020B0604020202020204" pitchFamily="34" charset="0"/>
+                        </a:rPr>
+                        <a:t>timed</a:t>
+                      </a:r>
+                      <a:r>
+                        <a:rPr lang="es-MX" sz="1400" b="0" baseline="0" dirty="0" smtClean="0">
+                          <a:latin typeface="Arial" panose="020B0604020202020204" pitchFamily="34" charset="0"/>
+                          <a:cs typeface="Arial" panose="020B0604020202020204" pitchFamily="34" charset="0"/>
+                        </a:rPr>
+                        <a:t> </a:t>
+                      </a:r>
+                      <a:r>
+                        <a:rPr lang="es-MX" sz="1400" b="0" baseline="0" dirty="0" err="1" smtClean="0">
+                          <a:latin typeface="Arial" panose="020B0604020202020204" pitchFamily="34" charset="0"/>
+                          <a:cs typeface="Arial" panose="020B0604020202020204" pitchFamily="34" charset="0"/>
+                        </a:rPr>
+                        <a:t>task</a:t>
+                      </a:r>
+                      <a:r>
+                        <a:rPr lang="es-MX" sz="1400" b="0" baseline="0" dirty="0" smtClean="0">
+                          <a:latin typeface="Arial" panose="020B0604020202020204" pitchFamily="34" charset="0"/>
+                          <a:cs typeface="Arial" panose="020B0604020202020204" pitchFamily="34" charset="0"/>
+                        </a:rPr>
+                        <a:t> </a:t>
+                      </a:r>
+                      <a:r>
+                        <a:rPr lang="es-MX" sz="1400" b="0" baseline="0" dirty="0" err="1" smtClean="0">
+                          <a:latin typeface="Arial" panose="020B0604020202020204" pitchFamily="34" charset="0"/>
+                          <a:cs typeface="Arial" panose="020B0604020202020204" pitchFamily="34" charset="0"/>
+                        </a:rPr>
+                        <a:t>definitions</a:t>
                       </a:r>
                       <a:endParaRPr lang="es-MX" sz="1400" b="0" dirty="0">
                         <a:latin typeface="Arial" panose="020B0604020202020204" pitchFamily="34" charset="0"/>
@@ -13693,17 +14003,39 @@
                   </a:txBody>
                   <a:tcPr/>
                 </a:tc>
+              </a:tr>
+              <a:tr h="305929">
                 <a:tc>
                   <a:txBody>
                     <a:bodyPr/>
                     <a:lstStyle/>
                     <a:p>
                       <a:r>
+                        <a:rPr lang="es-MX" sz="1400" b="1" dirty="0" err="1" smtClean="0">
+                          <a:latin typeface="Arial" panose="020B0604020202020204" pitchFamily="34" charset="0"/>
+                          <a:cs typeface="Arial" panose="020B0604020202020204" pitchFamily="34" charset="0"/>
+                        </a:rPr>
+                        <a:t>Tasks.h</a:t>
+                      </a:r>
+                      <a:endParaRPr lang="es-MX" sz="1400" b="1" dirty="0">
+                        <a:latin typeface="Arial" panose="020B0604020202020204" pitchFamily="34" charset="0"/>
+                        <a:cs typeface="Arial" panose="020B0604020202020204" pitchFamily="34" charset="0"/>
+                      </a:endParaRPr>
+                    </a:p>
+                  </a:txBody>
+                  <a:tcPr/>
+                </a:tc>
+                <a:tc>
+                  <a:txBody>
+                    <a:bodyPr/>
+                    <a:lstStyle/>
+                    <a:p>
+                      <a:r>
                         <a:rPr lang="es-MX" sz="1400" b="0" dirty="0" err="1" smtClean="0">
                           <a:latin typeface="Arial" panose="020B0604020202020204" pitchFamily="34" charset="0"/>
                           <a:cs typeface="Arial" panose="020B0604020202020204" pitchFamily="34" charset="0"/>
                         </a:rPr>
-                        <a:t>Provides</a:t>
+                        <a:t>Export</a:t>
                       </a:r>
                       <a:r>
                         <a:rPr lang="es-MX" sz="1400" b="0" dirty="0" smtClean="0">
@@ -13734,6 +14066,48 @@
                         <a:t>timed</a:t>
                       </a:r>
                       <a:r>
+                        <a:rPr lang="es-MX" sz="1400" b="0" dirty="0" smtClean="0">
+                          <a:latin typeface="Arial" panose="020B0604020202020204" pitchFamily="34" charset="0"/>
+                          <a:cs typeface="Arial" panose="020B0604020202020204" pitchFamily="34" charset="0"/>
+                        </a:rPr>
+                        <a:t> </a:t>
+                      </a:r>
+                      <a:r>
+                        <a:rPr lang="es-MX" sz="1400" b="0" dirty="0" err="1" smtClean="0">
+                          <a:latin typeface="Arial" panose="020B0604020202020204" pitchFamily="34" charset="0"/>
+                          <a:cs typeface="Arial" panose="020B0604020202020204" pitchFamily="34" charset="0"/>
+                        </a:rPr>
+                        <a:t>task</a:t>
+                      </a:r>
+                      <a:r>
+                        <a:rPr lang="es-MX" sz="1400" b="0" dirty="0" smtClean="0">
+                          <a:latin typeface="Arial" panose="020B0604020202020204" pitchFamily="34" charset="0"/>
+                          <a:cs typeface="Arial" panose="020B0604020202020204" pitchFamily="34" charset="0"/>
+                        </a:rPr>
+                        <a:t> interfaces to </a:t>
+                      </a:r>
+                      <a:r>
+                        <a:rPr lang="es-MX" sz="1400" b="0" dirty="0" err="1" smtClean="0">
+                          <a:latin typeface="Arial" panose="020B0604020202020204" pitchFamily="34" charset="0"/>
+                          <a:cs typeface="Arial" panose="020B0604020202020204" pitchFamily="34" charset="0"/>
+                        </a:rPr>
+                        <a:t>the</a:t>
+                      </a:r>
+                      <a:r>
+                        <a:rPr lang="es-MX" sz="1400" b="0" dirty="0" smtClean="0">
+                          <a:latin typeface="Arial" panose="020B0604020202020204" pitchFamily="34" charset="0"/>
+                          <a:cs typeface="Arial" panose="020B0604020202020204" pitchFamily="34" charset="0"/>
+                        </a:rPr>
+                        <a:t> </a:t>
+                      </a:r>
+                      <a:r>
+                        <a:rPr lang="es-MX" sz="1400" b="0" dirty="0" err="1" smtClean="0">
+                          <a:latin typeface="Arial" panose="020B0604020202020204" pitchFamily="34" charset="0"/>
+                          <a:cs typeface="Arial" panose="020B0604020202020204" pitchFamily="34" charset="0"/>
+                        </a:rPr>
+                        <a:t>scheduler</a:t>
+                      </a:r>
+                      <a:r>
                         <a:rPr lang="es-MX" sz="1400" b="0" baseline="0" dirty="0" smtClean="0">
                           <a:latin typeface="Arial" panose="020B0604020202020204" pitchFamily="34" charset="0"/>
                           <a:cs typeface="Arial" panose="020B0604020202020204" pitchFamily="34" charset="0"/>
@@ -13745,21 +14119,14 @@
                           <a:latin typeface="Arial" panose="020B0604020202020204" pitchFamily="34" charset="0"/>
                           <a:cs typeface="Arial" panose="020B0604020202020204" pitchFamily="34" charset="0"/>
                         </a:rPr>
-                        <a:t>task</a:t>
+                        <a:t>configuration</a:t>
                       </a:r>
                       <a:r>
                         <a:rPr lang="es-MX" sz="1400" b="0" baseline="0" dirty="0" smtClean="0">
                           <a:latin typeface="Arial" panose="020B0604020202020204" pitchFamily="34" charset="0"/>
                           <a:cs typeface="Arial" panose="020B0604020202020204" pitchFamily="34" charset="0"/>
                         </a:rPr>
-                        <a:t> </a:t>
-                      </a:r>
-                      <a:r>
-                        <a:rPr lang="es-MX" sz="1400" b="0" baseline="0" dirty="0" err="1" smtClean="0">
-                          <a:latin typeface="Arial" panose="020B0604020202020204" pitchFamily="34" charset="0"/>
-                          <a:cs typeface="Arial" panose="020B0604020202020204" pitchFamily="34" charset="0"/>
-                        </a:rPr>
-                        <a:t>definitions</a:t>
+                        <a:t> file</a:t>
                       </a:r>
                       <a:endParaRPr lang="es-MX" sz="1400" b="0" dirty="0">
                         <a:latin typeface="Arial" panose="020B0604020202020204" pitchFamily="34" charset="0"/>
@@ -13777,146 +14144,13 @@
                     <a:lstStyle/>
                     <a:p>
                       <a:r>
-                        <a:rPr lang="es-MX" sz="1400" b="0" dirty="0" err="1" smtClean="0">
-                          <a:latin typeface="Arial" panose="020B0604020202020204" pitchFamily="34" charset="0"/>
-                          <a:cs typeface="Arial" panose="020B0604020202020204" pitchFamily="34" charset="0"/>
-                        </a:rPr>
-                        <a:t>Tasks.h</a:t>
-                      </a:r>
-                      <a:endParaRPr lang="es-MX" sz="1400" b="0" dirty="0">
-                        <a:latin typeface="Arial" panose="020B0604020202020204" pitchFamily="34" charset="0"/>
-                        <a:cs typeface="Arial" panose="020B0604020202020204" pitchFamily="34" charset="0"/>
-                      </a:endParaRPr>
-                    </a:p>
-                  </a:txBody>
-                  <a:tcPr/>
-                </a:tc>
-                <a:tc>
-                  <a:txBody>
-                    <a:bodyPr/>
-                    <a:lstStyle/>
-                    <a:p>
-                      <a:r>
-                        <a:rPr lang="es-MX" sz="1400" b="0" dirty="0" err="1" smtClean="0">
-                          <a:latin typeface="Arial" panose="020B0604020202020204" pitchFamily="34" charset="0"/>
-                          <a:cs typeface="Arial" panose="020B0604020202020204" pitchFamily="34" charset="0"/>
-                        </a:rPr>
-                        <a:t>Export</a:t>
-                      </a:r>
-                      <a:r>
-                        <a:rPr lang="es-MX" sz="1400" b="0" dirty="0" smtClean="0">
-                          <a:latin typeface="Arial" panose="020B0604020202020204" pitchFamily="34" charset="0"/>
-                          <a:cs typeface="Arial" panose="020B0604020202020204" pitchFamily="34" charset="0"/>
-                        </a:rPr>
-                        <a:t> </a:t>
-                      </a:r>
-                      <a:r>
-                        <a:rPr lang="es-MX" sz="1400" b="0" dirty="0" err="1" smtClean="0">
-                          <a:latin typeface="Arial" panose="020B0604020202020204" pitchFamily="34" charset="0"/>
-                          <a:cs typeface="Arial" panose="020B0604020202020204" pitchFamily="34" charset="0"/>
-                        </a:rPr>
-                        <a:t>the</a:t>
-                      </a:r>
-                      <a:r>
-                        <a:rPr lang="es-MX" sz="1400" b="0" dirty="0" smtClean="0">
-                          <a:latin typeface="Arial" panose="020B0604020202020204" pitchFamily="34" charset="0"/>
-                          <a:cs typeface="Arial" panose="020B0604020202020204" pitchFamily="34" charset="0"/>
-                        </a:rPr>
-                        <a:t> </a:t>
-                      </a:r>
-                      <a:r>
-                        <a:rPr lang="es-MX" sz="1400" b="0" dirty="0" err="1" smtClean="0">
-                          <a:latin typeface="Arial" panose="020B0604020202020204" pitchFamily="34" charset="0"/>
-                          <a:cs typeface="Arial" panose="020B0604020202020204" pitchFamily="34" charset="0"/>
-                        </a:rPr>
-                        <a:t>timed</a:t>
-                      </a:r>
-                      <a:r>
-                        <a:rPr lang="es-MX" sz="1400" b="0" dirty="0" smtClean="0">
-                          <a:latin typeface="Arial" panose="020B0604020202020204" pitchFamily="34" charset="0"/>
-                          <a:cs typeface="Arial" panose="020B0604020202020204" pitchFamily="34" charset="0"/>
-                        </a:rPr>
-                        <a:t> </a:t>
-                      </a:r>
-                      <a:r>
-                        <a:rPr lang="es-MX" sz="1400" b="0" dirty="0" err="1" smtClean="0">
-                          <a:latin typeface="Arial" panose="020B0604020202020204" pitchFamily="34" charset="0"/>
-                          <a:cs typeface="Arial" panose="020B0604020202020204" pitchFamily="34" charset="0"/>
-                        </a:rPr>
-                        <a:t>task</a:t>
-                      </a:r>
-                      <a:r>
-                        <a:rPr lang="es-MX" sz="1400" b="0" dirty="0" smtClean="0">
-                          <a:latin typeface="Arial" panose="020B0604020202020204" pitchFamily="34" charset="0"/>
-                          <a:cs typeface="Arial" panose="020B0604020202020204" pitchFamily="34" charset="0"/>
-                        </a:rPr>
-                        <a:t> interfaces to </a:t>
-                      </a:r>
-                      <a:r>
-                        <a:rPr lang="es-MX" sz="1400" b="0" dirty="0" err="1" smtClean="0">
-                          <a:latin typeface="Arial" panose="020B0604020202020204" pitchFamily="34" charset="0"/>
-                          <a:cs typeface="Arial" panose="020B0604020202020204" pitchFamily="34" charset="0"/>
-                        </a:rPr>
-                        <a:t>the</a:t>
-                      </a:r>
-                      <a:r>
-                        <a:rPr lang="es-MX" sz="1400" b="0" dirty="0" smtClean="0">
-                          <a:latin typeface="Arial" panose="020B0604020202020204" pitchFamily="34" charset="0"/>
-                          <a:cs typeface="Arial" panose="020B0604020202020204" pitchFamily="34" charset="0"/>
-                        </a:rPr>
-                        <a:t> </a:t>
-                      </a:r>
-                      <a:r>
-                        <a:rPr lang="es-MX" sz="1400" b="0" dirty="0" err="1" smtClean="0">
-                          <a:latin typeface="Arial" panose="020B0604020202020204" pitchFamily="34" charset="0"/>
-                          <a:cs typeface="Arial" panose="020B0604020202020204" pitchFamily="34" charset="0"/>
-                        </a:rPr>
-                        <a:t>scheduler</a:t>
-                      </a:r>
-                      <a:r>
-                        <a:rPr lang="es-MX" sz="1400" b="0" baseline="0" dirty="0" smtClean="0">
-                          <a:latin typeface="Arial" panose="020B0604020202020204" pitchFamily="34" charset="0"/>
-                          <a:cs typeface="Arial" panose="020B0604020202020204" pitchFamily="34" charset="0"/>
-                        </a:rPr>
-                        <a:t> </a:t>
-                      </a:r>
-                      <a:r>
-                        <a:rPr lang="es-MX" sz="1400" b="0" baseline="0" dirty="0" err="1" smtClean="0">
-                          <a:latin typeface="Arial" panose="020B0604020202020204" pitchFamily="34" charset="0"/>
-                          <a:cs typeface="Arial" panose="020B0604020202020204" pitchFamily="34" charset="0"/>
-                        </a:rPr>
-                        <a:t>configuration</a:t>
-                      </a:r>
-                      <a:r>
-                        <a:rPr lang="es-MX" sz="1400" b="0" baseline="0" dirty="0" smtClean="0">
-                          <a:latin typeface="Arial" panose="020B0604020202020204" pitchFamily="34" charset="0"/>
-                          <a:cs typeface="Arial" panose="020B0604020202020204" pitchFamily="34" charset="0"/>
-                        </a:rPr>
-                        <a:t> file</a:t>
-                      </a:r>
-                      <a:endParaRPr lang="es-MX" sz="1400" b="0" dirty="0">
-                        <a:latin typeface="Arial" panose="020B0604020202020204" pitchFamily="34" charset="0"/>
-                        <a:cs typeface="Arial" panose="020B0604020202020204" pitchFamily="34" charset="0"/>
-                      </a:endParaRPr>
-                    </a:p>
-                  </a:txBody>
-                  <a:tcPr/>
-                </a:tc>
-              </a:tr>
-              <a:tr h="305929">
-                <a:tc>
-                  <a:txBody>
-                    <a:bodyPr/>
-                    <a:lstStyle/>
-                    <a:p>
-                      <a:r>
-                        <a:rPr lang="es-MX" sz="1400" b="0" dirty="0" err="1" smtClean="0">
+                        <a:rPr lang="es-MX" sz="1400" b="1" dirty="0" err="1" smtClean="0">
                           <a:latin typeface="Arial" panose="020B0604020202020204" pitchFamily="34" charset="0"/>
                           <a:cs typeface="Arial" panose="020B0604020202020204" pitchFamily="34" charset="0"/>
                         </a:rPr>
                         <a:t>Exceptions.c</a:t>
                       </a:r>
-                      <a:endParaRPr lang="es-MX" sz="1400" b="0" dirty="0">
+                      <a:endParaRPr lang="es-MX" sz="1400" b="1" dirty="0">
                         <a:latin typeface="Arial" panose="020B0604020202020204" pitchFamily="34" charset="0"/>
                         <a:cs typeface="Arial" panose="020B0604020202020204" pitchFamily="34" charset="0"/>
                       </a:endParaRPr>
@@ -13978,11 +14212,94 @@
                     <a:lstStyle/>
                     <a:p>
                       <a:r>
+                        <a:rPr lang="es-MX" sz="1400" b="1" dirty="0" err="1" smtClean="0">
+                          <a:latin typeface="Arial" panose="020B0604020202020204" pitchFamily="34" charset="0"/>
+                          <a:cs typeface="Arial" panose="020B0604020202020204" pitchFamily="34" charset="0"/>
+                        </a:rPr>
+                        <a:t>Exceptions.h</a:t>
+                      </a:r>
+                      <a:endParaRPr lang="es-MX" sz="1400" b="1" dirty="0">
+                        <a:latin typeface="Arial" panose="020B0604020202020204" pitchFamily="34" charset="0"/>
+                        <a:cs typeface="Arial" panose="020B0604020202020204" pitchFamily="34" charset="0"/>
+                      </a:endParaRPr>
+                    </a:p>
+                  </a:txBody>
+                  <a:tcPr/>
+                </a:tc>
+                <a:tc>
+                  <a:txBody>
+                    <a:bodyPr/>
+                    <a:lstStyle/>
+                    <a:p>
+                      <a:r>
                         <a:rPr lang="es-MX" sz="1400" b="0" dirty="0" err="1" smtClean="0">
                           <a:latin typeface="Arial" panose="020B0604020202020204" pitchFamily="34" charset="0"/>
                           <a:cs typeface="Arial" panose="020B0604020202020204" pitchFamily="34" charset="0"/>
                         </a:rPr>
-                        <a:t>Exceptions.h</a:t>
+                        <a:t>Export</a:t>
+                      </a:r>
+                      <a:r>
+                        <a:rPr lang="es-MX" sz="1400" b="0" dirty="0" smtClean="0">
+                          <a:latin typeface="Arial" panose="020B0604020202020204" pitchFamily="34" charset="0"/>
+                          <a:cs typeface="Arial" panose="020B0604020202020204" pitchFamily="34" charset="0"/>
+                        </a:rPr>
+                        <a:t> </a:t>
+                      </a:r>
+                      <a:r>
+                        <a:rPr lang="es-MX" sz="1400" b="0" dirty="0" err="1" smtClean="0">
+                          <a:latin typeface="Arial" panose="020B0604020202020204" pitchFamily="34" charset="0"/>
+                          <a:cs typeface="Arial" panose="020B0604020202020204" pitchFamily="34" charset="0"/>
+                        </a:rPr>
+                        <a:t>the</a:t>
+                      </a:r>
+                      <a:r>
+                        <a:rPr lang="es-MX" sz="1400" b="0" dirty="0" smtClean="0">
+                          <a:latin typeface="Arial" panose="020B0604020202020204" pitchFamily="34" charset="0"/>
+                          <a:cs typeface="Arial" panose="020B0604020202020204" pitchFamily="34" charset="0"/>
+                        </a:rPr>
+                        <a:t> </a:t>
+                      </a:r>
+                      <a:r>
+                        <a:rPr lang="es-MX" sz="1400" b="0" dirty="0" err="1" smtClean="0">
+                          <a:latin typeface="Arial" panose="020B0604020202020204" pitchFamily="34" charset="0"/>
+                          <a:cs typeface="Arial" panose="020B0604020202020204" pitchFamily="34" charset="0"/>
+                        </a:rPr>
+                        <a:t>Exception</a:t>
+                      </a:r>
+                      <a:r>
+                        <a:rPr lang="es-MX" sz="1400" b="0" dirty="0" smtClean="0">
+                          <a:latin typeface="Arial" panose="020B0604020202020204" pitchFamily="34" charset="0"/>
+                          <a:cs typeface="Arial" panose="020B0604020202020204" pitchFamily="34" charset="0"/>
+                        </a:rPr>
+                        <a:t> </a:t>
+                      </a:r>
+                      <a:r>
+                        <a:rPr lang="es-MX" sz="1400" b="0" dirty="0" err="1" smtClean="0">
+                          <a:latin typeface="Arial" panose="020B0604020202020204" pitchFamily="34" charset="0"/>
+                          <a:cs typeface="Arial" panose="020B0604020202020204" pitchFamily="34" charset="0"/>
+                        </a:rPr>
+                        <a:t>handlers</a:t>
+                      </a:r>
+                      <a:r>
+                        <a:rPr lang="es-MX" sz="1400" b="0" dirty="0" smtClean="0">
+                          <a:latin typeface="Arial" panose="020B0604020202020204" pitchFamily="34" charset="0"/>
+                          <a:cs typeface="Arial" panose="020B0604020202020204" pitchFamily="34" charset="0"/>
+                        </a:rPr>
+                        <a:t> to </a:t>
+                      </a:r>
+                      <a:r>
+                        <a:rPr lang="es-MX" sz="1400" b="0" dirty="0" err="1" smtClean="0">
+                          <a:latin typeface="Arial" panose="020B0604020202020204" pitchFamily="34" charset="0"/>
+                          <a:cs typeface="Arial" panose="020B0604020202020204" pitchFamily="34" charset="0"/>
+                        </a:rPr>
+                        <a:t>scheduler</a:t>
+                      </a:r>
+                      <a:r>
+                        <a:rPr lang="es-MX" sz="1400" b="0" dirty="0" smtClean="0">
+                          <a:latin typeface="Arial" panose="020B0604020202020204" pitchFamily="34" charset="0"/>
+                          <a:cs typeface="Arial" panose="020B0604020202020204" pitchFamily="34" charset="0"/>
+                        </a:rPr>
+                        <a:t> module</a:t>
                       </a:r>
                       <a:endParaRPr lang="es-MX" sz="1400" b="0" dirty="0">
                         <a:latin typeface="Arial" panose="020B0604020202020204" pitchFamily="34" charset="0"/>
@@ -13992,80 +14309,130 @@
                   </a:txBody>
                   <a:tcPr/>
                 </a:tc>
+              </a:tr>
+              <a:tr h="305929">
                 <a:tc>
                   <a:txBody>
                     <a:bodyPr/>
                     <a:lstStyle/>
                     <a:p>
                       <a:r>
+                        <a:rPr lang="es-MX" sz="1400" b="1" dirty="0" err="1" smtClean="0">
+                          <a:latin typeface="Arial" panose="020B0604020202020204" pitchFamily="34" charset="0"/>
+                          <a:cs typeface="Arial" panose="020B0604020202020204" pitchFamily="34" charset="0"/>
+                        </a:rPr>
+                        <a:t>Timer.c</a:t>
+                      </a:r>
+                      <a:endParaRPr lang="es-MX" sz="1400" b="1" dirty="0">
+                        <a:latin typeface="Arial" panose="020B0604020202020204" pitchFamily="34" charset="0"/>
+                        <a:cs typeface="Arial" panose="020B0604020202020204" pitchFamily="34" charset="0"/>
+                      </a:endParaRPr>
+                    </a:p>
+                  </a:txBody>
+                  <a:tcPr/>
+                </a:tc>
+                <a:tc>
+                  <a:txBody>
+                    <a:bodyPr/>
+                    <a:lstStyle/>
+                    <a:p>
+                      <a:r>
                         <a:rPr lang="es-MX" sz="1400" b="0" dirty="0" err="1" smtClean="0">
                           <a:latin typeface="Arial" panose="020B0604020202020204" pitchFamily="34" charset="0"/>
                           <a:cs typeface="Arial" panose="020B0604020202020204" pitchFamily="34" charset="0"/>
                         </a:rPr>
-                        <a:t>Export</a:t>
-                      </a:r>
-                      <a:r>
-                        <a:rPr lang="es-MX" sz="1400" b="0" dirty="0" smtClean="0">
+                        <a:t>Configurate</a:t>
+                      </a:r>
+                      <a:r>
+                        <a:rPr lang="es-MX" sz="1400" b="0" baseline="0" dirty="0" smtClean="0">
                           <a:latin typeface="Arial" panose="020B0604020202020204" pitchFamily="34" charset="0"/>
                           <a:cs typeface="Arial" panose="020B0604020202020204" pitchFamily="34" charset="0"/>
                         </a:rPr>
                         <a:t> </a:t>
                       </a:r>
                       <a:r>
-                        <a:rPr lang="es-MX" sz="1400" b="0" dirty="0" err="1" smtClean="0">
+                        <a:rPr lang="es-MX" sz="1400" b="0" baseline="0" dirty="0" err="1" smtClean="0">
                           <a:latin typeface="Arial" panose="020B0604020202020204" pitchFamily="34" charset="0"/>
                           <a:cs typeface="Arial" panose="020B0604020202020204" pitchFamily="34" charset="0"/>
                         </a:rPr>
                         <a:t>the</a:t>
                       </a:r>
                       <a:r>
-                        <a:rPr lang="es-MX" sz="1400" b="0" dirty="0" smtClean="0">
+                        <a:rPr lang="es-MX" sz="1400" b="0" baseline="0" dirty="0" smtClean="0">
+                          <a:latin typeface="Arial" panose="020B0604020202020204" pitchFamily="34" charset="0"/>
+                          <a:cs typeface="Arial" panose="020B0604020202020204" pitchFamily="34" charset="0"/>
+                        </a:rPr>
+                        <a:t> STM </a:t>
+                      </a:r>
+                      <a:r>
+                        <a:rPr lang="es-MX" sz="1400" b="0" baseline="0" dirty="0" err="1" smtClean="0">
+                          <a:latin typeface="Arial" panose="020B0604020202020204" pitchFamily="34" charset="0"/>
+                          <a:cs typeface="Arial" panose="020B0604020202020204" pitchFamily="34" charset="0"/>
+                        </a:rPr>
+                        <a:t>timer</a:t>
+                      </a:r>
+                      <a:r>
+                        <a:rPr lang="es-MX" sz="1400" b="0" baseline="0" dirty="0" smtClean="0">
                           <a:latin typeface="Arial" panose="020B0604020202020204" pitchFamily="34" charset="0"/>
                           <a:cs typeface="Arial" panose="020B0604020202020204" pitchFamily="34" charset="0"/>
                         </a:rPr>
                         <a:t> </a:t>
                       </a:r>
                       <a:r>
-                        <a:rPr lang="es-MX" sz="1400" b="0" dirty="0" err="1" smtClean="0">
-                          <a:latin typeface="Arial" panose="020B0604020202020204" pitchFamily="34" charset="0"/>
-                          <a:cs typeface="Arial" panose="020B0604020202020204" pitchFamily="34" charset="0"/>
-                        </a:rPr>
-                        <a:t>Exception</a:t>
-                      </a:r>
-                      <a:r>
-                        <a:rPr lang="es-MX" sz="1400" b="0" dirty="0" smtClean="0">
+                        <a:rPr lang="es-MX" sz="1400" b="0" baseline="0" dirty="0" err="1" smtClean="0">
+                          <a:latin typeface="Arial" panose="020B0604020202020204" pitchFamily="34" charset="0"/>
+                          <a:cs typeface="Arial" panose="020B0604020202020204" pitchFamily="34" charset="0"/>
+                        </a:rPr>
+                        <a:t>initialization</a:t>
+                      </a:r>
+                      <a:r>
+                        <a:rPr lang="es-MX" sz="1400" b="0" baseline="0" dirty="0" smtClean="0">
+                          <a:latin typeface="Arial" panose="020B0604020202020204" pitchFamily="34" charset="0"/>
+                          <a:cs typeface="Arial" panose="020B0604020202020204" pitchFamily="34" charset="0"/>
+                        </a:rPr>
+                        <a:t> and </a:t>
+                      </a:r>
+                      <a:r>
+                        <a:rPr lang="es-MX" sz="1400" b="0" baseline="0" dirty="0" err="1" smtClean="0">
+                          <a:latin typeface="Arial" panose="020B0604020202020204" pitchFamily="34" charset="0"/>
+                          <a:cs typeface="Arial" panose="020B0604020202020204" pitchFamily="34" charset="0"/>
+                        </a:rPr>
+                        <a:t>configurate</a:t>
+                      </a:r>
+                      <a:r>
+                        <a:rPr lang="es-MX" sz="1400" b="0" baseline="0" dirty="0" smtClean="0">
                           <a:latin typeface="Arial" panose="020B0604020202020204" pitchFamily="34" charset="0"/>
                           <a:cs typeface="Arial" panose="020B0604020202020204" pitchFamily="34" charset="0"/>
                         </a:rPr>
                         <a:t> </a:t>
                       </a:r>
                       <a:r>
-                        <a:rPr lang="es-MX" sz="1400" b="0" dirty="0" err="1" smtClean="0">
-                          <a:latin typeface="Arial" panose="020B0604020202020204" pitchFamily="34" charset="0"/>
-                          <a:cs typeface="Arial" panose="020B0604020202020204" pitchFamily="34" charset="0"/>
-                        </a:rPr>
-                        <a:t>handlers</a:t>
-                      </a:r>
-                      <a:r>
-                        <a:rPr lang="es-MX" sz="1400" b="0" dirty="0" smtClean="0">
-                          <a:latin typeface="Arial" panose="020B0604020202020204" pitchFamily="34" charset="0"/>
-                          <a:cs typeface="Arial" panose="020B0604020202020204" pitchFamily="34" charset="0"/>
-                        </a:rPr>
-                        <a:t> to </a:t>
-                      </a:r>
-                      <a:r>
-                        <a:rPr lang="es-MX" sz="1400" b="0" dirty="0" err="1" smtClean="0">
-                          <a:latin typeface="Arial" panose="020B0604020202020204" pitchFamily="34" charset="0"/>
-                          <a:cs typeface="Arial" panose="020B0604020202020204" pitchFamily="34" charset="0"/>
-                        </a:rPr>
-                        <a:t>scheduler</a:t>
-                      </a:r>
-                      <a:r>
-                        <a:rPr lang="es-MX" sz="1400" b="0" dirty="0" smtClean="0">
-                          <a:latin typeface="Arial" panose="020B0604020202020204" pitchFamily="34" charset="0"/>
-                          <a:cs typeface="Arial" panose="020B0604020202020204" pitchFamily="34" charset="0"/>
-                        </a:rPr>
-                        <a:t> module</a:t>
+                        <a:rPr lang="es-MX" sz="1400" b="0" baseline="0" dirty="0" err="1" smtClean="0">
+                          <a:latin typeface="Arial" panose="020B0604020202020204" pitchFamily="34" charset="0"/>
+                          <a:cs typeface="Arial" panose="020B0604020202020204" pitchFamily="34" charset="0"/>
+                        </a:rPr>
+                        <a:t>the</a:t>
+                      </a:r>
+                      <a:r>
+                        <a:rPr lang="es-MX" sz="1400" b="0" baseline="0" dirty="0" smtClean="0">
+                          <a:latin typeface="Arial" panose="020B0604020202020204" pitchFamily="34" charset="0"/>
+                          <a:cs typeface="Arial" panose="020B0604020202020204" pitchFamily="34" charset="0"/>
+                        </a:rPr>
+                        <a:t> STM </a:t>
+                      </a:r>
+                      <a:r>
+                        <a:rPr lang="es-MX" sz="1400" b="0" baseline="0" dirty="0" err="1" smtClean="0">
+                          <a:latin typeface="Arial" panose="020B0604020202020204" pitchFamily="34" charset="0"/>
+                          <a:cs typeface="Arial" panose="020B0604020202020204" pitchFamily="34" charset="0"/>
+                        </a:rPr>
+                        <a:t>flag</a:t>
+                      </a:r>
+                      <a:r>
+                        <a:rPr lang="es-MX" sz="1400" b="0" baseline="0" dirty="0" smtClean="0">
+                          <a:latin typeface="Arial" panose="020B0604020202020204" pitchFamily="34" charset="0"/>
+                          <a:cs typeface="Arial" panose="020B0604020202020204" pitchFamily="34" charset="0"/>
+                        </a:rPr>
+                        <a:t> in 1 ms </a:t>
                       </a:r>
                       <a:endParaRPr lang="es-MX" sz="1400" b="0" dirty="0">
                         <a:latin typeface="Arial" panose="020B0604020202020204" pitchFamily="34" charset="0"/>
@@ -14083,146 +14450,13 @@
                     <a:lstStyle/>
                     <a:p>
                       <a:r>
-                        <a:rPr lang="es-MX" sz="1400" b="0" dirty="0" err="1" smtClean="0">
-                          <a:latin typeface="Arial" panose="020B0604020202020204" pitchFamily="34" charset="0"/>
-                          <a:cs typeface="Arial" panose="020B0604020202020204" pitchFamily="34" charset="0"/>
-                        </a:rPr>
-                        <a:t>Timer.c</a:t>
-                      </a:r>
-                      <a:endParaRPr lang="es-MX" sz="1400" b="0" dirty="0">
-                        <a:latin typeface="Arial" panose="020B0604020202020204" pitchFamily="34" charset="0"/>
-                        <a:cs typeface="Arial" panose="020B0604020202020204" pitchFamily="34" charset="0"/>
-                      </a:endParaRPr>
-                    </a:p>
-                  </a:txBody>
-                  <a:tcPr/>
-                </a:tc>
-                <a:tc>
-                  <a:txBody>
-                    <a:bodyPr/>
-                    <a:lstStyle/>
-                    <a:p>
-                      <a:r>
-                        <a:rPr lang="es-MX" sz="1400" b="0" dirty="0" err="1" smtClean="0">
-                          <a:latin typeface="Arial" panose="020B0604020202020204" pitchFamily="34" charset="0"/>
-                          <a:cs typeface="Arial" panose="020B0604020202020204" pitchFamily="34" charset="0"/>
-                        </a:rPr>
-                        <a:t>Configurate</a:t>
-                      </a:r>
-                      <a:r>
-                        <a:rPr lang="es-MX" sz="1400" b="0" baseline="0" dirty="0" smtClean="0">
-                          <a:latin typeface="Arial" panose="020B0604020202020204" pitchFamily="34" charset="0"/>
-                          <a:cs typeface="Arial" panose="020B0604020202020204" pitchFamily="34" charset="0"/>
-                        </a:rPr>
-                        <a:t> </a:t>
-                      </a:r>
-                      <a:r>
-                        <a:rPr lang="es-MX" sz="1400" b="0" baseline="0" dirty="0" err="1" smtClean="0">
-                          <a:latin typeface="Arial" panose="020B0604020202020204" pitchFamily="34" charset="0"/>
-                          <a:cs typeface="Arial" panose="020B0604020202020204" pitchFamily="34" charset="0"/>
-                        </a:rPr>
-                        <a:t>the</a:t>
-                      </a:r>
-                      <a:r>
-                        <a:rPr lang="es-MX" sz="1400" b="0" baseline="0" dirty="0" smtClean="0">
-                          <a:latin typeface="Arial" panose="020B0604020202020204" pitchFamily="34" charset="0"/>
-                          <a:cs typeface="Arial" panose="020B0604020202020204" pitchFamily="34" charset="0"/>
-                        </a:rPr>
-                        <a:t> STM </a:t>
-                      </a:r>
-                      <a:r>
-                        <a:rPr lang="es-MX" sz="1400" b="0" baseline="0" dirty="0" err="1" smtClean="0">
-                          <a:latin typeface="Arial" panose="020B0604020202020204" pitchFamily="34" charset="0"/>
-                          <a:cs typeface="Arial" panose="020B0604020202020204" pitchFamily="34" charset="0"/>
-                        </a:rPr>
-                        <a:t>timer</a:t>
-                      </a:r>
-                      <a:r>
-                        <a:rPr lang="es-MX" sz="1400" b="0" baseline="0" dirty="0" smtClean="0">
-                          <a:latin typeface="Arial" panose="020B0604020202020204" pitchFamily="34" charset="0"/>
-                          <a:cs typeface="Arial" panose="020B0604020202020204" pitchFamily="34" charset="0"/>
-                        </a:rPr>
-                        <a:t> </a:t>
-                      </a:r>
-                      <a:r>
-                        <a:rPr lang="es-MX" sz="1400" b="0" baseline="0" dirty="0" err="1" smtClean="0">
-                          <a:latin typeface="Arial" panose="020B0604020202020204" pitchFamily="34" charset="0"/>
-                          <a:cs typeface="Arial" panose="020B0604020202020204" pitchFamily="34" charset="0"/>
-                        </a:rPr>
-                        <a:t>initialization</a:t>
-                      </a:r>
-                      <a:r>
-                        <a:rPr lang="es-MX" sz="1400" b="0" baseline="0" dirty="0" smtClean="0">
-                          <a:latin typeface="Arial" panose="020B0604020202020204" pitchFamily="34" charset="0"/>
-                          <a:cs typeface="Arial" panose="020B0604020202020204" pitchFamily="34" charset="0"/>
-                        </a:rPr>
-                        <a:t> and </a:t>
-                      </a:r>
-                      <a:r>
-                        <a:rPr lang="es-MX" sz="1400" b="0" baseline="0" dirty="0" err="1" smtClean="0">
-                          <a:latin typeface="Arial" panose="020B0604020202020204" pitchFamily="34" charset="0"/>
-                          <a:cs typeface="Arial" panose="020B0604020202020204" pitchFamily="34" charset="0"/>
-                        </a:rPr>
-                        <a:t>configurate</a:t>
-                      </a:r>
-                      <a:r>
-                        <a:rPr lang="es-MX" sz="1400" b="0" baseline="0" dirty="0" smtClean="0">
-                          <a:latin typeface="Arial" panose="020B0604020202020204" pitchFamily="34" charset="0"/>
-                          <a:cs typeface="Arial" panose="020B0604020202020204" pitchFamily="34" charset="0"/>
-                        </a:rPr>
-                        <a:t> </a:t>
-                      </a:r>
-                      <a:r>
-                        <a:rPr lang="es-MX" sz="1400" b="0" baseline="0" dirty="0" err="1" smtClean="0">
-                          <a:latin typeface="Arial" panose="020B0604020202020204" pitchFamily="34" charset="0"/>
-                          <a:cs typeface="Arial" panose="020B0604020202020204" pitchFamily="34" charset="0"/>
-                        </a:rPr>
-                        <a:t>the</a:t>
-                      </a:r>
-                      <a:r>
-                        <a:rPr lang="es-MX" sz="1400" b="0" baseline="0" dirty="0" smtClean="0">
-                          <a:latin typeface="Arial" panose="020B0604020202020204" pitchFamily="34" charset="0"/>
-                          <a:cs typeface="Arial" panose="020B0604020202020204" pitchFamily="34" charset="0"/>
-                        </a:rPr>
-                        <a:t> STM </a:t>
-                      </a:r>
-                      <a:r>
-                        <a:rPr lang="es-MX" sz="1400" b="0" baseline="0" dirty="0" err="1" smtClean="0">
-                          <a:latin typeface="Arial" panose="020B0604020202020204" pitchFamily="34" charset="0"/>
-                          <a:cs typeface="Arial" panose="020B0604020202020204" pitchFamily="34" charset="0"/>
-                        </a:rPr>
-                        <a:t>flag</a:t>
-                      </a:r>
-                      <a:r>
-                        <a:rPr lang="es-MX" sz="1400" b="0" baseline="0" dirty="0" smtClean="0">
-                          <a:latin typeface="Arial" panose="020B0604020202020204" pitchFamily="34" charset="0"/>
-                          <a:cs typeface="Arial" panose="020B0604020202020204" pitchFamily="34" charset="0"/>
-                        </a:rPr>
-                        <a:t> in 1 ms </a:t>
-                      </a:r>
-                      <a:endParaRPr lang="es-MX" sz="1400" b="0" dirty="0">
-                        <a:latin typeface="Arial" panose="020B0604020202020204" pitchFamily="34" charset="0"/>
-                        <a:cs typeface="Arial" panose="020B0604020202020204" pitchFamily="34" charset="0"/>
-                      </a:endParaRPr>
-                    </a:p>
-                  </a:txBody>
-                  <a:tcPr/>
-                </a:tc>
-              </a:tr>
-              <a:tr h="305929">
-                <a:tc>
-                  <a:txBody>
-                    <a:bodyPr/>
-                    <a:lstStyle/>
-                    <a:p>
-                      <a:r>
-                        <a:rPr lang="es-MX" sz="1400" b="0" dirty="0" err="1" smtClean="0">
+                        <a:rPr lang="es-MX" sz="1400" b="1" dirty="0" err="1" smtClean="0">
                           <a:latin typeface="Arial" panose="020B0604020202020204" pitchFamily="34" charset="0"/>
                           <a:cs typeface="Arial" panose="020B0604020202020204" pitchFamily="34" charset="0"/>
                         </a:rPr>
                         <a:t>Timer.h</a:t>
                       </a:r>
-                      <a:endParaRPr lang="es-MX" sz="1400" b="0" dirty="0">
+                      <a:endParaRPr lang="es-MX" sz="1400" b="1" dirty="0">
                         <a:latin typeface="Arial" panose="020B0604020202020204" pitchFamily="34" charset="0"/>
                         <a:cs typeface="Arial" panose="020B0604020202020204" pitchFamily="34" charset="0"/>
                       </a:endParaRPr>
@@ -14333,11 +14567,87 @@
                     <a:lstStyle/>
                     <a:p>
                       <a:r>
+                        <a:rPr lang="es-MX" sz="1400" b="1" dirty="0" err="1" smtClean="0">
+                          <a:latin typeface="Arial" panose="020B0604020202020204" pitchFamily="34" charset="0"/>
+                          <a:cs typeface="Arial" panose="020B0604020202020204" pitchFamily="34" charset="0"/>
+                        </a:rPr>
+                        <a:t>Leds.c</a:t>
+                      </a:r>
+                      <a:endParaRPr lang="es-MX" sz="1400" b="1" dirty="0">
+                        <a:latin typeface="Arial" panose="020B0604020202020204" pitchFamily="34" charset="0"/>
+                        <a:cs typeface="Arial" panose="020B0604020202020204" pitchFamily="34" charset="0"/>
+                      </a:endParaRPr>
+                    </a:p>
+                  </a:txBody>
+                  <a:tcPr/>
+                </a:tc>
+                <a:tc>
+                  <a:txBody>
+                    <a:bodyPr/>
+                    <a:lstStyle/>
+                    <a:p>
+                      <a:r>
                         <a:rPr lang="es-MX" sz="1400" b="0" dirty="0" err="1" smtClean="0">
                           <a:latin typeface="Arial" panose="020B0604020202020204" pitchFamily="34" charset="0"/>
                           <a:cs typeface="Arial" panose="020B0604020202020204" pitchFamily="34" charset="0"/>
                         </a:rPr>
-                        <a:t>Leds.c</a:t>
+                        <a:t>Configured</a:t>
+                      </a:r>
+                      <a:r>
+                        <a:rPr lang="es-MX" sz="1400" b="0" dirty="0" smtClean="0">
+                          <a:latin typeface="Arial" panose="020B0604020202020204" pitchFamily="34" charset="0"/>
+                          <a:cs typeface="Arial" panose="020B0604020202020204" pitchFamily="34" charset="0"/>
+                        </a:rPr>
+                        <a:t> </a:t>
+                      </a:r>
+                      <a:r>
+                        <a:rPr lang="es-MX" sz="1400" b="0" dirty="0" err="1" smtClean="0">
+                          <a:latin typeface="Arial" panose="020B0604020202020204" pitchFamily="34" charset="0"/>
+                          <a:cs typeface="Arial" panose="020B0604020202020204" pitchFamily="34" charset="0"/>
+                        </a:rPr>
+                        <a:t>the</a:t>
+                      </a:r>
+                      <a:r>
+                        <a:rPr lang="es-MX" sz="1400" b="0" dirty="0" smtClean="0">
+                          <a:latin typeface="Arial" panose="020B0604020202020204" pitchFamily="34" charset="0"/>
+                          <a:cs typeface="Arial" panose="020B0604020202020204" pitchFamily="34" charset="0"/>
+                        </a:rPr>
+                        <a:t> PORT</a:t>
+                      </a:r>
+                      <a:r>
+                        <a:rPr lang="es-MX" sz="1400" b="0" baseline="0" dirty="0" smtClean="0">
+                          <a:latin typeface="Arial" panose="020B0604020202020204" pitchFamily="34" charset="0"/>
+                          <a:cs typeface="Arial" panose="020B0604020202020204" pitchFamily="34" charset="0"/>
+                        </a:rPr>
+                        <a:t> </a:t>
+                      </a:r>
+                      <a:r>
+                        <a:rPr lang="es-MX" sz="1400" b="0" dirty="0" smtClean="0">
+                          <a:latin typeface="Arial" panose="020B0604020202020204" pitchFamily="34" charset="0"/>
+                          <a:cs typeface="Arial" panose="020B0604020202020204" pitchFamily="34" charset="0"/>
+                        </a:rPr>
+                        <a:t>A</a:t>
+                      </a:r>
+                      <a:r>
+                        <a:rPr lang="es-MX" sz="1400" b="0" baseline="0" dirty="0" smtClean="0">
+                          <a:latin typeface="Arial" panose="020B0604020202020204" pitchFamily="34" charset="0"/>
+                          <a:cs typeface="Arial" panose="020B0604020202020204" pitchFamily="34" charset="0"/>
+                        </a:rPr>
+                        <a:t>  as outputs and led1 to led4 </a:t>
+                      </a:r>
+                      <a:r>
+                        <a:rPr lang="es-MX" sz="1400" b="0" baseline="0" dirty="0" err="1" smtClean="0">
+                          <a:latin typeface="Arial" panose="020B0604020202020204" pitchFamily="34" charset="0"/>
+                          <a:cs typeface="Arial" panose="020B0604020202020204" pitchFamily="34" charset="0"/>
+                        </a:rPr>
+                        <a:t>on</a:t>
+                      </a:r>
+                      <a:r>
+                        <a:rPr lang="es-MX" sz="1400" b="0" baseline="0" dirty="0" smtClean="0">
+                          <a:latin typeface="Arial" panose="020B0604020202020204" pitchFamily="34" charset="0"/>
+                          <a:cs typeface="Arial" panose="020B0604020202020204" pitchFamily="34" charset="0"/>
+                        </a:rPr>
+                        <a:t> board</a:t>
                       </a:r>
                       <a:endParaRPr lang="es-MX" sz="1400" b="0" dirty="0">
                         <a:latin typeface="Arial" panose="020B0604020202020204" pitchFamily="34" charset="0"/>
@@ -14347,17 +14657,39 @@
                   </a:txBody>
                   <a:tcPr/>
                 </a:tc>
+              </a:tr>
+              <a:tr h="305929">
                 <a:tc>
                   <a:txBody>
                     <a:bodyPr/>
                     <a:lstStyle/>
                     <a:p>
                       <a:r>
+                        <a:rPr lang="es-MX" sz="1400" b="1" dirty="0" err="1" smtClean="0">
+                          <a:latin typeface="Arial" panose="020B0604020202020204" pitchFamily="34" charset="0"/>
+                          <a:cs typeface="Arial" panose="020B0604020202020204" pitchFamily="34" charset="0"/>
+                        </a:rPr>
+                        <a:t>Leds.h</a:t>
+                      </a:r>
+                      <a:endParaRPr lang="es-MX" sz="1400" b="1" dirty="0">
+                        <a:latin typeface="Arial" panose="020B0604020202020204" pitchFamily="34" charset="0"/>
+                        <a:cs typeface="Arial" panose="020B0604020202020204" pitchFamily="34" charset="0"/>
+                      </a:endParaRPr>
+                    </a:p>
+                  </a:txBody>
+                  <a:tcPr/>
+                </a:tc>
+                <a:tc>
+                  <a:txBody>
+                    <a:bodyPr/>
+                    <a:lstStyle/>
+                    <a:p>
+                      <a:r>
                         <a:rPr lang="es-MX" sz="1400" b="0" dirty="0" err="1" smtClean="0">
                           <a:latin typeface="Arial" panose="020B0604020202020204" pitchFamily="34" charset="0"/>
                           <a:cs typeface="Arial" panose="020B0604020202020204" pitchFamily="34" charset="0"/>
                         </a:rPr>
-                        <a:t>Configured</a:t>
+                        <a:t>Export</a:t>
                       </a:r>
                       <a:r>
                         <a:rPr lang="es-MX" sz="1400" b="0" dirty="0" smtClean="0">
@@ -14381,53 +14713,53 @@
                         <a:t> </a:t>
                       </a:r>
                       <a:r>
+                        <a:rPr lang="es-MX" sz="1400" b="0" dirty="0" err="1" smtClean="0">
+                          <a:latin typeface="Arial" panose="020B0604020202020204" pitchFamily="34" charset="0"/>
+                          <a:cs typeface="Arial" panose="020B0604020202020204" pitchFamily="34" charset="0"/>
+                        </a:rPr>
+                        <a:t>configuration</a:t>
+                      </a:r>
+                      <a:r>
                         <a:rPr lang="es-MX" sz="1400" b="0" dirty="0" smtClean="0">
                           <a:latin typeface="Arial" panose="020B0604020202020204" pitchFamily="34" charset="0"/>
                           <a:cs typeface="Arial" panose="020B0604020202020204" pitchFamily="34" charset="0"/>
                         </a:rPr>
-                        <a:t>PORT</a:t>
+                        <a:t> of porta and led1</a:t>
                       </a:r>
                       <a:r>
                         <a:rPr lang="es-MX" sz="1400" b="0" baseline="0" dirty="0" smtClean="0">
                           <a:latin typeface="Arial" panose="020B0604020202020204" pitchFamily="34" charset="0"/>
                           <a:cs typeface="Arial" panose="020B0604020202020204" pitchFamily="34" charset="0"/>
                         </a:rPr>
+                        <a:t> to led4</a:t>
+                      </a:r>
+                      <a:r>
+                        <a:rPr lang="es-MX" sz="1400" b="0" dirty="0" smtClean="0">
+                          <a:latin typeface="Arial" panose="020B0604020202020204" pitchFamily="34" charset="0"/>
+                          <a:cs typeface="Arial" panose="020B0604020202020204" pitchFamily="34" charset="0"/>
+                        </a:rPr>
                         <a:t> </a:t>
                       </a:r>
                       <a:r>
+                        <a:rPr lang="es-MX" sz="1400" b="0" dirty="0" err="1" smtClean="0">
+                          <a:latin typeface="Arial" panose="020B0604020202020204" pitchFamily="34" charset="0"/>
+                          <a:cs typeface="Arial" panose="020B0604020202020204" pitchFamily="34" charset="0"/>
+                        </a:rPr>
+                        <a:t>on</a:t>
+                      </a:r>
+                      <a:r>
                         <a:rPr lang="es-MX" sz="1400" b="0" dirty="0" smtClean="0">
                           <a:latin typeface="Arial" panose="020B0604020202020204" pitchFamily="34" charset="0"/>
                           <a:cs typeface="Arial" panose="020B0604020202020204" pitchFamily="34" charset="0"/>
                         </a:rPr>
-                        <a:t>A</a:t>
-                      </a:r>
-                      <a:r>
-                        <a:rPr lang="es-MX" sz="1400" b="0" baseline="0" dirty="0" smtClean="0">
-                          <a:latin typeface="Arial" panose="020B0604020202020204" pitchFamily="34" charset="0"/>
-                          <a:cs typeface="Arial" panose="020B0604020202020204" pitchFamily="34" charset="0"/>
-                        </a:rPr>
-                        <a:t>  </a:t>
-                      </a:r>
-                      <a:r>
-                        <a:rPr lang="es-MX" sz="1400" b="0" baseline="0" dirty="0" smtClean="0">
-                          <a:latin typeface="Arial" panose="020B0604020202020204" pitchFamily="34" charset="0"/>
-                          <a:cs typeface="Arial" panose="020B0604020202020204" pitchFamily="34" charset="0"/>
-                        </a:rPr>
-                        <a:t>as outputs and led1 to led4 </a:t>
-                      </a:r>
-                      <a:r>
-                        <a:rPr lang="es-MX" sz="1400" b="0" baseline="0" dirty="0" err="1" smtClean="0">
-                          <a:latin typeface="Arial" panose="020B0604020202020204" pitchFamily="34" charset="0"/>
-                          <a:cs typeface="Arial" panose="020B0604020202020204" pitchFamily="34" charset="0"/>
-                        </a:rPr>
-                        <a:t>on</a:t>
-                      </a:r>
-                      <a:r>
-                        <a:rPr lang="es-MX" sz="1400" b="0" baseline="0" dirty="0" smtClean="0">
-                          <a:latin typeface="Arial" panose="020B0604020202020204" pitchFamily="34" charset="0"/>
-                          <a:cs typeface="Arial" panose="020B0604020202020204" pitchFamily="34" charset="0"/>
-                        </a:rPr>
-                        <a:t> board</a:t>
+                        <a:t> </a:t>
+                      </a:r>
+                      <a:r>
+                        <a:rPr lang="es-MX" sz="1400" b="0" dirty="0" err="1" smtClean="0">
+                          <a:latin typeface="Arial" panose="020B0604020202020204" pitchFamily="34" charset="0"/>
+                          <a:cs typeface="Arial" panose="020B0604020202020204" pitchFamily="34" charset="0"/>
+                        </a:rPr>
+                        <a:t>board</a:t>
                       </a:r>
                       <a:endParaRPr lang="es-MX" sz="1400" b="0" dirty="0">
                         <a:latin typeface="Arial" panose="020B0604020202020204" pitchFamily="34" charset="0"/>
@@ -14445,125 +14777,13 @@
                     <a:lstStyle/>
                     <a:p>
                       <a:r>
-                        <a:rPr lang="es-MX" sz="1400" b="0" dirty="0" err="1" smtClean="0">
-                          <a:latin typeface="Arial" panose="020B0604020202020204" pitchFamily="34" charset="0"/>
-                          <a:cs typeface="Arial" panose="020B0604020202020204" pitchFamily="34" charset="0"/>
-                        </a:rPr>
-                        <a:t>Leds.h</a:t>
-                      </a:r>
-                      <a:endParaRPr lang="es-MX" sz="1400" b="0" dirty="0">
-                        <a:latin typeface="Arial" panose="020B0604020202020204" pitchFamily="34" charset="0"/>
-                        <a:cs typeface="Arial" panose="020B0604020202020204" pitchFamily="34" charset="0"/>
-                      </a:endParaRPr>
-                    </a:p>
-                  </a:txBody>
-                  <a:tcPr/>
-                </a:tc>
-                <a:tc>
-                  <a:txBody>
-                    <a:bodyPr/>
-                    <a:lstStyle/>
-                    <a:p>
-                      <a:r>
-                        <a:rPr lang="es-MX" sz="1400" b="0" dirty="0" err="1" smtClean="0">
-                          <a:latin typeface="Arial" panose="020B0604020202020204" pitchFamily="34" charset="0"/>
-                          <a:cs typeface="Arial" panose="020B0604020202020204" pitchFamily="34" charset="0"/>
-                        </a:rPr>
-                        <a:t>Export</a:t>
-                      </a:r>
-                      <a:r>
-                        <a:rPr lang="es-MX" sz="1400" b="0" dirty="0" smtClean="0">
-                          <a:latin typeface="Arial" panose="020B0604020202020204" pitchFamily="34" charset="0"/>
-                          <a:cs typeface="Arial" panose="020B0604020202020204" pitchFamily="34" charset="0"/>
-                        </a:rPr>
-                        <a:t> </a:t>
-                      </a:r>
-                      <a:r>
-                        <a:rPr lang="es-MX" sz="1400" b="0" dirty="0" err="1" smtClean="0">
-                          <a:latin typeface="Arial" panose="020B0604020202020204" pitchFamily="34" charset="0"/>
-                          <a:cs typeface="Arial" panose="020B0604020202020204" pitchFamily="34" charset="0"/>
-                        </a:rPr>
-                        <a:t>the</a:t>
-                      </a:r>
-                      <a:r>
-                        <a:rPr lang="es-MX" sz="1400" b="0" dirty="0" smtClean="0">
-                          <a:latin typeface="Arial" panose="020B0604020202020204" pitchFamily="34" charset="0"/>
-                          <a:cs typeface="Arial" panose="020B0604020202020204" pitchFamily="34" charset="0"/>
-                        </a:rPr>
-                        <a:t> </a:t>
-                      </a:r>
-                      <a:r>
-                        <a:rPr lang="es-MX" sz="1400" b="0" dirty="0" err="1" smtClean="0">
-                          <a:latin typeface="Arial" panose="020B0604020202020204" pitchFamily="34" charset="0"/>
-                          <a:cs typeface="Arial" panose="020B0604020202020204" pitchFamily="34" charset="0"/>
-                        </a:rPr>
-                        <a:t>configuration</a:t>
-                      </a:r>
-                      <a:r>
-                        <a:rPr lang="es-MX" sz="1400" b="0" dirty="0" smtClean="0">
-                          <a:latin typeface="Arial" panose="020B0604020202020204" pitchFamily="34" charset="0"/>
-                          <a:cs typeface="Arial" panose="020B0604020202020204" pitchFamily="34" charset="0"/>
-                        </a:rPr>
-                        <a:t> of porta and led1</a:t>
-                      </a:r>
-                      <a:r>
-                        <a:rPr lang="es-MX" sz="1400" b="0" baseline="0" dirty="0" smtClean="0">
-                          <a:latin typeface="Arial" panose="020B0604020202020204" pitchFamily="34" charset="0"/>
-                          <a:cs typeface="Arial" panose="020B0604020202020204" pitchFamily="34" charset="0"/>
-                        </a:rPr>
-                        <a:t> to led4</a:t>
-                      </a:r>
-                      <a:r>
-                        <a:rPr lang="es-MX" sz="1400" b="0" dirty="0" smtClean="0">
-                          <a:latin typeface="Arial" panose="020B0604020202020204" pitchFamily="34" charset="0"/>
-                          <a:cs typeface="Arial" panose="020B0604020202020204" pitchFamily="34" charset="0"/>
-                        </a:rPr>
-                        <a:t> </a:t>
-                      </a:r>
-                      <a:r>
-                        <a:rPr lang="es-MX" sz="1400" b="0" dirty="0" err="1" smtClean="0">
-                          <a:latin typeface="Arial" panose="020B0604020202020204" pitchFamily="34" charset="0"/>
-                          <a:cs typeface="Arial" panose="020B0604020202020204" pitchFamily="34" charset="0"/>
-                        </a:rPr>
-                        <a:t>on</a:t>
-                      </a:r>
-                      <a:r>
-                        <a:rPr lang="es-MX" sz="1400" b="0" dirty="0" smtClean="0">
-                          <a:latin typeface="Arial" panose="020B0604020202020204" pitchFamily="34" charset="0"/>
-                          <a:cs typeface="Arial" panose="020B0604020202020204" pitchFamily="34" charset="0"/>
-                        </a:rPr>
-                        <a:t> </a:t>
-                      </a:r>
-                      <a:r>
-                        <a:rPr lang="es-MX" sz="1400" b="0" dirty="0" err="1" smtClean="0">
-                          <a:latin typeface="Arial" panose="020B0604020202020204" pitchFamily="34" charset="0"/>
-                          <a:cs typeface="Arial" panose="020B0604020202020204" pitchFamily="34" charset="0"/>
-                        </a:rPr>
-                        <a:t>board</a:t>
-                      </a:r>
-                      <a:endParaRPr lang="es-MX" sz="1400" b="0" dirty="0">
-                        <a:latin typeface="Arial" panose="020B0604020202020204" pitchFamily="34" charset="0"/>
-                        <a:cs typeface="Arial" panose="020B0604020202020204" pitchFamily="34" charset="0"/>
-                      </a:endParaRPr>
-                    </a:p>
-                  </a:txBody>
-                  <a:tcPr/>
-                </a:tc>
-              </a:tr>
-              <a:tr h="305929">
-                <a:tc>
-                  <a:txBody>
-                    <a:bodyPr/>
-                    <a:lstStyle/>
-                    <a:p>
-                      <a:r>
-                        <a:rPr lang="es-MX" sz="1400" b="0" dirty="0" err="1" smtClean="0">
+                        <a:rPr lang="es-MX" sz="1400" b="1" dirty="0" err="1" smtClean="0">
                           <a:latin typeface="Arial" panose="020B0604020202020204" pitchFamily="34" charset="0"/>
                           <a:cs typeface="Arial" panose="020B0604020202020204" pitchFamily="34" charset="0"/>
                         </a:rPr>
                         <a:t>Typedesfs.h</a:t>
                       </a:r>
-                      <a:endParaRPr lang="es-MX" sz="1400" b="0" dirty="0">
+                      <a:endParaRPr lang="es-MX" sz="1400" b="1" dirty="0">
                         <a:latin typeface="Arial" panose="020B0604020202020204" pitchFamily="34" charset="0"/>
                         <a:cs typeface="Arial" panose="020B0604020202020204" pitchFamily="34" charset="0"/>
                       </a:endParaRPr>
@@ -14603,13 +14823,13 @@
                     <a:lstStyle/>
                     <a:p>
                       <a:r>
-                        <a:rPr lang="es-MX" sz="1400" b="0" dirty="0" err="1" smtClean="0">
+                        <a:rPr lang="es-MX" sz="1400" b="1" dirty="0" err="1" smtClean="0">
                           <a:latin typeface="Arial" panose="020B0604020202020204" pitchFamily="34" charset="0"/>
                           <a:cs typeface="Arial" panose="020B0604020202020204" pitchFamily="34" charset="0"/>
                         </a:rPr>
                         <a:t>Stdtypedef.h</a:t>
                       </a:r>
-                      <a:endParaRPr lang="es-MX" sz="1400" b="0" dirty="0">
+                      <a:endParaRPr lang="es-MX" sz="1400" b="1" dirty="0">
                         <a:latin typeface="Arial" panose="020B0604020202020204" pitchFamily="34" charset="0"/>
                         <a:cs typeface="Arial" panose="020B0604020202020204" pitchFamily="34" charset="0"/>
                       </a:endParaRPr>
@@ -14660,13 +14880,13 @@
                     <a:lstStyle/>
                     <a:p>
                       <a:r>
-                        <a:rPr lang="es-MX" sz="1400" b="0" dirty="0" err="1" smtClean="0">
+                        <a:rPr lang="es-MX" sz="1400" b="1" dirty="0" err="1" smtClean="0">
                           <a:latin typeface="Arial" panose="020B0604020202020204" pitchFamily="34" charset="0"/>
                           <a:cs typeface="Arial" panose="020B0604020202020204" pitchFamily="34" charset="0"/>
                         </a:rPr>
                         <a:t>INIT.c</a:t>
                       </a:r>
-                      <a:endParaRPr lang="es-MX" sz="1400" b="0" dirty="0">
+                      <a:endParaRPr lang="es-MX" sz="1400" b="1" dirty="0">
                         <a:latin typeface="Arial" panose="020B0604020202020204" pitchFamily="34" charset="0"/>
                         <a:cs typeface="Arial" panose="020B0604020202020204" pitchFamily="34" charset="0"/>
                       </a:endParaRPr>
@@ -14717,11 +14937,73 @@
                     <a:lstStyle/>
                     <a:p>
                       <a:r>
+                        <a:rPr lang="es-MX" sz="1400" b="1" dirty="0" err="1" smtClean="0">
+                          <a:latin typeface="Arial" panose="020B0604020202020204" pitchFamily="34" charset="0"/>
+                          <a:cs typeface="Arial" panose="020B0604020202020204" pitchFamily="34" charset="0"/>
+                        </a:rPr>
+                        <a:t>INIT.h</a:t>
+                      </a:r>
+                      <a:endParaRPr lang="es-MX" sz="1400" b="1" dirty="0">
+                        <a:latin typeface="Arial" panose="020B0604020202020204" pitchFamily="34" charset="0"/>
+                        <a:cs typeface="Arial" panose="020B0604020202020204" pitchFamily="34" charset="0"/>
+                      </a:endParaRPr>
+                    </a:p>
+                  </a:txBody>
+                  <a:tcPr/>
+                </a:tc>
+                <a:tc>
+                  <a:txBody>
+                    <a:bodyPr/>
+                    <a:lstStyle/>
+                    <a:p>
+                      <a:r>
                         <a:rPr lang="es-MX" sz="1400" b="0" dirty="0" err="1" smtClean="0">
                           <a:latin typeface="Arial" panose="020B0604020202020204" pitchFamily="34" charset="0"/>
                           <a:cs typeface="Arial" panose="020B0604020202020204" pitchFamily="34" charset="0"/>
                         </a:rPr>
-                        <a:t>INIT.h</a:t>
+                        <a:t>Export</a:t>
+                      </a:r>
+                      <a:r>
+                        <a:rPr lang="es-MX" sz="1400" b="0" dirty="0" smtClean="0">
+                          <a:latin typeface="Arial" panose="020B0604020202020204" pitchFamily="34" charset="0"/>
+                          <a:cs typeface="Arial" panose="020B0604020202020204" pitchFamily="34" charset="0"/>
+                        </a:rPr>
+                        <a:t> </a:t>
+                      </a:r>
+                      <a:r>
+                        <a:rPr lang="es-MX" sz="1400" b="0" dirty="0" err="1" smtClean="0">
+                          <a:latin typeface="Arial" panose="020B0604020202020204" pitchFamily="34" charset="0"/>
+                          <a:cs typeface="Arial" panose="020B0604020202020204" pitchFamily="34" charset="0"/>
+                        </a:rPr>
+                        <a:t>the</a:t>
+                      </a:r>
+                      <a:r>
+                        <a:rPr lang="es-MX" sz="1400" b="0" dirty="0" smtClean="0">
+                          <a:latin typeface="Arial" panose="020B0604020202020204" pitchFamily="34" charset="0"/>
+                          <a:cs typeface="Arial" panose="020B0604020202020204" pitchFamily="34" charset="0"/>
+                        </a:rPr>
+                        <a:t> </a:t>
+                      </a:r>
+                      <a:r>
+                        <a:rPr lang="es-MX" sz="1400" b="0" dirty="0" err="1" smtClean="0">
+                          <a:latin typeface="Arial" panose="020B0604020202020204" pitchFamily="34" charset="0"/>
+                          <a:cs typeface="Arial" panose="020B0604020202020204" pitchFamily="34" charset="0"/>
+                        </a:rPr>
+                        <a:t>pll</a:t>
+                      </a:r>
+                      <a:r>
+                        <a:rPr lang="es-MX" sz="1400" b="0" dirty="0" smtClean="0">
+                          <a:latin typeface="Arial" panose="020B0604020202020204" pitchFamily="34" charset="0"/>
+                          <a:cs typeface="Arial" panose="020B0604020202020204" pitchFamily="34" charset="0"/>
+                        </a:rPr>
+                        <a:t> </a:t>
+                      </a:r>
+                      <a:r>
+                        <a:rPr lang="es-MX" sz="1400" b="0" dirty="0" err="1" smtClean="0">
+                          <a:latin typeface="Arial" panose="020B0604020202020204" pitchFamily="34" charset="0"/>
+                          <a:cs typeface="Arial" panose="020B0604020202020204" pitchFamily="34" charset="0"/>
+                        </a:rPr>
+                        <a:t>configuration</a:t>
                       </a:r>
                       <a:endParaRPr lang="es-MX" sz="1400" b="0" dirty="0">
                         <a:latin typeface="Arial" panose="020B0604020202020204" pitchFamily="34" charset="0"/>
@@ -14731,68 +15013,6 @@
                   </a:txBody>
                   <a:tcPr/>
                 </a:tc>
-                <a:tc>
-                  <a:txBody>
-                    <a:bodyPr/>
-                    <a:lstStyle/>
-                    <a:p>
-                      <a:r>
-                        <a:rPr lang="es-MX" sz="1400" b="0" dirty="0" err="1" smtClean="0">
-                          <a:latin typeface="Arial" panose="020B0604020202020204" pitchFamily="34" charset="0"/>
-                          <a:cs typeface="Arial" panose="020B0604020202020204" pitchFamily="34" charset="0"/>
-                        </a:rPr>
-                        <a:t>Export</a:t>
-                      </a:r>
-                      <a:r>
-                        <a:rPr lang="es-MX" sz="1400" b="0" dirty="0" smtClean="0">
-                          <a:latin typeface="Arial" panose="020B0604020202020204" pitchFamily="34" charset="0"/>
-                          <a:cs typeface="Arial" panose="020B0604020202020204" pitchFamily="34" charset="0"/>
-                        </a:rPr>
-                        <a:t> </a:t>
-                      </a:r>
-                      <a:r>
-                        <a:rPr lang="es-MX" sz="1400" b="0" dirty="0" err="1" smtClean="0">
-                          <a:latin typeface="Arial" panose="020B0604020202020204" pitchFamily="34" charset="0"/>
-                          <a:cs typeface="Arial" panose="020B0604020202020204" pitchFamily="34" charset="0"/>
-                        </a:rPr>
-                        <a:t>the</a:t>
-                      </a:r>
-                      <a:r>
-                        <a:rPr lang="es-MX" sz="1400" b="0" dirty="0" smtClean="0">
-                          <a:latin typeface="Arial" panose="020B0604020202020204" pitchFamily="34" charset="0"/>
-                          <a:cs typeface="Arial" panose="020B0604020202020204" pitchFamily="34" charset="0"/>
-                        </a:rPr>
-                        <a:t> </a:t>
-                      </a:r>
-                      <a:r>
-                        <a:rPr lang="es-MX" sz="1400" b="0" dirty="0" err="1" smtClean="0">
-                          <a:latin typeface="Arial" panose="020B0604020202020204" pitchFamily="34" charset="0"/>
-                          <a:cs typeface="Arial" panose="020B0604020202020204" pitchFamily="34" charset="0"/>
-                        </a:rPr>
-                        <a:t>pll</a:t>
-                      </a:r>
-                      <a:r>
-                        <a:rPr lang="es-MX" sz="1400" b="0" dirty="0" smtClean="0">
-                          <a:latin typeface="Arial" panose="020B0604020202020204" pitchFamily="34" charset="0"/>
-                          <a:cs typeface="Arial" panose="020B0604020202020204" pitchFamily="34" charset="0"/>
-                        </a:rPr>
-                        <a:t> </a:t>
-                      </a:r>
-                      <a:r>
-                        <a:rPr lang="es-MX" sz="1400" b="0" dirty="0" err="1" smtClean="0">
-                          <a:latin typeface="Arial" panose="020B0604020202020204" pitchFamily="34" charset="0"/>
-                          <a:cs typeface="Arial" panose="020B0604020202020204" pitchFamily="34" charset="0"/>
-                        </a:rPr>
-                        <a:t>configuration</a:t>
-                      </a:r>
-                      <a:endParaRPr lang="es-MX" sz="1400" b="0" dirty="0">
-                        <a:latin typeface="Arial" panose="020B0604020202020204" pitchFamily="34" charset="0"/>
-                        <a:cs typeface="Arial" panose="020B0604020202020204" pitchFamily="34" charset="0"/>
-                      </a:endParaRPr>
-                    </a:p>
-                  </a:txBody>
-                  <a:tcPr/>
-                </a:tc>
               </a:tr>
               <a:tr h="305929">
                 <a:tc>
@@ -14801,13 +15021,13 @@
                     <a:lstStyle/>
                     <a:p>
                       <a:r>
-                        <a:rPr lang="es-MX" sz="1400" b="0" dirty="0" err="1" smtClean="0">
+                        <a:rPr lang="es-MX" sz="1400" b="1" dirty="0" err="1" smtClean="0">
                           <a:latin typeface="Arial" panose="020B0604020202020204" pitchFamily="34" charset="0"/>
                           <a:cs typeface="Arial" panose="020B0604020202020204" pitchFamily="34" charset="0"/>
                         </a:rPr>
                         <a:t>IntcInterrupts.c</a:t>
                       </a:r>
-                      <a:endParaRPr lang="es-MX" sz="1400" b="0" dirty="0">
+                      <a:endParaRPr lang="es-MX" sz="1400" b="1" dirty="0">
                         <a:latin typeface="Arial" panose="020B0604020202020204" pitchFamily="34" charset="0"/>
                         <a:cs typeface="Arial" panose="020B0604020202020204" pitchFamily="34" charset="0"/>
                       </a:endParaRPr>
@@ -14847,11 +15067,87 @@
                     <a:lstStyle/>
                     <a:p>
                       <a:r>
+                        <a:rPr lang="es-MX" sz="1400" b="1" dirty="0" err="1" smtClean="0">
+                          <a:latin typeface="Arial" panose="020B0604020202020204" pitchFamily="34" charset="0"/>
+                          <a:cs typeface="Arial" panose="020B0604020202020204" pitchFamily="34" charset="0"/>
+                        </a:rPr>
+                        <a:t>IntcInterrupts.h</a:t>
+                      </a:r>
+                      <a:endParaRPr lang="es-MX" sz="1400" b="1" dirty="0">
+                        <a:latin typeface="Arial" panose="020B0604020202020204" pitchFamily="34" charset="0"/>
+                        <a:cs typeface="Arial" panose="020B0604020202020204" pitchFamily="34" charset="0"/>
+                      </a:endParaRPr>
+                    </a:p>
+                  </a:txBody>
+                  <a:tcPr/>
+                </a:tc>
+                <a:tc>
+                  <a:txBody>
+                    <a:bodyPr/>
+                    <a:lstStyle/>
+                    <a:p>
+                      <a:r>
                         <a:rPr lang="es-MX" sz="1400" b="0" dirty="0" err="1" smtClean="0">
                           <a:latin typeface="Arial" panose="020B0604020202020204" pitchFamily="34" charset="0"/>
                           <a:cs typeface="Arial" panose="020B0604020202020204" pitchFamily="34" charset="0"/>
                         </a:rPr>
-                        <a:t>IntcInterrupts.h</a:t>
+                        <a:t>Export</a:t>
+                      </a:r>
+                      <a:r>
+                        <a:rPr lang="es-MX" sz="1400" b="0" dirty="0" smtClean="0">
+                          <a:latin typeface="Arial" panose="020B0604020202020204" pitchFamily="34" charset="0"/>
+                          <a:cs typeface="Arial" panose="020B0604020202020204" pitchFamily="34" charset="0"/>
+                        </a:rPr>
+                        <a:t> </a:t>
+                      </a:r>
+                      <a:r>
+                        <a:rPr lang="es-MX" sz="1400" b="0" dirty="0" err="1" smtClean="0">
+                          <a:latin typeface="Arial" panose="020B0604020202020204" pitchFamily="34" charset="0"/>
+                          <a:cs typeface="Arial" panose="020B0604020202020204" pitchFamily="34" charset="0"/>
+                        </a:rPr>
+                        <a:t>the</a:t>
+                      </a:r>
+                      <a:r>
+                        <a:rPr lang="es-MX" sz="1400" b="0" dirty="0" smtClean="0">
+                          <a:latin typeface="Arial" panose="020B0604020202020204" pitchFamily="34" charset="0"/>
+                          <a:cs typeface="Arial" panose="020B0604020202020204" pitchFamily="34" charset="0"/>
+                        </a:rPr>
+                        <a:t> interface of </a:t>
+                      </a:r>
+                      <a:r>
+                        <a:rPr lang="es-MX" sz="1400" b="0" dirty="0" err="1" smtClean="0">
+                          <a:latin typeface="Arial" panose="020B0604020202020204" pitchFamily="34" charset="0"/>
+                          <a:cs typeface="Arial" panose="020B0604020202020204" pitchFamily="34" charset="0"/>
+                        </a:rPr>
+                        <a:t>interrupt</a:t>
+                      </a:r>
+                      <a:r>
+                        <a:rPr lang="es-MX" sz="1400" b="0" dirty="0" smtClean="0">
+                          <a:latin typeface="Arial" panose="020B0604020202020204" pitchFamily="34" charset="0"/>
+                          <a:cs typeface="Arial" panose="020B0604020202020204" pitchFamily="34" charset="0"/>
+                        </a:rPr>
+                        <a:t> </a:t>
+                      </a:r>
+                      <a:r>
+                        <a:rPr lang="es-MX" sz="1400" b="0" dirty="0" err="1" smtClean="0">
+                          <a:latin typeface="Arial" panose="020B0604020202020204" pitchFamily="34" charset="0"/>
+                          <a:cs typeface="Arial" panose="020B0604020202020204" pitchFamily="34" charset="0"/>
+                        </a:rPr>
+                        <a:t>controller</a:t>
+                      </a:r>
+                      <a:r>
+                        <a:rPr lang="es-MX" sz="1400" b="0" dirty="0" smtClean="0">
+                          <a:latin typeface="Arial" panose="020B0604020202020204" pitchFamily="34" charset="0"/>
+                          <a:cs typeface="Arial" panose="020B0604020202020204" pitchFamily="34" charset="0"/>
+                        </a:rPr>
+                        <a:t> </a:t>
+                      </a:r>
+                      <a:r>
+                        <a:rPr lang="es-MX" sz="1400" b="0" dirty="0" err="1" smtClean="0">
+                          <a:latin typeface="Arial" panose="020B0604020202020204" pitchFamily="34" charset="0"/>
+                          <a:cs typeface="Arial" panose="020B0604020202020204" pitchFamily="34" charset="0"/>
+                        </a:rPr>
+                        <a:t>handing</a:t>
                       </a:r>
                       <a:endParaRPr lang="es-MX" sz="1400" b="0" dirty="0">
                         <a:latin typeface="Arial" panose="020B0604020202020204" pitchFamily="34" charset="0"/>
@@ -14861,82 +15157,6 @@
                   </a:txBody>
                   <a:tcPr/>
                 </a:tc>
-                <a:tc>
-                  <a:txBody>
-                    <a:bodyPr/>
-                    <a:lstStyle/>
-                    <a:p>
-                      <a:r>
-                        <a:rPr lang="es-MX" sz="1400" b="0" dirty="0" err="1" smtClean="0">
-                          <a:latin typeface="Arial" panose="020B0604020202020204" pitchFamily="34" charset="0"/>
-                          <a:cs typeface="Arial" panose="020B0604020202020204" pitchFamily="34" charset="0"/>
-                        </a:rPr>
-                        <a:t>Export</a:t>
-                      </a:r>
-                      <a:r>
-                        <a:rPr lang="es-MX" sz="1400" b="0" dirty="0" smtClean="0">
-                          <a:latin typeface="Arial" panose="020B0604020202020204" pitchFamily="34" charset="0"/>
-                          <a:cs typeface="Arial" panose="020B0604020202020204" pitchFamily="34" charset="0"/>
-                        </a:rPr>
-                        <a:t> </a:t>
-                      </a:r>
-                      <a:r>
-                        <a:rPr lang="es-MX" sz="1400" b="0" dirty="0" err="1" smtClean="0">
-                          <a:latin typeface="Arial" panose="020B0604020202020204" pitchFamily="34" charset="0"/>
-                          <a:cs typeface="Arial" panose="020B0604020202020204" pitchFamily="34" charset="0"/>
-                        </a:rPr>
-                        <a:t>the</a:t>
-                      </a:r>
-                      <a:r>
-                        <a:rPr lang="es-MX" sz="1400" b="0" dirty="0" smtClean="0">
-                          <a:latin typeface="Arial" panose="020B0604020202020204" pitchFamily="34" charset="0"/>
-                          <a:cs typeface="Arial" panose="020B0604020202020204" pitchFamily="34" charset="0"/>
-                        </a:rPr>
-                        <a:t> interface of </a:t>
-                      </a:r>
-                      <a:r>
-                        <a:rPr lang="es-MX" sz="1400" b="0" dirty="0" err="1" smtClean="0">
-                          <a:latin typeface="Arial" panose="020B0604020202020204" pitchFamily="34" charset="0"/>
-                          <a:cs typeface="Arial" panose="020B0604020202020204" pitchFamily="34" charset="0"/>
-                        </a:rPr>
-                        <a:t>interrupt</a:t>
-                      </a:r>
-                      <a:r>
-                        <a:rPr lang="es-MX" sz="1400" b="0" dirty="0" smtClean="0">
-                          <a:latin typeface="Arial" panose="020B0604020202020204" pitchFamily="34" charset="0"/>
-                          <a:cs typeface="Arial" panose="020B0604020202020204" pitchFamily="34" charset="0"/>
-                        </a:rPr>
-                        <a:t> </a:t>
-                      </a:r>
-                      <a:r>
-                        <a:rPr lang="es-MX" sz="1400" b="0" dirty="0" err="1" smtClean="0">
-                          <a:latin typeface="Arial" panose="020B0604020202020204" pitchFamily="34" charset="0"/>
-                          <a:cs typeface="Arial" panose="020B0604020202020204" pitchFamily="34" charset="0"/>
-                        </a:rPr>
-                        <a:t>controller</a:t>
-                      </a:r>
-                      <a:r>
-                        <a:rPr lang="es-MX" sz="1400" b="0" dirty="0" smtClean="0">
-                          <a:latin typeface="Arial" panose="020B0604020202020204" pitchFamily="34" charset="0"/>
-                          <a:cs typeface="Arial" panose="020B0604020202020204" pitchFamily="34" charset="0"/>
-                        </a:rPr>
-                        <a:t> </a:t>
-                      </a:r>
-                      <a:r>
-                        <a:rPr lang="es-MX" sz="1400" b="0" dirty="0" err="1" smtClean="0">
-                          <a:latin typeface="Arial" panose="020B0604020202020204" pitchFamily="34" charset="0"/>
-                          <a:cs typeface="Arial" panose="020B0604020202020204" pitchFamily="34" charset="0"/>
-                        </a:rPr>
-                        <a:t>handing</a:t>
-                      </a:r>
-                      <a:endParaRPr lang="es-MX" sz="1400" b="0" dirty="0">
-                        <a:latin typeface="Arial" panose="020B0604020202020204" pitchFamily="34" charset="0"/>
-                        <a:cs typeface="Arial" panose="020B0604020202020204" pitchFamily="34" charset="0"/>
-                      </a:endParaRPr>
-                    </a:p>
-                  </a:txBody>
-                  <a:tcPr/>
-                </a:tc>
               </a:tr>
               <a:tr h="152965">
                 <a:tc>
@@ -14945,13 +15165,13 @@
                     <a:lstStyle/>
                     <a:p>
                       <a:r>
-                        <a:rPr lang="en-US" sz="1400" b="0" noProof="0" dirty="0" err="1" smtClean="0">
+                        <a:rPr lang="en-US" sz="1400" b="1" noProof="0" dirty="0" err="1" smtClean="0">
                           <a:latin typeface="Arial" panose="020B0604020202020204" pitchFamily="34" charset="0"/>
                           <a:cs typeface="Arial" panose="020B0604020202020204" pitchFamily="34" charset="0"/>
                         </a:rPr>
                         <a:t>Kernel.h</a:t>
                       </a:r>
-                      <a:endParaRPr lang="en-US" sz="1400" b="0" noProof="0" dirty="0">
+                      <a:endParaRPr lang="en-US" sz="1400" b="1" noProof="0" dirty="0">
                         <a:latin typeface="Arial" panose="020B0604020202020204" pitchFamily="34" charset="0"/>
                         <a:cs typeface="Arial" panose="020B0604020202020204" pitchFamily="34" charset="0"/>
                       </a:endParaRPr>
@@ -15125,7 +15345,7 @@
           <p:nvPr>
             <p:extLst>
               <p:ext uri="{D42A27DB-BD31-4B8C-83A1-F6EECF244321}">
-                <p14:modId xmlns:p14="http://schemas.microsoft.com/office/powerpoint/2010/main" val="3573617520"/>
+                <p14:modId xmlns:p14="http://schemas.microsoft.com/office/powerpoint/2010/main" val="2102077455"/>
               </p:ext>
             </p:extLst>
           </p:nvPr>
@@ -15154,14 +15374,23 @@
                     <a:lstStyle/>
                     <a:p>
                       <a:r>
-                        <a:rPr lang="es-MX" dirty="0" err="1" smtClean="0"/>
+                        <a:rPr lang="es-MX" dirty="0" err="1" smtClean="0">
+                          <a:latin typeface="Arial" pitchFamily="34" charset="0"/>
+                          <a:cs typeface="Arial" pitchFamily="34" charset="0"/>
+                        </a:rPr>
                         <a:t>Name</a:t>
                       </a:r>
                       <a:r>
-                        <a:rPr lang="es-MX" dirty="0" smtClean="0"/>
+                        <a:rPr lang="es-MX" dirty="0" smtClean="0">
+                          <a:latin typeface="Arial" pitchFamily="34" charset="0"/>
+                          <a:cs typeface="Arial" pitchFamily="34" charset="0"/>
+                        </a:rPr>
                         <a:t>:</a:t>
                       </a:r>
-                      <a:endParaRPr lang="es-MX" dirty="0"/>
+                      <a:endParaRPr lang="es-MX" dirty="0">
+                        <a:latin typeface="Arial" pitchFamily="34" charset="0"/>
+                        <a:cs typeface="Arial" pitchFamily="34" charset="0"/>
+                      </a:endParaRPr>
                     </a:p>
                   </a:txBody>
                   <a:tcPr/>
@@ -15172,10 +15401,16 @@
                     <a:lstStyle/>
                     <a:p>
                       <a:r>
-                        <a:rPr lang="es-MX" dirty="0" err="1" smtClean="0"/>
+                        <a:rPr lang="es-MX" dirty="0" err="1" smtClean="0">
+                          <a:latin typeface="Arial" pitchFamily="34" charset="0"/>
+                          <a:cs typeface="Arial" pitchFamily="34" charset="0"/>
+                        </a:rPr>
                         <a:t>Taskmasktype</a:t>
                       </a:r>
-                      <a:endParaRPr lang="es-MX" dirty="0"/>
+                      <a:endParaRPr lang="es-MX" dirty="0">
+                        <a:latin typeface="Arial" pitchFamily="34" charset="0"/>
+                        <a:cs typeface="Arial" pitchFamily="34" charset="0"/>
+                      </a:endParaRPr>
                     </a:p>
                   </a:txBody>
                   <a:tcPr/>
@@ -15219,10 +15454,16 @@
                     <a:p>
                       <a:pPr algn="ctr"/>
                       <a:r>
-                        <a:rPr lang="es-MX" dirty="0" err="1" smtClean="0"/>
+                        <a:rPr lang="es-MX" dirty="0" err="1" smtClean="0">
+                          <a:latin typeface="Arial" pitchFamily="34" charset="0"/>
+                          <a:cs typeface="Arial" pitchFamily="34" charset="0"/>
+                        </a:rPr>
                         <a:t>type</a:t>
                       </a:r>
-                      <a:endParaRPr lang="es-MX" dirty="0"/>
+                      <a:endParaRPr lang="es-MX" dirty="0">
+                        <a:latin typeface="Arial" pitchFamily="34" charset="0"/>
+                        <a:cs typeface="Arial" pitchFamily="34" charset="0"/>
+                      </a:endParaRPr>
                     </a:p>
                   </a:txBody>
                   <a:tcPr/>
@@ -15234,10 +15475,16 @@
                     <a:p>
                       <a:pPr algn="ctr"/>
                       <a:r>
-                        <a:rPr lang="es-MX" dirty="0" smtClean="0"/>
+                        <a:rPr lang="es-MX" dirty="0" smtClean="0">
+                          <a:latin typeface="Arial" pitchFamily="34" charset="0"/>
+                          <a:cs typeface="Arial" pitchFamily="34" charset="0"/>
+                        </a:rPr>
                         <a:t>U32</a:t>
                       </a:r>
-                      <a:endParaRPr lang="es-MX" dirty="0"/>
+                      <a:endParaRPr lang="es-MX" dirty="0">
+                        <a:latin typeface="Arial" pitchFamily="34" charset="0"/>
+                        <a:cs typeface="Arial" pitchFamily="34" charset="0"/>
+                      </a:endParaRPr>
                     </a:p>
                   </a:txBody>
                   <a:tcPr/>
@@ -15281,14 +15528,23 @@
                     <a:p>
                       <a:pPr algn="ctr"/>
                       <a:r>
-                        <a:rPr lang="es-MX" dirty="0" err="1" smtClean="0"/>
+                        <a:rPr lang="es-MX" dirty="0" err="1" smtClean="0">
+                          <a:latin typeface="Arial" pitchFamily="34" charset="0"/>
+                          <a:cs typeface="Arial" pitchFamily="34" charset="0"/>
+                        </a:rPr>
                         <a:t>Range</a:t>
                       </a:r>
                       <a:r>
-                        <a:rPr lang="es-MX" dirty="0" smtClean="0"/>
+                        <a:rPr lang="es-MX" dirty="0" smtClean="0">
+                          <a:latin typeface="Arial" pitchFamily="34" charset="0"/>
+                          <a:cs typeface="Arial" pitchFamily="34" charset="0"/>
+                        </a:rPr>
                         <a:t>: </a:t>
                       </a:r>
-                      <a:endParaRPr lang="es-MX" dirty="0"/>
+                      <a:endParaRPr lang="es-MX" dirty="0">
+                        <a:latin typeface="Arial" pitchFamily="34" charset="0"/>
+                        <a:cs typeface="Arial" pitchFamily="34" charset="0"/>
+                      </a:endParaRPr>
                     </a:p>
                   </a:txBody>
                   <a:tcPr/>
@@ -15300,10 +15556,16 @@
                     <a:p>
                       <a:pPr algn="ctr"/>
                       <a:r>
-                        <a:rPr lang="es-MX" dirty="0" err="1" smtClean="0"/>
+                        <a:rPr lang="es-MX" dirty="0" err="1" smtClean="0">
+                          <a:latin typeface="Arial" pitchFamily="34" charset="0"/>
+                          <a:cs typeface="Arial" pitchFamily="34" charset="0"/>
+                        </a:rPr>
                         <a:t>tickflag</a:t>
                       </a:r>
-                      <a:endParaRPr lang="es-MX" dirty="0"/>
+                      <a:endParaRPr lang="es-MX" dirty="0">
+                        <a:latin typeface="Arial" pitchFamily="34" charset="0"/>
+                        <a:cs typeface="Arial" pitchFamily="34" charset="0"/>
+                      </a:endParaRPr>
                     </a:p>
                   </a:txBody>
                   <a:tcPr/>
@@ -15331,7 +15593,10 @@
                         <a:defRPr/>
                       </a:pPr>
                       <a:r>
-                        <a:rPr lang="es-MX" dirty="0" smtClean="0"/>
+                        <a:rPr lang="es-MX" dirty="0" smtClean="0">
+                          <a:latin typeface="Arial" pitchFamily="34" charset="0"/>
+                          <a:cs typeface="Arial" pitchFamily="34" charset="0"/>
+                        </a:rPr>
                         <a:t>Mask_1ms</a:t>
                       </a:r>
                     </a:p>
@@ -15345,10 +15610,16 @@
                     <a:p>
                       <a:pPr algn="ctr"/>
                       <a:r>
-                        <a:rPr lang="es-MX" dirty="0" smtClean="0"/>
+                        <a:rPr lang="es-MX" dirty="0" smtClean="0">
+                          <a:latin typeface="Arial" pitchFamily="34" charset="0"/>
+                          <a:cs typeface="Arial" pitchFamily="34" charset="0"/>
+                        </a:rPr>
                         <a:t>OxFA00</a:t>
                       </a:r>
-                      <a:endParaRPr lang="es-MX" dirty="0"/>
+                      <a:endParaRPr lang="es-MX" dirty="0">
+                        <a:latin typeface="Arial" pitchFamily="34" charset="0"/>
+                        <a:cs typeface="Arial" pitchFamily="34" charset="0"/>
+                      </a:endParaRPr>
                     </a:p>
                   </a:txBody>
                   <a:tcPr/>
@@ -15360,34 +15631,58 @@
                     <a:p>
                       <a:pPr algn="ctr"/>
                       <a:r>
-                        <a:rPr lang="es-MX" dirty="0" err="1" smtClean="0"/>
+                        <a:rPr lang="es-MX" dirty="0" err="1" smtClean="0">
+                          <a:latin typeface="Arial" pitchFamily="34" charset="0"/>
+                          <a:cs typeface="Arial" pitchFamily="34" charset="0"/>
+                        </a:rPr>
                         <a:t>Mask</a:t>
                       </a:r>
                       <a:r>
-                        <a:rPr lang="es-MX" dirty="0" smtClean="0"/>
+                        <a:rPr lang="es-MX" dirty="0" smtClean="0">
+                          <a:latin typeface="Arial" pitchFamily="34" charset="0"/>
+                          <a:cs typeface="Arial" pitchFamily="34" charset="0"/>
+                        </a:rPr>
                         <a:t> </a:t>
                       </a:r>
                       <a:r>
-                        <a:rPr lang="es-MX" dirty="0" err="1" smtClean="0"/>
+                        <a:rPr lang="es-MX" dirty="0" err="1" smtClean="0">
+                          <a:latin typeface="Arial" pitchFamily="34" charset="0"/>
+                          <a:cs typeface="Arial" pitchFamily="34" charset="0"/>
+                        </a:rPr>
                         <a:t>required</a:t>
                       </a:r>
                       <a:r>
-                        <a:rPr lang="es-MX" dirty="0" smtClean="0"/>
+                        <a:rPr lang="es-MX" dirty="0" smtClean="0">
+                          <a:latin typeface="Arial" pitchFamily="34" charset="0"/>
+                          <a:cs typeface="Arial" pitchFamily="34" charset="0"/>
+                        </a:rPr>
                         <a:t> </a:t>
                       </a:r>
                       <a:r>
-                        <a:rPr lang="es-MX" dirty="0" err="1" smtClean="0"/>
+                        <a:rPr lang="es-MX" dirty="0" err="1" smtClean="0">
+                          <a:latin typeface="Arial" pitchFamily="34" charset="0"/>
+                          <a:cs typeface="Arial" pitchFamily="34" charset="0"/>
+                        </a:rPr>
                         <a:t>for</a:t>
                       </a:r>
                       <a:r>
-                        <a:rPr lang="es-MX" dirty="0" smtClean="0"/>
+                        <a:rPr lang="es-MX" dirty="0" smtClean="0">
+                          <a:latin typeface="Arial" pitchFamily="34" charset="0"/>
+                          <a:cs typeface="Arial" pitchFamily="34" charset="0"/>
+                        </a:rPr>
                         <a:t> 1 ms </a:t>
                       </a:r>
                       <a:r>
-                        <a:rPr lang="es-MX" dirty="0" err="1" smtClean="0"/>
+                        <a:rPr lang="es-MX" dirty="0" err="1" smtClean="0">
+                          <a:latin typeface="Arial" pitchFamily="34" charset="0"/>
+                          <a:cs typeface="Arial" pitchFamily="34" charset="0"/>
+                        </a:rPr>
                         <a:t>task</a:t>
                       </a:r>
-                      <a:endParaRPr lang="es-MX" dirty="0"/>
+                      <a:endParaRPr lang="es-MX" dirty="0">
+                        <a:latin typeface="Arial" pitchFamily="34" charset="0"/>
+                        <a:cs typeface="Arial" pitchFamily="34" charset="0"/>
+                      </a:endParaRPr>
                     </a:p>
                   </a:txBody>
                   <a:tcPr/>
@@ -15400,7 +15695,10 @@
                     <a:lstStyle/>
                     <a:p>
                       <a:pPr algn="ctr"/>
-                      <a:endParaRPr lang="es-MX" dirty="0"/>
+                      <a:endParaRPr lang="es-MX" dirty="0">
+                        <a:latin typeface="Arial" pitchFamily="34" charset="0"/>
+                        <a:cs typeface="Arial" pitchFamily="34" charset="0"/>
+                      </a:endParaRPr>
                     </a:p>
                   </a:txBody>
                   <a:tcPr/>
@@ -15412,10 +15710,16 @@
                     <a:p>
                       <a:pPr algn="ctr"/>
                       <a:r>
-                        <a:rPr lang="es-MX" dirty="0" smtClean="0"/>
+                        <a:rPr lang="es-MX" dirty="0" smtClean="0">
+                          <a:latin typeface="Arial" pitchFamily="34" charset="0"/>
+                          <a:cs typeface="Arial" pitchFamily="34" charset="0"/>
+                        </a:rPr>
                         <a:t>task1</a:t>
                       </a:r>
-                      <a:endParaRPr lang="es-MX" dirty="0"/>
+                      <a:endParaRPr lang="es-MX" dirty="0">
+                        <a:latin typeface="Arial" pitchFamily="34" charset="0"/>
+                        <a:cs typeface="Arial" pitchFamily="34" charset="0"/>
+                      </a:endParaRPr>
                     </a:p>
                   </a:txBody>
                   <a:tcPr/>
@@ -15427,10 +15731,16 @@
                     <a:p>
                       <a:pPr algn="ctr"/>
                       <a:r>
-                        <a:rPr lang="es-MX" dirty="0" smtClean="0"/>
+                        <a:rPr lang="es-MX" dirty="0" smtClean="0">
+                          <a:latin typeface="Arial" pitchFamily="34" charset="0"/>
+                          <a:cs typeface="Arial" pitchFamily="34" charset="0"/>
+                        </a:rPr>
                         <a:t>Mask_1ms</a:t>
                       </a:r>
-                      <a:endParaRPr lang="es-MX" dirty="0"/>
+                      <a:endParaRPr lang="es-MX" dirty="0">
+                        <a:latin typeface="Arial" pitchFamily="34" charset="0"/>
+                        <a:cs typeface="Arial" pitchFamily="34" charset="0"/>
+                      </a:endParaRPr>
                     </a:p>
                   </a:txBody>
                   <a:tcPr/>
@@ -15441,7 +15751,10 @@
                     <a:lstStyle/>
                     <a:p>
                       <a:pPr algn="ctr"/>
-                      <a:endParaRPr lang="es-MX" dirty="0"/>
+                      <a:endParaRPr lang="es-MX" dirty="0">
+                        <a:latin typeface="Arial" pitchFamily="34" charset="0"/>
+                        <a:cs typeface="Arial" pitchFamily="34" charset="0"/>
+                      </a:endParaRPr>
                     </a:p>
                   </a:txBody>
                   <a:tcPr/>
@@ -15453,34 +15766,58 @@
                     <a:p>
                       <a:pPr algn="ctr"/>
                       <a:r>
-                        <a:rPr lang="es-MX" dirty="0" err="1" smtClean="0"/>
+                        <a:rPr lang="es-MX" dirty="0" err="1" smtClean="0">
+                          <a:latin typeface="Arial" pitchFamily="34" charset="0"/>
+                          <a:cs typeface="Arial" pitchFamily="34" charset="0"/>
+                        </a:rPr>
                         <a:t>Mask</a:t>
                       </a:r>
                       <a:r>
-                        <a:rPr lang="es-MX" dirty="0" smtClean="0"/>
+                        <a:rPr lang="es-MX" dirty="0" smtClean="0">
+                          <a:latin typeface="Arial" pitchFamily="34" charset="0"/>
+                          <a:cs typeface="Arial" pitchFamily="34" charset="0"/>
+                        </a:rPr>
                         <a:t> </a:t>
                       </a:r>
                       <a:r>
-                        <a:rPr lang="es-MX" dirty="0" err="1" smtClean="0"/>
+                        <a:rPr lang="es-MX" dirty="0" err="1" smtClean="0">
+                          <a:latin typeface="Arial" pitchFamily="34" charset="0"/>
+                          <a:cs typeface="Arial" pitchFamily="34" charset="0"/>
+                        </a:rPr>
                         <a:t>required</a:t>
                       </a:r>
                       <a:r>
-                        <a:rPr lang="es-MX" dirty="0" smtClean="0"/>
+                        <a:rPr lang="es-MX" dirty="0" smtClean="0">
+                          <a:latin typeface="Arial" pitchFamily="34" charset="0"/>
+                          <a:cs typeface="Arial" pitchFamily="34" charset="0"/>
+                        </a:rPr>
                         <a:t> </a:t>
                       </a:r>
                       <a:r>
-                        <a:rPr lang="es-MX" dirty="0" err="1" smtClean="0"/>
+                        <a:rPr lang="es-MX" dirty="0" err="1" smtClean="0">
+                          <a:latin typeface="Arial" pitchFamily="34" charset="0"/>
+                          <a:cs typeface="Arial" pitchFamily="34" charset="0"/>
+                        </a:rPr>
                         <a:t>for</a:t>
                       </a:r>
                       <a:r>
-                        <a:rPr lang="es-MX" dirty="0" smtClean="0"/>
+                        <a:rPr lang="es-MX" dirty="0" smtClean="0">
+                          <a:latin typeface="Arial" pitchFamily="34" charset="0"/>
+                          <a:cs typeface="Arial" pitchFamily="34" charset="0"/>
+                        </a:rPr>
                         <a:t> 1 ms </a:t>
                       </a:r>
                       <a:r>
-                        <a:rPr lang="es-MX" dirty="0" err="1" smtClean="0"/>
+                        <a:rPr lang="es-MX" dirty="0" err="1" smtClean="0">
+                          <a:latin typeface="Arial" pitchFamily="34" charset="0"/>
+                          <a:cs typeface="Arial" pitchFamily="34" charset="0"/>
+                        </a:rPr>
                         <a:t>task</a:t>
                       </a:r>
-                      <a:endParaRPr lang="es-MX" dirty="0"/>
+                      <a:endParaRPr lang="es-MX" dirty="0">
+                        <a:latin typeface="Arial" pitchFamily="34" charset="0"/>
+                        <a:cs typeface="Arial" pitchFamily="34" charset="0"/>
+                      </a:endParaRPr>
                     </a:p>
                   </a:txBody>
                   <a:tcPr/>
@@ -15504,10 +15841,16 @@
                     <a:p>
                       <a:pPr algn="ctr"/>
                       <a:r>
-                        <a:rPr lang="es-MX" dirty="0" smtClean="0"/>
+                        <a:rPr lang="es-MX" dirty="0" smtClean="0">
+                          <a:latin typeface="Arial" pitchFamily="34" charset="0"/>
+                          <a:cs typeface="Arial" pitchFamily="34" charset="0"/>
+                        </a:rPr>
                         <a:t>task2</a:t>
                       </a:r>
-                      <a:endParaRPr lang="es-MX" dirty="0"/>
+                      <a:endParaRPr lang="es-MX" dirty="0">
+                        <a:latin typeface="Arial" pitchFamily="34" charset="0"/>
+                        <a:cs typeface="Arial" pitchFamily="34" charset="0"/>
+                      </a:endParaRPr>
                     </a:p>
                   </a:txBody>
                   <a:tcPr/>
@@ -15519,10 +15862,16 @@
                     <a:p>
                       <a:pPr algn="ctr"/>
                       <a:r>
-                        <a:rPr lang="es-MX" dirty="0" smtClean="0"/>
+                        <a:rPr lang="es-MX" dirty="0" smtClean="0">
+                          <a:latin typeface="Arial" pitchFamily="34" charset="0"/>
+                          <a:cs typeface="Arial" pitchFamily="34" charset="0"/>
+                        </a:rPr>
                         <a:t>Mask_3ms</a:t>
                       </a:r>
-                      <a:endParaRPr lang="es-MX" dirty="0"/>
+                      <a:endParaRPr lang="es-MX" dirty="0">
+                        <a:latin typeface="Arial" pitchFamily="34" charset="0"/>
+                        <a:cs typeface="Arial" pitchFamily="34" charset="0"/>
+                      </a:endParaRPr>
                     </a:p>
                   </a:txBody>
                   <a:tcPr/>
@@ -15533,7 +15882,10 @@
                     <a:lstStyle/>
                     <a:p>
                       <a:pPr algn="ctr"/>
-                      <a:endParaRPr lang="es-MX" dirty="0"/>
+                      <a:endParaRPr lang="es-MX" dirty="0">
+                        <a:latin typeface="Arial" pitchFamily="34" charset="0"/>
+                        <a:cs typeface="Arial" pitchFamily="34" charset="0"/>
+                      </a:endParaRPr>
                     </a:p>
                   </a:txBody>
                   <a:tcPr/>
@@ -15545,34 +15897,58 @@
                     <a:p>
                       <a:pPr algn="ctr"/>
                       <a:r>
-                        <a:rPr lang="es-MX" dirty="0" err="1" smtClean="0"/>
+                        <a:rPr lang="es-MX" dirty="0" err="1" smtClean="0">
+                          <a:latin typeface="Arial" pitchFamily="34" charset="0"/>
+                          <a:cs typeface="Arial" pitchFamily="34" charset="0"/>
+                        </a:rPr>
                         <a:t>Mask</a:t>
                       </a:r>
                       <a:r>
-                        <a:rPr lang="es-MX" dirty="0" smtClean="0"/>
+                        <a:rPr lang="es-MX" dirty="0" smtClean="0">
+                          <a:latin typeface="Arial" pitchFamily="34" charset="0"/>
+                          <a:cs typeface="Arial" pitchFamily="34" charset="0"/>
+                        </a:rPr>
                         <a:t> </a:t>
                       </a:r>
                       <a:r>
-                        <a:rPr lang="es-MX" dirty="0" err="1" smtClean="0"/>
+                        <a:rPr lang="es-MX" dirty="0" err="1" smtClean="0">
+                          <a:latin typeface="Arial" pitchFamily="34" charset="0"/>
+                          <a:cs typeface="Arial" pitchFamily="34" charset="0"/>
+                        </a:rPr>
                         <a:t>required</a:t>
                       </a:r>
                       <a:r>
-                        <a:rPr lang="es-MX" dirty="0" smtClean="0"/>
+                        <a:rPr lang="es-MX" dirty="0" smtClean="0">
+                          <a:latin typeface="Arial" pitchFamily="34" charset="0"/>
+                          <a:cs typeface="Arial" pitchFamily="34" charset="0"/>
+                        </a:rPr>
                         <a:t> </a:t>
                       </a:r>
                       <a:r>
-                        <a:rPr lang="es-MX" dirty="0" err="1" smtClean="0"/>
+                        <a:rPr lang="es-MX" dirty="0" err="1" smtClean="0">
+                          <a:latin typeface="Arial" pitchFamily="34" charset="0"/>
+                          <a:cs typeface="Arial" pitchFamily="34" charset="0"/>
+                        </a:rPr>
                         <a:t>for</a:t>
                       </a:r>
                       <a:r>
-                        <a:rPr lang="es-MX" dirty="0" smtClean="0"/>
+                        <a:rPr lang="es-MX" dirty="0" smtClean="0">
+                          <a:latin typeface="Arial" pitchFamily="34" charset="0"/>
+                          <a:cs typeface="Arial" pitchFamily="34" charset="0"/>
+                        </a:rPr>
                         <a:t> 3 ms </a:t>
                       </a:r>
                       <a:r>
-                        <a:rPr lang="es-MX" dirty="0" err="1" smtClean="0"/>
+                        <a:rPr lang="es-MX" dirty="0" err="1" smtClean="0">
+                          <a:latin typeface="Arial" pitchFamily="34" charset="0"/>
+                          <a:cs typeface="Arial" pitchFamily="34" charset="0"/>
+                        </a:rPr>
                         <a:t>task</a:t>
                       </a:r>
-                      <a:endParaRPr lang="es-MX" dirty="0"/>
+                      <a:endParaRPr lang="es-MX" dirty="0">
+                        <a:latin typeface="Arial" pitchFamily="34" charset="0"/>
+                        <a:cs typeface="Arial" pitchFamily="34" charset="0"/>
+                      </a:endParaRPr>
                     </a:p>
                   </a:txBody>
                   <a:tcPr/>
@@ -15596,10 +15972,16 @@
                     <a:p>
                       <a:pPr algn="ctr"/>
                       <a:r>
-                        <a:rPr lang="es-MX" dirty="0" smtClean="0"/>
+                        <a:rPr lang="es-MX" dirty="0" smtClean="0">
+                          <a:latin typeface="Arial" pitchFamily="34" charset="0"/>
+                          <a:cs typeface="Arial" pitchFamily="34" charset="0"/>
+                        </a:rPr>
                         <a:t>Task3</a:t>
                       </a:r>
-                      <a:endParaRPr lang="es-MX" dirty="0"/>
+                      <a:endParaRPr lang="es-MX" dirty="0">
+                        <a:latin typeface="Arial" pitchFamily="34" charset="0"/>
+                        <a:cs typeface="Arial" pitchFamily="34" charset="0"/>
+                      </a:endParaRPr>
                     </a:p>
                   </a:txBody>
                   <a:tcPr/>
@@ -15611,10 +15993,16 @@
                     <a:p>
                       <a:pPr algn="ctr"/>
                       <a:r>
-                        <a:rPr lang="es-MX" dirty="0" smtClean="0"/>
+                        <a:rPr lang="es-MX" dirty="0" smtClean="0">
+                          <a:latin typeface="Arial" pitchFamily="34" charset="0"/>
+                          <a:cs typeface="Arial" pitchFamily="34" charset="0"/>
+                        </a:rPr>
                         <a:t>Mask_5ms</a:t>
                       </a:r>
-                      <a:endParaRPr lang="es-MX" dirty="0"/>
+                      <a:endParaRPr lang="es-MX" dirty="0">
+                        <a:latin typeface="Arial" pitchFamily="34" charset="0"/>
+                        <a:cs typeface="Arial" pitchFamily="34" charset="0"/>
+                      </a:endParaRPr>
                     </a:p>
                   </a:txBody>
                   <a:tcPr/>
@@ -15625,7 +16013,10 @@
                     <a:lstStyle/>
                     <a:p>
                       <a:pPr algn="ctr"/>
-                      <a:endParaRPr lang="es-MX" dirty="0"/>
+                      <a:endParaRPr lang="es-MX" dirty="0">
+                        <a:latin typeface="Arial" pitchFamily="34" charset="0"/>
+                        <a:cs typeface="Arial" pitchFamily="34" charset="0"/>
+                      </a:endParaRPr>
                     </a:p>
                   </a:txBody>
                   <a:tcPr/>
@@ -15637,34 +16028,58 @@
                     <a:p>
                       <a:pPr algn="ctr"/>
                       <a:r>
-                        <a:rPr lang="es-MX" dirty="0" err="1" smtClean="0"/>
+                        <a:rPr lang="es-MX" dirty="0" err="1" smtClean="0">
+                          <a:latin typeface="Arial" pitchFamily="34" charset="0"/>
+                          <a:cs typeface="Arial" pitchFamily="34" charset="0"/>
+                        </a:rPr>
                         <a:t>Mask</a:t>
                       </a:r>
                       <a:r>
-                        <a:rPr lang="es-MX" dirty="0" smtClean="0"/>
+                        <a:rPr lang="es-MX" dirty="0" smtClean="0">
+                          <a:latin typeface="Arial" pitchFamily="34" charset="0"/>
+                          <a:cs typeface="Arial" pitchFamily="34" charset="0"/>
+                        </a:rPr>
                         <a:t> </a:t>
                       </a:r>
                       <a:r>
-                        <a:rPr lang="es-MX" dirty="0" err="1" smtClean="0"/>
+                        <a:rPr lang="es-MX" dirty="0" err="1" smtClean="0">
+                          <a:latin typeface="Arial" pitchFamily="34" charset="0"/>
+                          <a:cs typeface="Arial" pitchFamily="34" charset="0"/>
+                        </a:rPr>
                         <a:t>required</a:t>
                       </a:r>
                       <a:r>
-                        <a:rPr lang="es-MX" dirty="0" smtClean="0"/>
+                        <a:rPr lang="es-MX" dirty="0" smtClean="0">
+                          <a:latin typeface="Arial" pitchFamily="34" charset="0"/>
+                          <a:cs typeface="Arial" pitchFamily="34" charset="0"/>
+                        </a:rPr>
                         <a:t> </a:t>
                       </a:r>
                       <a:r>
-                        <a:rPr lang="es-MX" dirty="0" err="1" smtClean="0"/>
+                        <a:rPr lang="es-MX" dirty="0" err="1" smtClean="0">
+                          <a:latin typeface="Arial" pitchFamily="34" charset="0"/>
+                          <a:cs typeface="Arial" pitchFamily="34" charset="0"/>
+                        </a:rPr>
                         <a:t>for</a:t>
                       </a:r>
                       <a:r>
-                        <a:rPr lang="es-MX" dirty="0" smtClean="0"/>
+                        <a:rPr lang="es-MX" dirty="0" smtClean="0">
+                          <a:latin typeface="Arial" pitchFamily="34" charset="0"/>
+                          <a:cs typeface="Arial" pitchFamily="34" charset="0"/>
+                        </a:rPr>
                         <a:t> 5 ms </a:t>
                       </a:r>
                       <a:r>
-                        <a:rPr lang="es-MX" dirty="0" err="1" smtClean="0"/>
+                        <a:rPr lang="es-MX" dirty="0" err="1" smtClean="0">
+                          <a:latin typeface="Arial" pitchFamily="34" charset="0"/>
+                          <a:cs typeface="Arial" pitchFamily="34" charset="0"/>
+                        </a:rPr>
                         <a:t>task</a:t>
                       </a:r>
-                      <a:endParaRPr lang="es-MX" dirty="0"/>
+                      <a:endParaRPr lang="es-MX" dirty="0">
+                        <a:latin typeface="Arial" pitchFamily="34" charset="0"/>
+                        <a:cs typeface="Arial" pitchFamily="34" charset="0"/>
+                      </a:endParaRPr>
                     </a:p>
                   </a:txBody>
                   <a:tcPr/>
@@ -15688,10 +16103,16 @@
                     <a:p>
                       <a:pPr algn="ctr"/>
                       <a:r>
-                        <a:rPr lang="es-MX" dirty="0" smtClean="0"/>
+                        <a:rPr lang="es-MX" dirty="0" smtClean="0">
+                          <a:latin typeface="Arial" pitchFamily="34" charset="0"/>
+                          <a:cs typeface="Arial" pitchFamily="34" charset="0"/>
+                        </a:rPr>
                         <a:t>task4</a:t>
                       </a:r>
-                      <a:endParaRPr lang="es-MX" dirty="0"/>
+                      <a:endParaRPr lang="es-MX" dirty="0">
+                        <a:latin typeface="Arial" pitchFamily="34" charset="0"/>
+                        <a:cs typeface="Arial" pitchFamily="34" charset="0"/>
+                      </a:endParaRPr>
                     </a:p>
                   </a:txBody>
                   <a:tcPr/>
@@ -15703,10 +16124,16 @@
                     <a:p>
                       <a:pPr algn="ctr"/>
                       <a:r>
-                        <a:rPr lang="es-MX" dirty="0" smtClean="0"/>
+                        <a:rPr lang="es-MX" dirty="0" smtClean="0">
+                          <a:latin typeface="Arial" pitchFamily="34" charset="0"/>
+                          <a:cs typeface="Arial" pitchFamily="34" charset="0"/>
+                        </a:rPr>
                         <a:t>Mask_17ms</a:t>
                       </a:r>
-                      <a:endParaRPr lang="es-MX" dirty="0"/>
+                      <a:endParaRPr lang="es-MX" dirty="0">
+                        <a:latin typeface="Arial" pitchFamily="34" charset="0"/>
+                        <a:cs typeface="Arial" pitchFamily="34" charset="0"/>
+                      </a:endParaRPr>
                     </a:p>
                   </a:txBody>
                   <a:tcPr/>
@@ -15717,7 +16144,10 @@
                     <a:lstStyle/>
                     <a:p>
                       <a:pPr algn="ctr"/>
-                      <a:endParaRPr lang="es-MX" dirty="0"/>
+                      <a:endParaRPr lang="es-MX" dirty="0">
+                        <a:latin typeface="Arial" pitchFamily="34" charset="0"/>
+                        <a:cs typeface="Arial" pitchFamily="34" charset="0"/>
+                      </a:endParaRPr>
                     </a:p>
                   </a:txBody>
                   <a:tcPr/>
@@ -15729,34 +16159,58 @@
                     <a:p>
                       <a:pPr algn="ctr"/>
                       <a:r>
-                        <a:rPr lang="es-MX" dirty="0" err="1" smtClean="0"/>
+                        <a:rPr lang="es-MX" dirty="0" err="1" smtClean="0">
+                          <a:latin typeface="Arial" pitchFamily="34" charset="0"/>
+                          <a:cs typeface="Arial" pitchFamily="34" charset="0"/>
+                        </a:rPr>
                         <a:t>Mask</a:t>
                       </a:r>
                       <a:r>
-                        <a:rPr lang="es-MX" dirty="0" smtClean="0"/>
+                        <a:rPr lang="es-MX" dirty="0" smtClean="0">
+                          <a:latin typeface="Arial" pitchFamily="34" charset="0"/>
+                          <a:cs typeface="Arial" pitchFamily="34" charset="0"/>
+                        </a:rPr>
                         <a:t> </a:t>
                       </a:r>
                       <a:r>
-                        <a:rPr lang="es-MX" dirty="0" err="1" smtClean="0"/>
+                        <a:rPr lang="es-MX" dirty="0" err="1" smtClean="0">
+                          <a:latin typeface="Arial" pitchFamily="34" charset="0"/>
+                          <a:cs typeface="Arial" pitchFamily="34" charset="0"/>
+                        </a:rPr>
                         <a:t>required</a:t>
                       </a:r>
                       <a:r>
-                        <a:rPr lang="es-MX" dirty="0" smtClean="0"/>
+                        <a:rPr lang="es-MX" dirty="0" smtClean="0">
+                          <a:latin typeface="Arial" pitchFamily="34" charset="0"/>
+                          <a:cs typeface="Arial" pitchFamily="34" charset="0"/>
+                        </a:rPr>
                         <a:t> </a:t>
                       </a:r>
                       <a:r>
-                        <a:rPr lang="es-MX" dirty="0" err="1" smtClean="0"/>
+                        <a:rPr lang="es-MX" dirty="0" err="1" smtClean="0">
+                          <a:latin typeface="Arial" pitchFamily="34" charset="0"/>
+                          <a:cs typeface="Arial" pitchFamily="34" charset="0"/>
+                        </a:rPr>
                         <a:t>for</a:t>
                       </a:r>
                       <a:r>
-                        <a:rPr lang="es-MX" baseline="0" dirty="0" smtClean="0"/>
+                        <a:rPr lang="es-MX" baseline="0" dirty="0" smtClean="0">
+                          <a:latin typeface="Arial" pitchFamily="34" charset="0"/>
+                          <a:cs typeface="Arial" pitchFamily="34" charset="0"/>
+                        </a:rPr>
                         <a:t> 17 ms </a:t>
                       </a:r>
                       <a:r>
-                        <a:rPr lang="es-MX" baseline="0" dirty="0" err="1" smtClean="0"/>
+                        <a:rPr lang="es-MX" baseline="0" dirty="0" err="1" smtClean="0">
+                          <a:latin typeface="Arial" pitchFamily="34" charset="0"/>
+                          <a:cs typeface="Arial" pitchFamily="34" charset="0"/>
+                        </a:rPr>
                         <a:t>task</a:t>
                       </a:r>
-                      <a:endParaRPr lang="es-MX" dirty="0"/>
+                      <a:endParaRPr lang="es-MX" dirty="0">
+                        <a:latin typeface="Arial" pitchFamily="34" charset="0"/>
+                        <a:cs typeface="Arial" pitchFamily="34" charset="0"/>
+                      </a:endParaRPr>
                     </a:p>
                   </a:txBody>
                   <a:tcPr/>
@@ -15770,10 +16224,16 @@
                     <a:p>
                       <a:pPr algn="ctr"/>
                       <a:r>
-                        <a:rPr lang="es-MX" dirty="0" err="1" smtClean="0"/>
+                        <a:rPr lang="es-MX" dirty="0" err="1" smtClean="0">
+                          <a:latin typeface="Arial" pitchFamily="34" charset="0"/>
+                          <a:cs typeface="Arial" pitchFamily="34" charset="0"/>
+                        </a:rPr>
                         <a:t>Description</a:t>
                       </a:r>
-                      <a:endParaRPr lang="es-MX" dirty="0"/>
+                      <a:endParaRPr lang="es-MX" dirty="0">
+                        <a:latin typeface="Arial" pitchFamily="34" charset="0"/>
+                        <a:cs typeface="Arial" pitchFamily="34" charset="0"/>
+                      </a:endParaRPr>
                     </a:p>
                   </a:txBody>
                   <a:tcPr/>
@@ -15784,10 +16244,16 @@
                     <a:lstStyle/>
                     <a:p>
                       <a:r>
-                        <a:rPr lang="en-US" dirty="0" smtClean="0"/>
+                        <a:rPr lang="en-US" dirty="0" smtClean="0">
+                          <a:latin typeface="Arial" pitchFamily="34" charset="0"/>
+                          <a:cs typeface="Arial" pitchFamily="34" charset="0"/>
+                        </a:rPr>
                         <a:t>The mask values to generate the task periods </a:t>
                       </a:r>
-                      <a:endParaRPr lang="es-MX" dirty="0"/>
+                      <a:endParaRPr lang="es-MX" dirty="0">
+                        <a:latin typeface="Arial" pitchFamily="34" charset="0"/>
+                        <a:cs typeface="Arial" pitchFamily="34" charset="0"/>
+                      </a:endParaRPr>
                     </a:p>
                   </a:txBody>
                   <a:tcPr/>
@@ -16091,7 +16557,7 @@
   <a:extraClrSchemeLst/>
   <a:extLst>
     <a:ext uri="{05A4C25C-085E-4340-85A3-A5531E510DB2}">
-      <thm15:themeFamily xmlns:thm15="http://schemas.microsoft.com/office/thememl/2012/main" xmlns="" name="Facet" id="{C0C680CD-088A-49FC-A102-D699147F32B2}" vid="{CFBC31BA-B70F-4F30-BCAA-4F3011E16C4D}"/>
+      <thm15:themeFamily xmlns="" xmlns:thm15="http://schemas.microsoft.com/office/thememl/2012/main" name="Facet" id="{C0C680CD-088A-49FC-A102-D699147F32B2}" vid="{CFBC31BA-B70F-4F30-BCAA-4F3011E16C4D}"/>
     </a:ext>
   </a:extLst>
 </a:theme>

</xml_diff>